<commit_message>
Adding benefits and Requirements Specification to the presentation/Walk_Tracker.pptx
</commit_message>
<xml_diff>
--- a/docs/presentation/Walk_Tracker.pptx
+++ b/docs/presentation/Walk_Tracker.pptx
@@ -9,8 +9,10 @@
     <p:sldId id="257" r:id="rId3"/>
     <p:sldId id="258" r:id="rId4"/>
     <p:sldId id="259" r:id="rId5"/>
-    <p:sldId id="260" r:id="rId6"/>
-    <p:sldId id="261" r:id="rId7"/>
+    <p:sldId id="262" r:id="rId6"/>
+    <p:sldId id="260" r:id="rId7"/>
+    <p:sldId id="261" r:id="rId8"/>
+    <p:sldId id="264" r:id="rId9"/>
   </p:sldIdLst>
   <p:sldSz cx="12192000" cy="6858000"/>
   <p:notesSz cx="6858000" cy="9144000"/>
@@ -109,6 +111,11 @@
       </a:defRPr>
     </a:lvl9pPr>
   </p:defaultTextStyle>
+  <p:extLst>
+    <p:ext uri="{EFAFB233-063F-42B5-8137-9DF3F51BA10A}">
+      <p15:sldGuideLst xmlns:p15="http://schemas.microsoft.com/office/powerpoint/2012/main"/>
+    </p:ext>
+  </p:extLst>
 </p:presentation>
 </file>
 
@@ -6390,11 +6397,13 @@
           </a:xfrm>
         </p:spPr>
         <p:txBody>
-          <a:bodyPr/>
-          <a:lstStyle/>
-          <a:p>
-            <a:r>
-              <a:rPr lang="en-US" dirty="0" smtClean="0">
+          <a:bodyPr>
+            <a:normAutofit/>
+          </a:bodyPr>
+          <a:lstStyle/>
+          <a:p>
+            <a:r>
+              <a:rPr lang="en-US" sz="3600" dirty="0" smtClean="0">
                 <a:solidFill>
                   <a:schemeClr val="tx1">
                     <a:lumMod val="85000"/>
@@ -6404,7 +6413,7 @@
               </a:rPr>
               <a:t>Group C </a:t>
             </a:r>
-            <a:endParaRPr lang="en-US" dirty="0">
+            <a:endParaRPr lang="en-US" sz="3600" dirty="0">
               <a:solidFill>
                 <a:schemeClr val="tx1">
                   <a:lumMod val="85000"/>
@@ -6502,10 +6511,6 @@
               </a:rPr>
               <a:t>Agenda</a:t>
             </a:r>
-            <a:endParaRPr lang="en-US" dirty="0">
-              <a:latin typeface="Arial" panose="020B0604020202020204" pitchFamily="34" charset="0"/>
-              <a:cs typeface="Arial" panose="020B0604020202020204" pitchFamily="34" charset="0"/>
-            </a:endParaRPr>
           </a:p>
         </p:txBody>
       </p:sp>
@@ -6561,12 +6566,29 @@
               <a:t> Project </a:t>
             </a:r>
             <a:r>
-              <a:rPr lang="en-US" dirty="0">
+              <a:rPr lang="en-US" dirty="0" smtClean="0">
                 <a:latin typeface="Arial" panose="020B0604020202020204" pitchFamily="34" charset="0"/>
                 <a:cs typeface="Arial" panose="020B0604020202020204" pitchFamily="34" charset="0"/>
               </a:rPr>
               <a:t>Description</a:t>
             </a:r>
+          </a:p>
+          <a:p>
+            <a:pPr>
+              <a:buFont typeface="Wingdings" panose="05000000000000000000" pitchFamily="2" charset="2"/>
+              <a:buChar char="Ø"/>
+            </a:pPr>
+            <a:r>
+              <a:rPr lang="en-US" dirty="0" smtClean="0">
+                <a:latin typeface="Arial" panose="020B0604020202020204" pitchFamily="34" charset="0"/>
+                <a:cs typeface="Arial" panose="020B0604020202020204" pitchFamily="34" charset="0"/>
+              </a:rPr>
+              <a:t> Benefits of WALK TRACKER</a:t>
+            </a:r>
+            <a:endParaRPr lang="en-US" dirty="0">
+              <a:latin typeface="Arial" panose="020B0604020202020204" pitchFamily="34" charset="0"/>
+              <a:cs typeface="Arial" panose="020B0604020202020204" pitchFamily="34" charset="0"/>
+            </a:endParaRPr>
           </a:p>
           <a:p>
             <a:pPr>
@@ -6739,10 +6761,6 @@
               </a:rPr>
               <a:t>In the U.S., childhood obesity alone is estimated to cost $14 billion annually in direct health expenses. Unhealthy lifestyle and eating habits has direct impact on physical health causing damage to metabolism, which has impact on mental well-being too.</a:t>
             </a:r>
-            <a:endParaRPr lang="en-US" sz="2000" dirty="0">
-              <a:latin typeface="Arial" panose="020B0604020202020204" pitchFamily="34" charset="0"/>
-              <a:cs typeface="Arial" panose="020B0604020202020204" pitchFamily="34" charset="0"/>
-            </a:endParaRPr>
           </a:p>
         </p:txBody>
       </p:sp>
@@ -7186,15 +7204,154 @@
                 <a:latin typeface="Arial" panose="020B0604020202020204" pitchFamily="34" charset="0"/>
                 <a:cs typeface="Arial" panose="020B0604020202020204" pitchFamily="34" charset="0"/>
               </a:rPr>
-              <a:t>Core Team Members</a:t>
-            </a:r>
+              <a:t>Benefits of </a:t>
+            </a:r>
+            <a:r>
+              <a:rPr lang="en-US" dirty="0" smtClean="0">
+                <a:latin typeface="Arial" panose="020B0604020202020204" pitchFamily="34" charset="0"/>
+                <a:cs typeface="Arial" panose="020B0604020202020204" pitchFamily="34" charset="0"/>
+              </a:rPr>
+              <a:t>WALK TRACKER</a:t>
+            </a:r>
+            <a:endParaRPr lang="en-US" dirty="0">
+              <a:latin typeface="Arial" panose="020B0604020202020204" pitchFamily="34" charset="0"/>
+              <a:cs typeface="Arial" panose="020B0604020202020204" pitchFamily="34" charset="0"/>
+            </a:endParaRPr>
+          </a:p>
+        </p:txBody>
+      </p:sp>
+      <p:sp>
+        <p:nvSpPr>
+          <p:cNvPr id="6" name="TextBox 5"/>
+          <p:cNvSpPr txBox="1"/>
+          <p:nvPr/>
+        </p:nvSpPr>
+        <p:spPr>
+          <a:xfrm>
+            <a:off x="1191491" y="1911927"/>
+            <a:ext cx="9795164" cy="2990562"/>
+          </a:xfrm>
+          <a:prstGeom prst="rect">
+            <a:avLst/>
+          </a:prstGeom>
+          <a:noFill/>
+        </p:spPr>
+        <p:txBody>
+          <a:bodyPr wrap="square" rtlCol="0">
+            <a:spAutoFit/>
+          </a:bodyPr>
+          <a:lstStyle/>
+          <a:p>
+            <a:endParaRPr lang="en-US" sz="2000" dirty="0">
+              <a:latin typeface="Arial" panose="020B0604020202020204" pitchFamily="34" charset="0"/>
+              <a:cs typeface="Arial" panose="020B0604020202020204" pitchFamily="34" charset="0"/>
+            </a:endParaRPr>
+          </a:p>
+          <a:p>
+            <a:r>
+              <a:rPr lang="en-US" sz="2000" dirty="0" smtClean="0">
+                <a:latin typeface="Arial" panose="020B0604020202020204" pitchFamily="34" charset="0"/>
+                <a:cs typeface="Arial" panose="020B0604020202020204" pitchFamily="34" charset="0"/>
+              </a:rPr>
+              <a:t>Some of the benefits of using </a:t>
+            </a:r>
+            <a:r>
+              <a:rPr lang="en-US" sz="2000" dirty="0" err="1" smtClean="0">
+                <a:latin typeface="Arial" panose="020B0604020202020204" pitchFamily="34" charset="0"/>
+                <a:cs typeface="Arial" panose="020B0604020202020204" pitchFamily="34" charset="0"/>
+              </a:rPr>
+              <a:t>WalkTracker</a:t>
+            </a:r>
+            <a:r>
+              <a:rPr lang="en-US" sz="2000" dirty="0" smtClean="0">
+                <a:latin typeface="Arial" panose="020B0604020202020204" pitchFamily="34" charset="0"/>
+                <a:cs typeface="Arial" panose="020B0604020202020204" pitchFamily="34" charset="0"/>
+              </a:rPr>
+              <a:t>:</a:t>
+            </a:r>
+          </a:p>
+          <a:p>
+            <a:endParaRPr lang="en-US" sz="2000" dirty="0" smtClean="0">
+              <a:latin typeface="Arial" panose="020B0604020202020204" pitchFamily="34" charset="0"/>
+              <a:cs typeface="Arial" panose="020B0604020202020204" pitchFamily="34" charset="0"/>
+            </a:endParaRPr>
+          </a:p>
+          <a:p>
+            <a:pPr marL="342900" indent="-342900">
+              <a:lnSpc>
+                <a:spcPct val="150000"/>
+              </a:lnSpc>
+              <a:spcBef>
+                <a:spcPts val="200"/>
+              </a:spcBef>
+              <a:spcAft>
+                <a:spcPts val="200"/>
+              </a:spcAft>
+              <a:buFont typeface="Wingdings" panose="05000000000000000000" pitchFamily="2" charset="2"/>
+              <a:buChar char="q"/>
+            </a:pPr>
+            <a:r>
+              <a:rPr lang="en-US" sz="2000" dirty="0">
+                <a:latin typeface="Arial" panose="020B0604020202020204" pitchFamily="34" charset="0"/>
+                <a:cs typeface="Arial" panose="020B0604020202020204" pitchFamily="34" charset="0"/>
+              </a:rPr>
+              <a:t>The app helps users to track their steps, food intake and other health measurements which helps to track their health.</a:t>
+            </a:r>
+          </a:p>
+          <a:p>
+            <a:pPr marL="342900" indent="-342900">
+              <a:lnSpc>
+                <a:spcPct val="150000"/>
+              </a:lnSpc>
+              <a:spcBef>
+                <a:spcPts val="200"/>
+              </a:spcBef>
+              <a:spcAft>
+                <a:spcPts val="200"/>
+              </a:spcAft>
+              <a:buFont typeface="Wingdings" panose="05000000000000000000" pitchFamily="2" charset="2"/>
+              <a:buChar char="q"/>
+            </a:pPr>
+            <a:r>
+              <a:rPr lang="en-US" sz="2000" dirty="0">
+                <a:latin typeface="Arial" panose="020B0604020202020204" pitchFamily="34" charset="0"/>
+                <a:cs typeface="Arial" panose="020B0604020202020204" pitchFamily="34" charset="0"/>
+              </a:rPr>
+              <a:t>Users who gained points which can be used to buy products in our App market.</a:t>
+            </a:r>
+          </a:p>
+          <a:p>
+            <a:pPr marL="342900" indent="-342900">
+              <a:lnSpc>
+                <a:spcPct val="150000"/>
+              </a:lnSpc>
+              <a:spcBef>
+                <a:spcPts val="200"/>
+              </a:spcBef>
+              <a:spcAft>
+                <a:spcPts val="200"/>
+              </a:spcAft>
+              <a:buFont typeface="Wingdings" panose="05000000000000000000" pitchFamily="2" charset="2"/>
+              <a:buChar char="q"/>
+            </a:pPr>
+            <a:r>
+              <a:rPr lang="en-US" sz="2000" dirty="0">
+                <a:latin typeface="Arial" panose="020B0604020202020204" pitchFamily="34" charset="0"/>
+                <a:cs typeface="Arial" panose="020B0604020202020204" pitchFamily="34" charset="0"/>
+              </a:rPr>
+              <a:t>The user statistical data can be used to predict users health prior to attack.</a:t>
+            </a:r>
+            <a:endParaRPr lang="en-US" sz="2000" dirty="0">
+              <a:latin typeface="Arial" panose="020B0604020202020204" pitchFamily="34" charset="0"/>
+              <a:cs typeface="Arial" panose="020B0604020202020204" pitchFamily="34" charset="0"/>
+            </a:endParaRPr>
           </a:p>
         </p:txBody>
       </p:sp>
     </p:spTree>
     <p:extLst>
       <p:ext uri="{BB962C8B-B14F-4D97-AF65-F5344CB8AC3E}">
-        <p14:creationId xmlns:p14="http://schemas.microsoft.com/office/powerpoint/2010/main" val="3992834606"/>
+        <p14:creationId xmlns:p14="http://schemas.microsoft.com/office/powerpoint/2010/main" val="1202981544"/>
       </p:ext>
     </p:extLst>
   </p:cSld>
@@ -7248,6 +7405,68 @@
                 <a:latin typeface="Arial" panose="020B0604020202020204" pitchFamily="34" charset="0"/>
                 <a:cs typeface="Arial" panose="020B0604020202020204" pitchFamily="34" charset="0"/>
               </a:rPr>
+              <a:t>Core Team Members</a:t>
+            </a:r>
+          </a:p>
+        </p:txBody>
+      </p:sp>
+    </p:spTree>
+    <p:extLst>
+      <p:ext uri="{BB962C8B-B14F-4D97-AF65-F5344CB8AC3E}">
+        <p14:creationId xmlns:p14="http://schemas.microsoft.com/office/powerpoint/2010/main" val="3992834606"/>
+      </p:ext>
+    </p:extLst>
+  </p:cSld>
+  <p:clrMapOvr>
+    <a:masterClrMapping/>
+  </p:clrMapOvr>
+</p:sld>
+</file>
+
+<file path=ppt/slides/slide7.xml><?xml version="1.0" encoding="utf-8"?>
+<p:sld xmlns:a="http://schemas.openxmlformats.org/drawingml/2006/main" xmlns:r="http://schemas.openxmlformats.org/officeDocument/2006/relationships" xmlns:p="http://schemas.openxmlformats.org/presentationml/2006/main">
+  <p:cSld>
+    <p:spTree>
+      <p:nvGrpSpPr>
+        <p:cNvPr id="1" name=""/>
+        <p:cNvGrpSpPr/>
+        <p:nvPr/>
+      </p:nvGrpSpPr>
+      <p:grpSpPr>
+        <a:xfrm>
+          <a:off x="0" y="0"/>
+          <a:ext cx="0" cy="0"/>
+          <a:chOff x="0" y="0"/>
+          <a:chExt cx="0" cy="0"/>
+        </a:xfrm>
+      </p:grpSpPr>
+      <p:sp>
+        <p:nvSpPr>
+          <p:cNvPr id="2" name="Title 1"/>
+          <p:cNvSpPr>
+            <a:spLocks noGrp="1"/>
+          </p:cNvSpPr>
+          <p:nvPr>
+            <p:ph type="title"/>
+          </p:nvPr>
+        </p:nvSpPr>
+        <p:spPr>
+          <a:xfrm>
+            <a:off x="913775" y="618517"/>
+            <a:ext cx="10364451" cy="1016319"/>
+          </a:xfrm>
+        </p:spPr>
+        <p:txBody>
+          <a:bodyPr>
+            <a:normAutofit/>
+          </a:bodyPr>
+          <a:lstStyle/>
+          <a:p>
+            <a:r>
+              <a:rPr lang="en-US" dirty="0">
+                <a:latin typeface="Arial" panose="020B0604020202020204" pitchFamily="34" charset="0"/>
+                <a:cs typeface="Arial" panose="020B0604020202020204" pitchFamily="34" charset="0"/>
+              </a:rPr>
               <a:t>Project Requirements Specifications</a:t>
             </a:r>
           </a:p>
@@ -7509,6 +7728,95 @@
     <p:extLst>
       <p:ext uri="{BB962C8B-B14F-4D97-AF65-F5344CB8AC3E}">
         <p14:creationId xmlns:p14="http://schemas.microsoft.com/office/powerpoint/2010/main" val="2667847599"/>
+      </p:ext>
+    </p:extLst>
+  </p:cSld>
+  <p:clrMapOvr>
+    <a:masterClrMapping/>
+  </p:clrMapOvr>
+</p:sld>
+</file>
+
+<file path=ppt/slides/slide8.xml><?xml version="1.0" encoding="utf-8"?>
+<p:sld xmlns:a="http://schemas.openxmlformats.org/drawingml/2006/main" xmlns:r="http://schemas.openxmlformats.org/officeDocument/2006/relationships" xmlns:p="http://schemas.openxmlformats.org/presentationml/2006/main">
+  <p:cSld>
+    <p:spTree>
+      <p:nvGrpSpPr>
+        <p:cNvPr id="1" name=""/>
+        <p:cNvGrpSpPr/>
+        <p:nvPr/>
+      </p:nvGrpSpPr>
+      <p:grpSpPr>
+        <a:xfrm>
+          <a:off x="0" y="0"/>
+          <a:ext cx="0" cy="0"/>
+          <a:chOff x="0" y="0"/>
+          <a:chExt cx="0" cy="0"/>
+        </a:xfrm>
+      </p:grpSpPr>
+      <p:sp>
+        <p:nvSpPr>
+          <p:cNvPr id="2" name="Title 1"/>
+          <p:cNvSpPr>
+            <a:spLocks noGrp="1"/>
+          </p:cNvSpPr>
+          <p:nvPr>
+            <p:ph type="title"/>
+          </p:nvPr>
+        </p:nvSpPr>
+        <p:spPr>
+          <a:xfrm>
+            <a:off x="913775" y="618517"/>
+            <a:ext cx="10364451" cy="1016319"/>
+          </a:xfrm>
+        </p:spPr>
+        <p:txBody>
+          <a:bodyPr>
+            <a:normAutofit/>
+          </a:bodyPr>
+          <a:lstStyle/>
+          <a:p>
+            <a:r>
+              <a:rPr lang="en-US" dirty="0" smtClean="0">
+                <a:latin typeface="Arial" panose="020B0604020202020204" pitchFamily="34" charset="0"/>
+                <a:cs typeface="Arial" panose="020B0604020202020204" pitchFamily="34" charset="0"/>
+              </a:rPr>
+              <a:t>Make your idea success</a:t>
+            </a:r>
+            <a:endParaRPr lang="en-US" dirty="0">
+              <a:latin typeface="Arial" panose="020B0604020202020204" pitchFamily="34" charset="0"/>
+              <a:cs typeface="Arial" panose="020B0604020202020204" pitchFamily="34" charset="0"/>
+            </a:endParaRPr>
+          </a:p>
+        </p:txBody>
+      </p:sp>
+      <p:pic>
+        <p:nvPicPr>
+          <p:cNvPr id="4" name="Picture 3"/>
+          <p:cNvPicPr>
+            <a:picLocks noChangeAspect="1"/>
+          </p:cNvPicPr>
+          <p:nvPr/>
+        </p:nvPicPr>
+        <p:blipFill rotWithShape="1">
+          <a:blip r:embed="rId2"/>
+          <a:srcRect l="19048" t="8095" r="19048" b="12667"/>
+          <a:stretch/>
+        </p:blipFill>
+        <p:spPr>
+          <a:xfrm>
+            <a:off x="2708599" y="1634836"/>
+            <a:ext cx="6774801" cy="4999047"/>
+          </a:xfrm>
+          <a:prstGeom prst="rect">
+            <a:avLst/>
+          </a:prstGeom>
+        </p:spPr>
+      </p:pic>
+    </p:spTree>
+    <p:extLst>
+      <p:ext uri="{BB962C8B-B14F-4D97-AF65-F5344CB8AC3E}">
+        <p14:creationId xmlns:p14="http://schemas.microsoft.com/office/powerpoint/2010/main" val="2754759596"/>
       </p:ext>
     </p:extLst>
   </p:cSld>

</xml_diff>

<commit_message>
Adding Software Management plan to presentation
</commit_message>
<xml_diff>
--- a/docs/presentation/Walk_Tracker.pptx
+++ b/docs/presentation/Walk_Tracker.pptx
@@ -12,7 +12,13 @@
     <p:sldId id="262" r:id="rId6"/>
     <p:sldId id="260" r:id="rId7"/>
     <p:sldId id="261" r:id="rId8"/>
-    <p:sldId id="264" r:id="rId9"/>
+    <p:sldId id="265" r:id="rId9"/>
+    <p:sldId id="266" r:id="rId10"/>
+    <p:sldId id="267" r:id="rId11"/>
+    <p:sldId id="268" r:id="rId12"/>
+    <p:sldId id="269" r:id="rId13"/>
+    <p:sldId id="270" r:id="rId14"/>
+    <p:sldId id="264" r:id="rId15"/>
   </p:sldIdLst>
   <p:sldSz cx="12192000" cy="6858000"/>
   <p:notesSz cx="6858000" cy="9144000"/>
@@ -290,7 +296,7 @@
           <a:p>
             <a:fld id="{AE7B9B7E-AC06-4BAC-A9B2-F0CC841AF390}" type="datetimeFigureOut">
               <a:rPr lang="en-US" smtClean="0"/>
-              <a:t>8/30/2020</a:t>
+              <a:t>9/1/2020</a:t>
             </a:fld>
             <a:endParaRPr lang="en-US"/>
           </a:p>
@@ -610,7 +616,7 @@
           <a:p>
             <a:fld id="{AE7B9B7E-AC06-4BAC-A9B2-F0CC841AF390}" type="datetimeFigureOut">
               <a:rPr lang="en-US" smtClean="0"/>
-              <a:t>8/30/2020</a:t>
+              <a:t>9/1/2020</a:t>
             </a:fld>
             <a:endParaRPr lang="en-US"/>
           </a:p>
@@ -832,7 +838,7 @@
           <a:p>
             <a:fld id="{AE7B9B7E-AC06-4BAC-A9B2-F0CC841AF390}" type="datetimeFigureOut">
               <a:rPr lang="en-US" smtClean="0"/>
-              <a:t>8/30/2020</a:t>
+              <a:t>9/1/2020</a:t>
             </a:fld>
             <a:endParaRPr lang="en-US"/>
           </a:p>
@@ -1123,7 +1129,7 @@
           <a:p>
             <a:fld id="{AE7B9B7E-AC06-4BAC-A9B2-F0CC841AF390}" type="datetimeFigureOut">
               <a:rPr lang="en-US" smtClean="0"/>
-              <a:t>8/30/2020</a:t>
+              <a:t>9/1/2020</a:t>
             </a:fld>
             <a:endParaRPr lang="en-US"/>
           </a:p>
@@ -1577,7 +1583,7 @@
           <a:p>
             <a:fld id="{AE7B9B7E-AC06-4BAC-A9B2-F0CC841AF390}" type="datetimeFigureOut">
               <a:rPr lang="en-US" smtClean="0"/>
-              <a:t>8/30/2020</a:t>
+              <a:t>9/1/2020</a:t>
             </a:fld>
             <a:endParaRPr lang="en-US"/>
           </a:p>
@@ -2153,7 +2159,7 @@
           <a:p>
             <a:fld id="{AE7B9B7E-AC06-4BAC-A9B2-F0CC841AF390}" type="datetimeFigureOut">
               <a:rPr lang="en-US" smtClean="0"/>
-              <a:t>8/30/2020</a:t>
+              <a:t>9/1/2020</a:t>
             </a:fld>
             <a:endParaRPr lang="en-US"/>
           </a:p>
@@ -3014,7 +3020,7 @@
           <a:p>
             <a:fld id="{AE7B9B7E-AC06-4BAC-A9B2-F0CC841AF390}" type="datetimeFigureOut">
               <a:rPr lang="en-US" smtClean="0"/>
-              <a:t>8/30/2020</a:t>
+              <a:t>9/1/2020</a:t>
             </a:fld>
             <a:endParaRPr lang="en-US"/>
           </a:p>
@@ -3219,7 +3225,7 @@
           <a:p>
             <a:fld id="{AE7B9B7E-AC06-4BAC-A9B2-F0CC841AF390}" type="datetimeFigureOut">
               <a:rPr lang="en-US" smtClean="0"/>
-              <a:t>8/30/2020</a:t>
+              <a:t>9/1/2020</a:t>
             </a:fld>
             <a:endParaRPr lang="en-US"/>
           </a:p>
@@ -3433,7 +3439,7 @@
           <a:p>
             <a:fld id="{AE7B9B7E-AC06-4BAC-A9B2-F0CC841AF390}" type="datetimeFigureOut">
               <a:rPr lang="en-US" smtClean="0"/>
-              <a:t>8/30/2020</a:t>
+              <a:t>9/1/2020</a:t>
             </a:fld>
             <a:endParaRPr lang="en-US"/>
           </a:p>
@@ -3603,7 +3609,7 @@
           <a:p>
             <a:fld id="{AE7B9B7E-AC06-4BAC-A9B2-F0CC841AF390}" type="datetimeFigureOut">
               <a:rPr lang="en-US" smtClean="0"/>
-              <a:t>8/30/2020</a:t>
+              <a:t>9/1/2020</a:t>
             </a:fld>
             <a:endParaRPr lang="en-US"/>
           </a:p>
@@ -3808,7 +3814,7 @@
           <a:p>
             <a:fld id="{AE7B9B7E-AC06-4BAC-A9B2-F0CC841AF390}" type="datetimeFigureOut">
               <a:rPr lang="en-US" smtClean="0"/>
-              <a:t>8/30/2020</a:t>
+              <a:t>9/1/2020</a:t>
             </a:fld>
             <a:endParaRPr lang="en-US"/>
           </a:p>
@@ -4088,7 +4094,7 @@
           <a:p>
             <a:fld id="{AE7B9B7E-AC06-4BAC-A9B2-F0CC841AF390}" type="datetimeFigureOut">
               <a:rPr lang="en-US" smtClean="0"/>
-              <a:t>8/30/2020</a:t>
+              <a:t>9/1/2020</a:t>
             </a:fld>
             <a:endParaRPr lang="en-US"/>
           </a:p>
@@ -4360,7 +4366,7 @@
           <a:p>
             <a:fld id="{AE7B9B7E-AC06-4BAC-A9B2-F0CC841AF390}" type="datetimeFigureOut">
               <a:rPr lang="en-US" smtClean="0"/>
-              <a:t>8/30/2020</a:t>
+              <a:t>9/1/2020</a:t>
             </a:fld>
             <a:endParaRPr lang="en-US"/>
           </a:p>
@@ -4775,7 +4781,7 @@
           <a:p>
             <a:fld id="{AE7B9B7E-AC06-4BAC-A9B2-F0CC841AF390}" type="datetimeFigureOut">
               <a:rPr lang="en-US" smtClean="0"/>
-              <a:t>8/30/2020</a:t>
+              <a:t>9/1/2020</a:t>
             </a:fld>
             <a:endParaRPr lang="en-US"/>
           </a:p>
@@ -4923,7 +4929,7 @@
           <a:p>
             <a:fld id="{AE7B9B7E-AC06-4BAC-A9B2-F0CC841AF390}" type="datetimeFigureOut">
               <a:rPr lang="en-US" smtClean="0"/>
-              <a:t>8/30/2020</a:t>
+              <a:t>9/1/2020</a:t>
             </a:fld>
             <a:endParaRPr lang="en-US"/>
           </a:p>
@@ -5048,7 +5054,7 @@
           <a:p>
             <a:fld id="{AE7B9B7E-AC06-4BAC-A9B2-F0CC841AF390}" type="datetimeFigureOut">
               <a:rPr lang="en-US" smtClean="0"/>
-              <a:t>8/30/2020</a:t>
+              <a:t>9/1/2020</a:t>
             </a:fld>
             <a:endParaRPr lang="en-US"/>
           </a:p>
@@ -5332,7 +5338,7 @@
           <a:p>
             <a:fld id="{AE7B9B7E-AC06-4BAC-A9B2-F0CC841AF390}" type="datetimeFigureOut">
               <a:rPr lang="en-US" smtClean="0"/>
-              <a:t>8/30/2020</a:t>
+              <a:t>9/1/2020</a:t>
             </a:fld>
             <a:endParaRPr lang="en-US"/>
           </a:p>
@@ -5647,7 +5653,7 @@
           <a:p>
             <a:fld id="{AE7B9B7E-AC06-4BAC-A9B2-F0CC841AF390}" type="datetimeFigureOut">
               <a:rPr lang="en-US" smtClean="0"/>
-              <a:t>8/30/2020</a:t>
+              <a:t>9/1/2020</a:t>
             </a:fld>
             <a:endParaRPr lang="en-US"/>
           </a:p>
@@ -5900,7 +5906,7 @@
           <a:p>
             <a:fld id="{AE7B9B7E-AC06-4BAC-A9B2-F0CC841AF390}" type="datetimeFigureOut">
               <a:rPr lang="en-US" smtClean="0"/>
-              <a:t>8/30/2020</a:t>
+              <a:t>9/1/2020</a:t>
             </a:fld>
             <a:endParaRPr lang="en-US"/>
           </a:p>
@@ -6467,6 +6473,1362 @@
 </p:sld>
 </file>
 
+<file path=ppt/slides/slide10.xml><?xml version="1.0" encoding="utf-8"?>
+<p:sld xmlns:a="http://schemas.openxmlformats.org/drawingml/2006/main" xmlns:r="http://schemas.openxmlformats.org/officeDocument/2006/relationships" xmlns:p="http://schemas.openxmlformats.org/presentationml/2006/main">
+  <p:cSld>
+    <p:spTree>
+      <p:nvGrpSpPr>
+        <p:cNvPr id="1" name=""/>
+        <p:cNvGrpSpPr/>
+        <p:nvPr/>
+      </p:nvGrpSpPr>
+      <p:grpSpPr>
+        <a:xfrm>
+          <a:off x="0" y="0"/>
+          <a:ext cx="0" cy="0"/>
+          <a:chOff x="0" y="0"/>
+          <a:chExt cx="0" cy="0"/>
+        </a:xfrm>
+      </p:grpSpPr>
+      <p:sp>
+        <p:nvSpPr>
+          <p:cNvPr id="2" name="Title 1"/>
+          <p:cNvSpPr>
+            <a:spLocks noGrp="1"/>
+          </p:cNvSpPr>
+          <p:nvPr>
+            <p:ph type="title"/>
+          </p:nvPr>
+        </p:nvSpPr>
+        <p:spPr>
+          <a:xfrm>
+            <a:off x="913775" y="618517"/>
+            <a:ext cx="10364451" cy="1016319"/>
+          </a:xfrm>
+        </p:spPr>
+        <p:txBody>
+          <a:bodyPr>
+            <a:normAutofit/>
+          </a:bodyPr>
+          <a:lstStyle/>
+          <a:p>
+            <a:pPr>
+              <a:lnSpc>
+                <a:spcPct val="150000"/>
+              </a:lnSpc>
+              <a:spcBef>
+                <a:spcPts val="200"/>
+              </a:spcBef>
+              <a:spcAft>
+                <a:spcPts val="200"/>
+              </a:spcAft>
+            </a:pPr>
+            <a:r>
+              <a:rPr lang="en-US" dirty="0">
+                <a:latin typeface="Arial" panose="020B0604020202020204" pitchFamily="34" charset="0"/>
+                <a:cs typeface="Arial" panose="020B0604020202020204" pitchFamily="34" charset="0"/>
+              </a:rPr>
+              <a:t>Terms and Techniques</a:t>
+            </a:r>
+          </a:p>
+        </p:txBody>
+      </p:sp>
+      <p:sp>
+        <p:nvSpPr>
+          <p:cNvPr id="6" name="TextBox 5"/>
+          <p:cNvSpPr txBox="1"/>
+          <p:nvPr/>
+        </p:nvSpPr>
+        <p:spPr>
+          <a:xfrm>
+            <a:off x="1191491" y="1911927"/>
+            <a:ext cx="9795164" cy="4980851"/>
+          </a:xfrm>
+          <a:prstGeom prst="rect">
+            <a:avLst/>
+          </a:prstGeom>
+          <a:noFill/>
+        </p:spPr>
+        <p:txBody>
+          <a:bodyPr wrap="square" rtlCol="0">
+            <a:spAutoFit/>
+          </a:bodyPr>
+          <a:lstStyle/>
+          <a:p>
+            <a:r>
+              <a:rPr lang="en-US" sz="2000" dirty="0" smtClean="0">
+                <a:latin typeface="Arial" panose="020B0604020202020204" pitchFamily="34" charset="0"/>
+                <a:cs typeface="Arial" panose="020B0604020202020204" pitchFamily="34" charset="0"/>
+              </a:rPr>
+              <a:t>Here are a set of front-end and back-end tools used for developing the application:</a:t>
+            </a:r>
+          </a:p>
+          <a:p>
+            <a:endParaRPr lang="en-US" sz="2000" dirty="0">
+              <a:latin typeface="Arial" panose="020B0604020202020204" pitchFamily="34" charset="0"/>
+              <a:cs typeface="Arial" panose="020B0604020202020204" pitchFamily="34" charset="0"/>
+            </a:endParaRPr>
+          </a:p>
+          <a:p>
+            <a:pPr marL="342900" indent="-342900">
+              <a:lnSpc>
+                <a:spcPct val="150000"/>
+              </a:lnSpc>
+              <a:spcBef>
+                <a:spcPts val="200"/>
+              </a:spcBef>
+              <a:spcAft>
+                <a:spcPts val="200"/>
+              </a:spcAft>
+              <a:buFont typeface="Wingdings" panose="05000000000000000000" pitchFamily="2" charset="2"/>
+              <a:buChar char="q"/>
+            </a:pPr>
+            <a:r>
+              <a:rPr lang="en-US" sz="1600" dirty="0" smtClean="0">
+                <a:latin typeface="Arial" panose="020B0604020202020204" pitchFamily="34" charset="0"/>
+                <a:cs typeface="Arial" panose="020B0604020202020204" pitchFamily="34" charset="0"/>
+              </a:rPr>
+              <a:t>Front-end:</a:t>
+            </a:r>
+          </a:p>
+          <a:p>
+            <a:pPr marL="800100" lvl="1" indent="-342900">
+              <a:lnSpc>
+                <a:spcPct val="150000"/>
+              </a:lnSpc>
+              <a:spcBef>
+                <a:spcPts val="200"/>
+              </a:spcBef>
+              <a:spcAft>
+                <a:spcPts val="200"/>
+              </a:spcAft>
+              <a:buFont typeface="Wingdings" panose="05000000000000000000" pitchFamily="2" charset="2"/>
+              <a:buChar char="q"/>
+            </a:pPr>
+            <a:r>
+              <a:rPr lang="en-US" sz="1600" dirty="0" smtClean="0">
+                <a:latin typeface="Arial" panose="020B0604020202020204" pitchFamily="34" charset="0"/>
+                <a:cs typeface="Arial" panose="020B0604020202020204" pitchFamily="34" charset="0"/>
+              </a:rPr>
+              <a:t>Angular Framework(HTML/CSS/Typescript)</a:t>
+            </a:r>
+          </a:p>
+          <a:p>
+            <a:pPr marL="800100" lvl="1" indent="-342900">
+              <a:lnSpc>
+                <a:spcPct val="150000"/>
+              </a:lnSpc>
+              <a:spcBef>
+                <a:spcPts val="200"/>
+              </a:spcBef>
+              <a:spcAft>
+                <a:spcPts val="200"/>
+              </a:spcAft>
+              <a:buFont typeface="Wingdings" panose="05000000000000000000" pitchFamily="2" charset="2"/>
+              <a:buChar char="q"/>
+            </a:pPr>
+            <a:r>
+              <a:rPr lang="en-US" sz="1600" dirty="0" smtClean="0">
+                <a:latin typeface="Arial" panose="020B0604020202020204" pitchFamily="34" charset="0"/>
+                <a:cs typeface="Arial" panose="020B0604020202020204" pitchFamily="34" charset="0"/>
+              </a:rPr>
+              <a:t>D3.js for graphs</a:t>
+            </a:r>
+          </a:p>
+          <a:p>
+            <a:pPr marL="342900" indent="-342900">
+              <a:lnSpc>
+                <a:spcPct val="150000"/>
+              </a:lnSpc>
+              <a:spcBef>
+                <a:spcPts val="200"/>
+              </a:spcBef>
+              <a:spcAft>
+                <a:spcPts val="200"/>
+              </a:spcAft>
+              <a:buFont typeface="Wingdings" panose="05000000000000000000" pitchFamily="2" charset="2"/>
+              <a:buChar char="q"/>
+            </a:pPr>
+            <a:r>
+              <a:rPr lang="en-US" sz="1600" dirty="0" smtClean="0">
+                <a:latin typeface="Arial" panose="020B0604020202020204" pitchFamily="34" charset="0"/>
+                <a:cs typeface="Arial" panose="020B0604020202020204" pitchFamily="34" charset="0"/>
+              </a:rPr>
+              <a:t>Back-end:</a:t>
+            </a:r>
+          </a:p>
+          <a:p>
+            <a:pPr marL="800100" lvl="1" indent="-342900">
+              <a:lnSpc>
+                <a:spcPct val="150000"/>
+              </a:lnSpc>
+              <a:spcBef>
+                <a:spcPts val="200"/>
+              </a:spcBef>
+              <a:spcAft>
+                <a:spcPts val="200"/>
+              </a:spcAft>
+              <a:buFont typeface="Wingdings" panose="05000000000000000000" pitchFamily="2" charset="2"/>
+              <a:buChar char="q"/>
+            </a:pPr>
+            <a:r>
+              <a:rPr lang="en-US" sz="1600" dirty="0" smtClean="0">
+                <a:latin typeface="Arial" panose="020B0604020202020204" pitchFamily="34" charset="0"/>
+                <a:cs typeface="Arial" panose="020B0604020202020204" pitchFamily="34" charset="0"/>
+              </a:rPr>
+              <a:t>Node.js</a:t>
+            </a:r>
+          </a:p>
+          <a:p>
+            <a:pPr marL="342900" indent="-342900">
+              <a:lnSpc>
+                <a:spcPct val="150000"/>
+              </a:lnSpc>
+              <a:spcBef>
+                <a:spcPts val="200"/>
+              </a:spcBef>
+              <a:spcAft>
+                <a:spcPts val="200"/>
+              </a:spcAft>
+              <a:buFont typeface="Wingdings" panose="05000000000000000000" pitchFamily="2" charset="2"/>
+              <a:buChar char="q"/>
+            </a:pPr>
+            <a:r>
+              <a:rPr lang="en-US" sz="1600" dirty="0" smtClean="0">
+                <a:latin typeface="Arial" panose="020B0604020202020204" pitchFamily="34" charset="0"/>
+                <a:cs typeface="Arial" panose="020B0604020202020204" pitchFamily="34" charset="0"/>
+              </a:rPr>
+              <a:t>Google Analytics for capturing the user statistics</a:t>
+            </a:r>
+          </a:p>
+          <a:p>
+            <a:pPr marL="342900" indent="-342900">
+              <a:lnSpc>
+                <a:spcPct val="150000"/>
+              </a:lnSpc>
+              <a:spcBef>
+                <a:spcPts val="200"/>
+              </a:spcBef>
+              <a:spcAft>
+                <a:spcPts val="200"/>
+              </a:spcAft>
+              <a:buFont typeface="Wingdings" panose="05000000000000000000" pitchFamily="2" charset="2"/>
+              <a:buChar char="q"/>
+            </a:pPr>
+            <a:r>
+              <a:rPr lang="en-US" sz="1600" dirty="0" err="1" smtClean="0">
+                <a:latin typeface="Arial" panose="020B0604020202020204" pitchFamily="34" charset="0"/>
+                <a:cs typeface="Arial" panose="020B0604020202020204" pitchFamily="34" charset="0"/>
+              </a:rPr>
+              <a:t>Github</a:t>
+            </a:r>
+            <a:r>
+              <a:rPr lang="en-US" sz="1600" dirty="0" smtClean="0">
+                <a:latin typeface="Arial" panose="020B0604020202020204" pitchFamily="34" charset="0"/>
+                <a:cs typeface="Arial" panose="020B0604020202020204" pitchFamily="34" charset="0"/>
+              </a:rPr>
+              <a:t> for version controlling the code</a:t>
+            </a:r>
+          </a:p>
+          <a:p>
+            <a:pPr marL="342900" indent="-342900">
+              <a:lnSpc>
+                <a:spcPct val="150000"/>
+              </a:lnSpc>
+              <a:spcBef>
+                <a:spcPts val="200"/>
+              </a:spcBef>
+              <a:spcAft>
+                <a:spcPts val="200"/>
+              </a:spcAft>
+              <a:buFont typeface="Wingdings" panose="05000000000000000000" pitchFamily="2" charset="2"/>
+              <a:buChar char="q"/>
+            </a:pPr>
+            <a:r>
+              <a:rPr lang="en-US" sz="1600" dirty="0" err="1" smtClean="0">
+                <a:latin typeface="Arial" panose="020B0604020202020204" pitchFamily="34" charset="0"/>
+                <a:cs typeface="Arial" panose="020B0604020202020204" pitchFamily="34" charset="0"/>
+              </a:rPr>
+              <a:t>Heroku</a:t>
+            </a:r>
+            <a:r>
+              <a:rPr lang="en-US" sz="1600" dirty="0" smtClean="0">
+                <a:latin typeface="Arial" panose="020B0604020202020204" pitchFamily="34" charset="0"/>
+                <a:cs typeface="Arial" panose="020B0604020202020204" pitchFamily="34" charset="0"/>
+              </a:rPr>
+              <a:t> for hosting the site</a:t>
+            </a:r>
+          </a:p>
+          <a:p>
+            <a:pPr marL="342900" indent="-342900">
+              <a:lnSpc>
+                <a:spcPct val="150000"/>
+              </a:lnSpc>
+              <a:spcBef>
+                <a:spcPts val="200"/>
+              </a:spcBef>
+              <a:spcAft>
+                <a:spcPts val="200"/>
+              </a:spcAft>
+              <a:buFont typeface="Wingdings" panose="05000000000000000000" pitchFamily="2" charset="2"/>
+              <a:buChar char="q"/>
+            </a:pPr>
+            <a:r>
+              <a:rPr lang="en-US" sz="1600" dirty="0" smtClean="0">
+                <a:latin typeface="Arial" panose="020B0604020202020204" pitchFamily="34" charset="0"/>
+                <a:cs typeface="Arial" panose="020B0604020202020204" pitchFamily="34" charset="0"/>
+              </a:rPr>
+              <a:t>Maven for building the application</a:t>
+            </a:r>
+            <a:endParaRPr lang="en-US" sz="1600" dirty="0"/>
+          </a:p>
+          <a:p>
+            <a:pPr marL="342900" indent="-342900">
+              <a:lnSpc>
+                <a:spcPct val="150000"/>
+              </a:lnSpc>
+              <a:spcBef>
+                <a:spcPts val="200"/>
+              </a:spcBef>
+              <a:spcAft>
+                <a:spcPts val="200"/>
+              </a:spcAft>
+              <a:buFont typeface="Wingdings" panose="05000000000000000000" pitchFamily="2" charset="2"/>
+              <a:buChar char="q"/>
+            </a:pPr>
+            <a:endParaRPr lang="en-US" sz="2000" dirty="0">
+              <a:latin typeface="Arial" panose="020B0604020202020204" pitchFamily="34" charset="0"/>
+              <a:cs typeface="Arial" panose="020B0604020202020204" pitchFamily="34" charset="0"/>
+            </a:endParaRPr>
+          </a:p>
+        </p:txBody>
+      </p:sp>
+    </p:spTree>
+    <p:extLst>
+      <p:ext uri="{BB962C8B-B14F-4D97-AF65-F5344CB8AC3E}">
+        <p14:creationId xmlns:p14="http://schemas.microsoft.com/office/powerpoint/2010/main" val="277357497"/>
+      </p:ext>
+    </p:extLst>
+  </p:cSld>
+  <p:clrMapOvr>
+    <a:masterClrMapping/>
+  </p:clrMapOvr>
+</p:sld>
+</file>
+
+<file path=ppt/slides/slide11.xml><?xml version="1.0" encoding="utf-8"?>
+<p:sld xmlns:a="http://schemas.openxmlformats.org/drawingml/2006/main" xmlns:r="http://schemas.openxmlformats.org/officeDocument/2006/relationships" xmlns:p="http://schemas.openxmlformats.org/presentationml/2006/main">
+  <p:cSld>
+    <p:spTree>
+      <p:nvGrpSpPr>
+        <p:cNvPr id="1" name=""/>
+        <p:cNvGrpSpPr/>
+        <p:nvPr/>
+      </p:nvGrpSpPr>
+      <p:grpSpPr>
+        <a:xfrm>
+          <a:off x="0" y="0"/>
+          <a:ext cx="0" cy="0"/>
+          <a:chOff x="0" y="0"/>
+          <a:chExt cx="0" cy="0"/>
+        </a:xfrm>
+      </p:grpSpPr>
+      <p:sp>
+        <p:nvSpPr>
+          <p:cNvPr id="2" name="Title 1"/>
+          <p:cNvSpPr>
+            <a:spLocks noGrp="1"/>
+          </p:cNvSpPr>
+          <p:nvPr>
+            <p:ph type="title"/>
+          </p:nvPr>
+        </p:nvSpPr>
+        <p:spPr>
+          <a:xfrm>
+            <a:off x="913775" y="618517"/>
+            <a:ext cx="10364451" cy="1016319"/>
+          </a:xfrm>
+        </p:spPr>
+        <p:txBody>
+          <a:bodyPr>
+            <a:normAutofit/>
+          </a:bodyPr>
+          <a:lstStyle/>
+          <a:p>
+            <a:pPr>
+              <a:lnSpc>
+                <a:spcPct val="150000"/>
+              </a:lnSpc>
+              <a:spcBef>
+                <a:spcPts val="200"/>
+              </a:spcBef>
+              <a:spcAft>
+                <a:spcPts val="200"/>
+              </a:spcAft>
+            </a:pPr>
+            <a:r>
+              <a:rPr lang="en-US" dirty="0">
+                <a:latin typeface="Arial" panose="020B0604020202020204" pitchFamily="34" charset="0"/>
+                <a:cs typeface="Arial" panose="020B0604020202020204" pitchFamily="34" charset="0"/>
+              </a:rPr>
+              <a:t>Schedule Management</a:t>
+            </a:r>
+          </a:p>
+        </p:txBody>
+      </p:sp>
+      <p:sp>
+        <p:nvSpPr>
+          <p:cNvPr id="6" name="TextBox 5"/>
+          <p:cNvSpPr txBox="1"/>
+          <p:nvPr/>
+        </p:nvSpPr>
+        <p:spPr>
+          <a:xfrm>
+            <a:off x="1191491" y="1911927"/>
+            <a:ext cx="9795164" cy="4980851"/>
+          </a:xfrm>
+          <a:prstGeom prst="rect">
+            <a:avLst/>
+          </a:prstGeom>
+          <a:noFill/>
+        </p:spPr>
+        <p:txBody>
+          <a:bodyPr wrap="square" rtlCol="0">
+            <a:spAutoFit/>
+          </a:bodyPr>
+          <a:lstStyle/>
+          <a:p>
+            <a:r>
+              <a:rPr lang="en-US" sz="2000" dirty="0" smtClean="0">
+                <a:latin typeface="Arial" panose="020B0604020202020204" pitchFamily="34" charset="0"/>
+                <a:cs typeface="Arial" panose="020B0604020202020204" pitchFamily="34" charset="0"/>
+              </a:rPr>
+              <a:t>Here are a set of front-end and back-end tools used for developing the application:</a:t>
+            </a:r>
+          </a:p>
+          <a:p>
+            <a:endParaRPr lang="en-US" sz="2000" dirty="0">
+              <a:latin typeface="Arial" panose="020B0604020202020204" pitchFamily="34" charset="0"/>
+              <a:cs typeface="Arial" panose="020B0604020202020204" pitchFamily="34" charset="0"/>
+            </a:endParaRPr>
+          </a:p>
+          <a:p>
+            <a:pPr marL="342900" indent="-342900">
+              <a:lnSpc>
+                <a:spcPct val="150000"/>
+              </a:lnSpc>
+              <a:spcBef>
+                <a:spcPts val="200"/>
+              </a:spcBef>
+              <a:spcAft>
+                <a:spcPts val="200"/>
+              </a:spcAft>
+              <a:buFont typeface="Wingdings" panose="05000000000000000000" pitchFamily="2" charset="2"/>
+              <a:buChar char="q"/>
+            </a:pPr>
+            <a:r>
+              <a:rPr lang="en-US" sz="1600" dirty="0" smtClean="0">
+                <a:latin typeface="Arial" panose="020B0604020202020204" pitchFamily="34" charset="0"/>
+                <a:cs typeface="Arial" panose="020B0604020202020204" pitchFamily="34" charset="0"/>
+              </a:rPr>
+              <a:t>Front-end:</a:t>
+            </a:r>
+          </a:p>
+          <a:p>
+            <a:pPr marL="800100" lvl="1" indent="-342900">
+              <a:lnSpc>
+                <a:spcPct val="150000"/>
+              </a:lnSpc>
+              <a:spcBef>
+                <a:spcPts val="200"/>
+              </a:spcBef>
+              <a:spcAft>
+                <a:spcPts val="200"/>
+              </a:spcAft>
+              <a:buFont typeface="Wingdings" panose="05000000000000000000" pitchFamily="2" charset="2"/>
+              <a:buChar char="q"/>
+            </a:pPr>
+            <a:r>
+              <a:rPr lang="en-US" sz="1600" dirty="0" smtClean="0">
+                <a:latin typeface="Arial" panose="020B0604020202020204" pitchFamily="34" charset="0"/>
+                <a:cs typeface="Arial" panose="020B0604020202020204" pitchFamily="34" charset="0"/>
+              </a:rPr>
+              <a:t>Angular Framework(HTML/CSS/Typescript)</a:t>
+            </a:r>
+          </a:p>
+          <a:p>
+            <a:pPr marL="800100" lvl="1" indent="-342900">
+              <a:lnSpc>
+                <a:spcPct val="150000"/>
+              </a:lnSpc>
+              <a:spcBef>
+                <a:spcPts val="200"/>
+              </a:spcBef>
+              <a:spcAft>
+                <a:spcPts val="200"/>
+              </a:spcAft>
+              <a:buFont typeface="Wingdings" panose="05000000000000000000" pitchFamily="2" charset="2"/>
+              <a:buChar char="q"/>
+            </a:pPr>
+            <a:r>
+              <a:rPr lang="en-US" sz="1600" dirty="0" smtClean="0">
+                <a:latin typeface="Arial" panose="020B0604020202020204" pitchFamily="34" charset="0"/>
+                <a:cs typeface="Arial" panose="020B0604020202020204" pitchFamily="34" charset="0"/>
+              </a:rPr>
+              <a:t>D3.js for graphs</a:t>
+            </a:r>
+          </a:p>
+          <a:p>
+            <a:pPr marL="342900" indent="-342900">
+              <a:lnSpc>
+                <a:spcPct val="150000"/>
+              </a:lnSpc>
+              <a:spcBef>
+                <a:spcPts val="200"/>
+              </a:spcBef>
+              <a:spcAft>
+                <a:spcPts val="200"/>
+              </a:spcAft>
+              <a:buFont typeface="Wingdings" panose="05000000000000000000" pitchFamily="2" charset="2"/>
+              <a:buChar char="q"/>
+            </a:pPr>
+            <a:r>
+              <a:rPr lang="en-US" sz="1600" dirty="0" smtClean="0">
+                <a:latin typeface="Arial" panose="020B0604020202020204" pitchFamily="34" charset="0"/>
+                <a:cs typeface="Arial" panose="020B0604020202020204" pitchFamily="34" charset="0"/>
+              </a:rPr>
+              <a:t>Back-end:</a:t>
+            </a:r>
+          </a:p>
+          <a:p>
+            <a:pPr marL="800100" lvl="1" indent="-342900">
+              <a:lnSpc>
+                <a:spcPct val="150000"/>
+              </a:lnSpc>
+              <a:spcBef>
+                <a:spcPts val="200"/>
+              </a:spcBef>
+              <a:spcAft>
+                <a:spcPts val="200"/>
+              </a:spcAft>
+              <a:buFont typeface="Wingdings" panose="05000000000000000000" pitchFamily="2" charset="2"/>
+              <a:buChar char="q"/>
+            </a:pPr>
+            <a:r>
+              <a:rPr lang="en-US" sz="1600" dirty="0" smtClean="0">
+                <a:latin typeface="Arial" panose="020B0604020202020204" pitchFamily="34" charset="0"/>
+                <a:cs typeface="Arial" panose="020B0604020202020204" pitchFamily="34" charset="0"/>
+              </a:rPr>
+              <a:t>Node.js</a:t>
+            </a:r>
+          </a:p>
+          <a:p>
+            <a:pPr marL="342900" indent="-342900">
+              <a:lnSpc>
+                <a:spcPct val="150000"/>
+              </a:lnSpc>
+              <a:spcBef>
+                <a:spcPts val="200"/>
+              </a:spcBef>
+              <a:spcAft>
+                <a:spcPts val="200"/>
+              </a:spcAft>
+              <a:buFont typeface="Wingdings" panose="05000000000000000000" pitchFamily="2" charset="2"/>
+              <a:buChar char="q"/>
+            </a:pPr>
+            <a:r>
+              <a:rPr lang="en-US" sz="1600" dirty="0" smtClean="0">
+                <a:latin typeface="Arial" panose="020B0604020202020204" pitchFamily="34" charset="0"/>
+                <a:cs typeface="Arial" panose="020B0604020202020204" pitchFamily="34" charset="0"/>
+              </a:rPr>
+              <a:t>Google Analytics for capturing the user statistics</a:t>
+            </a:r>
+          </a:p>
+          <a:p>
+            <a:pPr marL="342900" indent="-342900">
+              <a:lnSpc>
+                <a:spcPct val="150000"/>
+              </a:lnSpc>
+              <a:spcBef>
+                <a:spcPts val="200"/>
+              </a:spcBef>
+              <a:spcAft>
+                <a:spcPts val="200"/>
+              </a:spcAft>
+              <a:buFont typeface="Wingdings" panose="05000000000000000000" pitchFamily="2" charset="2"/>
+              <a:buChar char="q"/>
+            </a:pPr>
+            <a:r>
+              <a:rPr lang="en-US" sz="1600" dirty="0" err="1" smtClean="0">
+                <a:latin typeface="Arial" panose="020B0604020202020204" pitchFamily="34" charset="0"/>
+                <a:cs typeface="Arial" panose="020B0604020202020204" pitchFamily="34" charset="0"/>
+              </a:rPr>
+              <a:t>Github</a:t>
+            </a:r>
+            <a:r>
+              <a:rPr lang="en-US" sz="1600" dirty="0" smtClean="0">
+                <a:latin typeface="Arial" panose="020B0604020202020204" pitchFamily="34" charset="0"/>
+                <a:cs typeface="Arial" panose="020B0604020202020204" pitchFamily="34" charset="0"/>
+              </a:rPr>
+              <a:t> for version controlling the code</a:t>
+            </a:r>
+          </a:p>
+          <a:p>
+            <a:pPr marL="342900" indent="-342900">
+              <a:lnSpc>
+                <a:spcPct val="150000"/>
+              </a:lnSpc>
+              <a:spcBef>
+                <a:spcPts val="200"/>
+              </a:spcBef>
+              <a:spcAft>
+                <a:spcPts val="200"/>
+              </a:spcAft>
+              <a:buFont typeface="Wingdings" panose="05000000000000000000" pitchFamily="2" charset="2"/>
+              <a:buChar char="q"/>
+            </a:pPr>
+            <a:r>
+              <a:rPr lang="en-US" sz="1600" dirty="0" err="1" smtClean="0">
+                <a:latin typeface="Arial" panose="020B0604020202020204" pitchFamily="34" charset="0"/>
+                <a:cs typeface="Arial" panose="020B0604020202020204" pitchFamily="34" charset="0"/>
+              </a:rPr>
+              <a:t>Heroku</a:t>
+            </a:r>
+            <a:r>
+              <a:rPr lang="en-US" sz="1600" dirty="0" smtClean="0">
+                <a:latin typeface="Arial" panose="020B0604020202020204" pitchFamily="34" charset="0"/>
+                <a:cs typeface="Arial" panose="020B0604020202020204" pitchFamily="34" charset="0"/>
+              </a:rPr>
+              <a:t> for hosting the site</a:t>
+            </a:r>
+          </a:p>
+          <a:p>
+            <a:pPr marL="342900" indent="-342900">
+              <a:lnSpc>
+                <a:spcPct val="150000"/>
+              </a:lnSpc>
+              <a:spcBef>
+                <a:spcPts val="200"/>
+              </a:spcBef>
+              <a:spcAft>
+                <a:spcPts val="200"/>
+              </a:spcAft>
+              <a:buFont typeface="Wingdings" panose="05000000000000000000" pitchFamily="2" charset="2"/>
+              <a:buChar char="q"/>
+            </a:pPr>
+            <a:r>
+              <a:rPr lang="en-US" sz="1600" dirty="0" smtClean="0">
+                <a:latin typeface="Arial" panose="020B0604020202020204" pitchFamily="34" charset="0"/>
+                <a:cs typeface="Arial" panose="020B0604020202020204" pitchFamily="34" charset="0"/>
+              </a:rPr>
+              <a:t>Maven for building the application</a:t>
+            </a:r>
+            <a:endParaRPr lang="en-US" sz="1600" dirty="0"/>
+          </a:p>
+          <a:p>
+            <a:pPr marL="342900" indent="-342900">
+              <a:lnSpc>
+                <a:spcPct val="150000"/>
+              </a:lnSpc>
+              <a:spcBef>
+                <a:spcPts val="200"/>
+              </a:spcBef>
+              <a:spcAft>
+                <a:spcPts val="200"/>
+              </a:spcAft>
+              <a:buFont typeface="Wingdings" panose="05000000000000000000" pitchFamily="2" charset="2"/>
+              <a:buChar char="q"/>
+            </a:pPr>
+            <a:endParaRPr lang="en-US" sz="2000" dirty="0">
+              <a:latin typeface="Arial" panose="020B0604020202020204" pitchFamily="34" charset="0"/>
+              <a:cs typeface="Arial" panose="020B0604020202020204" pitchFamily="34" charset="0"/>
+            </a:endParaRPr>
+          </a:p>
+        </p:txBody>
+      </p:sp>
+    </p:spTree>
+    <p:extLst>
+      <p:ext uri="{BB962C8B-B14F-4D97-AF65-F5344CB8AC3E}">
+        <p14:creationId xmlns:p14="http://schemas.microsoft.com/office/powerpoint/2010/main" val="313057912"/>
+      </p:ext>
+    </p:extLst>
+  </p:cSld>
+  <p:clrMapOvr>
+    <a:masterClrMapping/>
+  </p:clrMapOvr>
+</p:sld>
+</file>
+
+<file path=ppt/slides/slide12.xml><?xml version="1.0" encoding="utf-8"?>
+<p:sld xmlns:a="http://schemas.openxmlformats.org/drawingml/2006/main" xmlns:r="http://schemas.openxmlformats.org/officeDocument/2006/relationships" xmlns:p="http://schemas.openxmlformats.org/presentationml/2006/main">
+  <p:cSld>
+    <p:spTree>
+      <p:nvGrpSpPr>
+        <p:cNvPr id="1" name=""/>
+        <p:cNvGrpSpPr/>
+        <p:nvPr/>
+      </p:nvGrpSpPr>
+      <p:grpSpPr>
+        <a:xfrm>
+          <a:off x="0" y="0"/>
+          <a:ext cx="0" cy="0"/>
+          <a:chOff x="0" y="0"/>
+          <a:chExt cx="0" cy="0"/>
+        </a:xfrm>
+      </p:grpSpPr>
+      <p:sp>
+        <p:nvSpPr>
+          <p:cNvPr id="2" name="Title 1"/>
+          <p:cNvSpPr>
+            <a:spLocks noGrp="1"/>
+          </p:cNvSpPr>
+          <p:nvPr>
+            <p:ph type="title"/>
+          </p:nvPr>
+        </p:nvSpPr>
+        <p:spPr>
+          <a:xfrm>
+            <a:off x="913775" y="618517"/>
+            <a:ext cx="10364451" cy="1016319"/>
+          </a:xfrm>
+        </p:spPr>
+        <p:txBody>
+          <a:bodyPr>
+            <a:normAutofit/>
+          </a:bodyPr>
+          <a:lstStyle/>
+          <a:p>
+            <a:pPr>
+              <a:lnSpc>
+                <a:spcPct val="150000"/>
+              </a:lnSpc>
+              <a:spcBef>
+                <a:spcPts val="200"/>
+              </a:spcBef>
+              <a:spcAft>
+                <a:spcPts val="200"/>
+              </a:spcAft>
+            </a:pPr>
+            <a:r>
+              <a:rPr lang="en-US" dirty="0">
+                <a:latin typeface="Arial" panose="020B0604020202020204" pitchFamily="34" charset="0"/>
+                <a:cs typeface="Arial" panose="020B0604020202020204" pitchFamily="34" charset="0"/>
+              </a:rPr>
+              <a:t>Cost Estimation</a:t>
+            </a:r>
+          </a:p>
+        </p:txBody>
+      </p:sp>
+      <p:sp>
+        <p:nvSpPr>
+          <p:cNvPr id="6" name="TextBox 5"/>
+          <p:cNvSpPr txBox="1"/>
+          <p:nvPr/>
+        </p:nvSpPr>
+        <p:spPr>
+          <a:xfrm>
+            <a:off x="1191491" y="1911927"/>
+            <a:ext cx="9795164" cy="4980851"/>
+          </a:xfrm>
+          <a:prstGeom prst="rect">
+            <a:avLst/>
+          </a:prstGeom>
+          <a:noFill/>
+        </p:spPr>
+        <p:txBody>
+          <a:bodyPr wrap="square" rtlCol="0">
+            <a:spAutoFit/>
+          </a:bodyPr>
+          <a:lstStyle/>
+          <a:p>
+            <a:r>
+              <a:rPr lang="en-US" sz="2000" dirty="0" smtClean="0">
+                <a:latin typeface="Arial" panose="020B0604020202020204" pitchFamily="34" charset="0"/>
+                <a:cs typeface="Arial" panose="020B0604020202020204" pitchFamily="34" charset="0"/>
+              </a:rPr>
+              <a:t>Here are a set of front-end and back-end tools used for developing the application:</a:t>
+            </a:r>
+          </a:p>
+          <a:p>
+            <a:endParaRPr lang="en-US" sz="2000" dirty="0">
+              <a:latin typeface="Arial" panose="020B0604020202020204" pitchFamily="34" charset="0"/>
+              <a:cs typeface="Arial" panose="020B0604020202020204" pitchFamily="34" charset="0"/>
+            </a:endParaRPr>
+          </a:p>
+          <a:p>
+            <a:pPr marL="342900" indent="-342900">
+              <a:lnSpc>
+                <a:spcPct val="150000"/>
+              </a:lnSpc>
+              <a:spcBef>
+                <a:spcPts val="200"/>
+              </a:spcBef>
+              <a:spcAft>
+                <a:spcPts val="200"/>
+              </a:spcAft>
+              <a:buFont typeface="Wingdings" panose="05000000000000000000" pitchFamily="2" charset="2"/>
+              <a:buChar char="q"/>
+            </a:pPr>
+            <a:r>
+              <a:rPr lang="en-US" sz="1600" dirty="0" smtClean="0">
+                <a:latin typeface="Arial" panose="020B0604020202020204" pitchFamily="34" charset="0"/>
+                <a:cs typeface="Arial" panose="020B0604020202020204" pitchFamily="34" charset="0"/>
+              </a:rPr>
+              <a:t>Front-end:</a:t>
+            </a:r>
+          </a:p>
+          <a:p>
+            <a:pPr marL="800100" lvl="1" indent="-342900">
+              <a:lnSpc>
+                <a:spcPct val="150000"/>
+              </a:lnSpc>
+              <a:spcBef>
+                <a:spcPts val="200"/>
+              </a:spcBef>
+              <a:spcAft>
+                <a:spcPts val="200"/>
+              </a:spcAft>
+              <a:buFont typeface="Wingdings" panose="05000000000000000000" pitchFamily="2" charset="2"/>
+              <a:buChar char="q"/>
+            </a:pPr>
+            <a:r>
+              <a:rPr lang="en-US" sz="1600" dirty="0" smtClean="0">
+                <a:latin typeface="Arial" panose="020B0604020202020204" pitchFamily="34" charset="0"/>
+                <a:cs typeface="Arial" panose="020B0604020202020204" pitchFamily="34" charset="0"/>
+              </a:rPr>
+              <a:t>Angular Framework(HTML/CSS/Typescript)</a:t>
+            </a:r>
+          </a:p>
+          <a:p>
+            <a:pPr marL="800100" lvl="1" indent="-342900">
+              <a:lnSpc>
+                <a:spcPct val="150000"/>
+              </a:lnSpc>
+              <a:spcBef>
+                <a:spcPts val="200"/>
+              </a:spcBef>
+              <a:spcAft>
+                <a:spcPts val="200"/>
+              </a:spcAft>
+              <a:buFont typeface="Wingdings" panose="05000000000000000000" pitchFamily="2" charset="2"/>
+              <a:buChar char="q"/>
+            </a:pPr>
+            <a:r>
+              <a:rPr lang="en-US" sz="1600" dirty="0" smtClean="0">
+                <a:latin typeface="Arial" panose="020B0604020202020204" pitchFamily="34" charset="0"/>
+                <a:cs typeface="Arial" panose="020B0604020202020204" pitchFamily="34" charset="0"/>
+              </a:rPr>
+              <a:t>D3.js for graphs</a:t>
+            </a:r>
+          </a:p>
+          <a:p>
+            <a:pPr marL="342900" indent="-342900">
+              <a:lnSpc>
+                <a:spcPct val="150000"/>
+              </a:lnSpc>
+              <a:spcBef>
+                <a:spcPts val="200"/>
+              </a:spcBef>
+              <a:spcAft>
+                <a:spcPts val="200"/>
+              </a:spcAft>
+              <a:buFont typeface="Wingdings" panose="05000000000000000000" pitchFamily="2" charset="2"/>
+              <a:buChar char="q"/>
+            </a:pPr>
+            <a:r>
+              <a:rPr lang="en-US" sz="1600" dirty="0" smtClean="0">
+                <a:latin typeface="Arial" panose="020B0604020202020204" pitchFamily="34" charset="0"/>
+                <a:cs typeface="Arial" panose="020B0604020202020204" pitchFamily="34" charset="0"/>
+              </a:rPr>
+              <a:t>Back-end:</a:t>
+            </a:r>
+          </a:p>
+          <a:p>
+            <a:pPr marL="800100" lvl="1" indent="-342900">
+              <a:lnSpc>
+                <a:spcPct val="150000"/>
+              </a:lnSpc>
+              <a:spcBef>
+                <a:spcPts val="200"/>
+              </a:spcBef>
+              <a:spcAft>
+                <a:spcPts val="200"/>
+              </a:spcAft>
+              <a:buFont typeface="Wingdings" panose="05000000000000000000" pitchFamily="2" charset="2"/>
+              <a:buChar char="q"/>
+            </a:pPr>
+            <a:r>
+              <a:rPr lang="en-US" sz="1600" dirty="0" smtClean="0">
+                <a:latin typeface="Arial" panose="020B0604020202020204" pitchFamily="34" charset="0"/>
+                <a:cs typeface="Arial" panose="020B0604020202020204" pitchFamily="34" charset="0"/>
+              </a:rPr>
+              <a:t>Node.js</a:t>
+            </a:r>
+          </a:p>
+          <a:p>
+            <a:pPr marL="342900" indent="-342900">
+              <a:lnSpc>
+                <a:spcPct val="150000"/>
+              </a:lnSpc>
+              <a:spcBef>
+                <a:spcPts val="200"/>
+              </a:spcBef>
+              <a:spcAft>
+                <a:spcPts val="200"/>
+              </a:spcAft>
+              <a:buFont typeface="Wingdings" panose="05000000000000000000" pitchFamily="2" charset="2"/>
+              <a:buChar char="q"/>
+            </a:pPr>
+            <a:r>
+              <a:rPr lang="en-US" sz="1600" dirty="0" smtClean="0">
+                <a:latin typeface="Arial" panose="020B0604020202020204" pitchFamily="34" charset="0"/>
+                <a:cs typeface="Arial" panose="020B0604020202020204" pitchFamily="34" charset="0"/>
+              </a:rPr>
+              <a:t>Google Analytics for capturing the user statistics</a:t>
+            </a:r>
+          </a:p>
+          <a:p>
+            <a:pPr marL="342900" indent="-342900">
+              <a:lnSpc>
+                <a:spcPct val="150000"/>
+              </a:lnSpc>
+              <a:spcBef>
+                <a:spcPts val="200"/>
+              </a:spcBef>
+              <a:spcAft>
+                <a:spcPts val="200"/>
+              </a:spcAft>
+              <a:buFont typeface="Wingdings" panose="05000000000000000000" pitchFamily="2" charset="2"/>
+              <a:buChar char="q"/>
+            </a:pPr>
+            <a:r>
+              <a:rPr lang="en-US" sz="1600" dirty="0" err="1" smtClean="0">
+                <a:latin typeface="Arial" panose="020B0604020202020204" pitchFamily="34" charset="0"/>
+                <a:cs typeface="Arial" panose="020B0604020202020204" pitchFamily="34" charset="0"/>
+              </a:rPr>
+              <a:t>Github</a:t>
+            </a:r>
+            <a:r>
+              <a:rPr lang="en-US" sz="1600" dirty="0" smtClean="0">
+                <a:latin typeface="Arial" panose="020B0604020202020204" pitchFamily="34" charset="0"/>
+                <a:cs typeface="Arial" panose="020B0604020202020204" pitchFamily="34" charset="0"/>
+              </a:rPr>
+              <a:t> for version controlling the code</a:t>
+            </a:r>
+          </a:p>
+          <a:p>
+            <a:pPr marL="342900" indent="-342900">
+              <a:lnSpc>
+                <a:spcPct val="150000"/>
+              </a:lnSpc>
+              <a:spcBef>
+                <a:spcPts val="200"/>
+              </a:spcBef>
+              <a:spcAft>
+                <a:spcPts val="200"/>
+              </a:spcAft>
+              <a:buFont typeface="Wingdings" panose="05000000000000000000" pitchFamily="2" charset="2"/>
+              <a:buChar char="q"/>
+            </a:pPr>
+            <a:r>
+              <a:rPr lang="en-US" sz="1600" dirty="0" err="1" smtClean="0">
+                <a:latin typeface="Arial" panose="020B0604020202020204" pitchFamily="34" charset="0"/>
+                <a:cs typeface="Arial" panose="020B0604020202020204" pitchFamily="34" charset="0"/>
+              </a:rPr>
+              <a:t>Heroku</a:t>
+            </a:r>
+            <a:r>
+              <a:rPr lang="en-US" sz="1600" dirty="0" smtClean="0">
+                <a:latin typeface="Arial" panose="020B0604020202020204" pitchFamily="34" charset="0"/>
+                <a:cs typeface="Arial" panose="020B0604020202020204" pitchFamily="34" charset="0"/>
+              </a:rPr>
+              <a:t> for hosting the site</a:t>
+            </a:r>
+          </a:p>
+          <a:p>
+            <a:pPr marL="342900" indent="-342900">
+              <a:lnSpc>
+                <a:spcPct val="150000"/>
+              </a:lnSpc>
+              <a:spcBef>
+                <a:spcPts val="200"/>
+              </a:spcBef>
+              <a:spcAft>
+                <a:spcPts val="200"/>
+              </a:spcAft>
+              <a:buFont typeface="Wingdings" panose="05000000000000000000" pitchFamily="2" charset="2"/>
+              <a:buChar char="q"/>
+            </a:pPr>
+            <a:r>
+              <a:rPr lang="en-US" sz="1600" dirty="0" smtClean="0">
+                <a:latin typeface="Arial" panose="020B0604020202020204" pitchFamily="34" charset="0"/>
+                <a:cs typeface="Arial" panose="020B0604020202020204" pitchFamily="34" charset="0"/>
+              </a:rPr>
+              <a:t>Maven for building the application</a:t>
+            </a:r>
+            <a:endParaRPr lang="en-US" sz="1600" dirty="0"/>
+          </a:p>
+          <a:p>
+            <a:pPr marL="342900" indent="-342900">
+              <a:lnSpc>
+                <a:spcPct val="150000"/>
+              </a:lnSpc>
+              <a:spcBef>
+                <a:spcPts val="200"/>
+              </a:spcBef>
+              <a:spcAft>
+                <a:spcPts val="200"/>
+              </a:spcAft>
+              <a:buFont typeface="Wingdings" panose="05000000000000000000" pitchFamily="2" charset="2"/>
+              <a:buChar char="q"/>
+            </a:pPr>
+            <a:endParaRPr lang="en-US" sz="2000" dirty="0">
+              <a:latin typeface="Arial" panose="020B0604020202020204" pitchFamily="34" charset="0"/>
+              <a:cs typeface="Arial" panose="020B0604020202020204" pitchFamily="34" charset="0"/>
+            </a:endParaRPr>
+          </a:p>
+        </p:txBody>
+      </p:sp>
+    </p:spTree>
+    <p:extLst>
+      <p:ext uri="{BB962C8B-B14F-4D97-AF65-F5344CB8AC3E}">
+        <p14:creationId xmlns:p14="http://schemas.microsoft.com/office/powerpoint/2010/main" val="1807270961"/>
+      </p:ext>
+    </p:extLst>
+  </p:cSld>
+  <p:clrMapOvr>
+    <a:masterClrMapping/>
+  </p:clrMapOvr>
+</p:sld>
+</file>
+
+<file path=ppt/slides/slide13.xml><?xml version="1.0" encoding="utf-8"?>
+<p:sld xmlns:a="http://schemas.openxmlformats.org/drawingml/2006/main" xmlns:r="http://schemas.openxmlformats.org/officeDocument/2006/relationships" xmlns:p="http://schemas.openxmlformats.org/presentationml/2006/main">
+  <p:cSld>
+    <p:spTree>
+      <p:nvGrpSpPr>
+        <p:cNvPr id="1" name=""/>
+        <p:cNvGrpSpPr/>
+        <p:nvPr/>
+      </p:nvGrpSpPr>
+      <p:grpSpPr>
+        <a:xfrm>
+          <a:off x="0" y="0"/>
+          <a:ext cx="0" cy="0"/>
+          <a:chOff x="0" y="0"/>
+          <a:chExt cx="0" cy="0"/>
+        </a:xfrm>
+      </p:grpSpPr>
+      <p:sp>
+        <p:nvSpPr>
+          <p:cNvPr id="2" name="Title 1"/>
+          <p:cNvSpPr>
+            <a:spLocks noGrp="1"/>
+          </p:cNvSpPr>
+          <p:nvPr>
+            <p:ph type="title"/>
+          </p:nvPr>
+        </p:nvSpPr>
+        <p:spPr>
+          <a:xfrm>
+            <a:off x="913775" y="618517"/>
+            <a:ext cx="10364451" cy="1016319"/>
+          </a:xfrm>
+        </p:spPr>
+        <p:txBody>
+          <a:bodyPr>
+            <a:normAutofit/>
+          </a:bodyPr>
+          <a:lstStyle/>
+          <a:p>
+            <a:pPr>
+              <a:lnSpc>
+                <a:spcPct val="150000"/>
+              </a:lnSpc>
+              <a:spcBef>
+                <a:spcPts val="200"/>
+              </a:spcBef>
+              <a:spcAft>
+                <a:spcPts val="200"/>
+              </a:spcAft>
+            </a:pPr>
+            <a:r>
+              <a:rPr lang="en-US" dirty="0">
+                <a:latin typeface="Arial" panose="020B0604020202020204" pitchFamily="34" charset="0"/>
+                <a:cs typeface="Arial" panose="020B0604020202020204" pitchFamily="34" charset="0"/>
+              </a:rPr>
+              <a:t>Project Management </a:t>
+            </a:r>
+            <a:r>
+              <a:rPr lang="en-US" dirty="0" smtClean="0">
+                <a:latin typeface="Arial" panose="020B0604020202020204" pitchFamily="34" charset="0"/>
+                <a:cs typeface="Arial" panose="020B0604020202020204" pitchFamily="34" charset="0"/>
+              </a:rPr>
+              <a:t>Plan(Cont..)</a:t>
+            </a:r>
+            <a:endParaRPr lang="en-US" dirty="0">
+              <a:latin typeface="Arial" panose="020B0604020202020204" pitchFamily="34" charset="0"/>
+              <a:cs typeface="Arial" panose="020B0604020202020204" pitchFamily="34" charset="0"/>
+            </a:endParaRPr>
+          </a:p>
+        </p:txBody>
+      </p:sp>
+      <p:sp>
+        <p:nvSpPr>
+          <p:cNvPr id="3" name="Rectangle 2"/>
+          <p:cNvSpPr/>
+          <p:nvPr/>
+        </p:nvSpPr>
+        <p:spPr>
+          <a:xfrm>
+            <a:off x="1724297" y="1972491"/>
+            <a:ext cx="7419703" cy="456535"/>
+          </a:xfrm>
+          <a:prstGeom prst="rect">
+            <a:avLst/>
+          </a:prstGeom>
+        </p:spPr>
+        <p:txBody>
+          <a:bodyPr wrap="square">
+            <a:spAutoFit/>
+          </a:bodyPr>
+          <a:lstStyle/>
+          <a:p>
+            <a:pPr marL="342900" indent="-342900">
+              <a:lnSpc>
+                <a:spcPct val="150000"/>
+              </a:lnSpc>
+              <a:spcBef>
+                <a:spcPts val="200"/>
+              </a:spcBef>
+              <a:spcAft>
+                <a:spcPts val="200"/>
+              </a:spcAft>
+              <a:buFont typeface="Wingdings" panose="05000000000000000000" pitchFamily="2" charset="2"/>
+              <a:buChar char="q"/>
+            </a:pPr>
+            <a:r>
+              <a:rPr lang="en-US" dirty="0">
+                <a:latin typeface="Arial" panose="020B0604020202020204" pitchFamily="34" charset="0"/>
+                <a:cs typeface="Arial" panose="020B0604020202020204" pitchFamily="34" charset="0"/>
+              </a:rPr>
+              <a:t>Communication </a:t>
+            </a:r>
+            <a:r>
+              <a:rPr lang="en-US" dirty="0" smtClean="0">
+                <a:latin typeface="Arial" panose="020B0604020202020204" pitchFamily="34" charset="0"/>
+                <a:cs typeface="Arial" panose="020B0604020202020204" pitchFamily="34" charset="0"/>
+              </a:rPr>
+              <a:t>Management</a:t>
+            </a:r>
+            <a:endParaRPr lang="en-US" dirty="0">
+              <a:latin typeface="Arial" panose="020B0604020202020204" pitchFamily="34" charset="0"/>
+              <a:cs typeface="Arial" panose="020B0604020202020204" pitchFamily="34" charset="0"/>
+            </a:endParaRPr>
+          </a:p>
+        </p:txBody>
+      </p:sp>
+      <p:sp>
+        <p:nvSpPr>
+          <p:cNvPr id="4" name="TextBox 3"/>
+          <p:cNvSpPr txBox="1"/>
+          <p:nvPr/>
+        </p:nvSpPr>
+        <p:spPr>
+          <a:xfrm>
+            <a:off x="6746421" y="2103067"/>
+            <a:ext cx="2782389" cy="646331"/>
+          </a:xfrm>
+          <a:prstGeom prst="rect">
+            <a:avLst/>
+          </a:prstGeom>
+          <a:noFill/>
+        </p:spPr>
+        <p:txBody>
+          <a:bodyPr wrap="square" rtlCol="0">
+            <a:spAutoFit/>
+          </a:bodyPr>
+          <a:lstStyle/>
+          <a:p>
+            <a:pPr marL="285750" indent="-285750">
+              <a:buFont typeface="Wingdings" panose="05000000000000000000" pitchFamily="2" charset="2"/>
+              <a:buChar char="q"/>
+            </a:pPr>
+            <a:r>
+              <a:rPr lang="en-US" dirty="0">
+                <a:latin typeface="Arial" panose="020B0604020202020204" pitchFamily="34" charset="0"/>
+                <a:cs typeface="Arial" panose="020B0604020202020204" pitchFamily="34" charset="0"/>
+              </a:rPr>
+              <a:t>Risk Management</a:t>
+            </a:r>
+          </a:p>
+          <a:p>
+            <a:endParaRPr lang="en-US" dirty="0"/>
+          </a:p>
+        </p:txBody>
+      </p:sp>
+      <p:pic>
+        <p:nvPicPr>
+          <p:cNvPr id="5" name="Picture 4"/>
+          <p:cNvPicPr>
+            <a:picLocks noChangeAspect="1"/>
+          </p:cNvPicPr>
+          <p:nvPr/>
+        </p:nvPicPr>
+        <p:blipFill>
+          <a:blip r:embed="rId2">
+            <a:extLst>
+              <a:ext uri="{28A0092B-C50C-407E-A947-70E740481C1C}">
+                <a14:useLocalDpi xmlns:a14="http://schemas.microsoft.com/office/drawing/2010/main" val="0"/>
+              </a:ext>
+            </a:extLst>
+          </a:blip>
+          <a:stretch>
+            <a:fillRect/>
+          </a:stretch>
+        </p:blipFill>
+        <p:spPr>
+          <a:xfrm>
+            <a:off x="1724297" y="3069771"/>
+            <a:ext cx="4215828" cy="2917695"/>
+          </a:xfrm>
+          <a:prstGeom prst="rect">
+            <a:avLst/>
+          </a:prstGeom>
+        </p:spPr>
+      </p:pic>
+      <p:pic>
+        <p:nvPicPr>
+          <p:cNvPr id="7" name="Picture 6"/>
+          <p:cNvPicPr>
+            <a:picLocks noChangeAspect="1"/>
+          </p:cNvPicPr>
+          <p:nvPr/>
+        </p:nvPicPr>
+        <p:blipFill>
+          <a:blip r:embed="rId3">
+            <a:extLst>
+              <a:ext uri="{28A0092B-C50C-407E-A947-70E740481C1C}">
+                <a14:useLocalDpi xmlns:a14="http://schemas.microsoft.com/office/drawing/2010/main" val="0"/>
+              </a:ext>
+            </a:extLst>
+          </a:blip>
+          <a:stretch>
+            <a:fillRect/>
+          </a:stretch>
+        </p:blipFill>
+        <p:spPr>
+          <a:xfrm>
+            <a:off x="6746421" y="3019128"/>
+            <a:ext cx="3978184" cy="2968337"/>
+          </a:xfrm>
+          <a:prstGeom prst="rect">
+            <a:avLst/>
+          </a:prstGeom>
+        </p:spPr>
+      </p:pic>
+    </p:spTree>
+    <p:extLst>
+      <p:ext uri="{BB962C8B-B14F-4D97-AF65-F5344CB8AC3E}">
+        <p14:creationId xmlns:p14="http://schemas.microsoft.com/office/powerpoint/2010/main" val="3799301634"/>
+      </p:ext>
+    </p:extLst>
+  </p:cSld>
+  <p:clrMapOvr>
+    <a:masterClrMapping/>
+  </p:clrMapOvr>
+</p:sld>
+</file>
+
+<file path=ppt/slides/slide14.xml><?xml version="1.0" encoding="utf-8"?>
+<p:sld xmlns:a="http://schemas.openxmlformats.org/drawingml/2006/main" xmlns:r="http://schemas.openxmlformats.org/officeDocument/2006/relationships" xmlns:p="http://schemas.openxmlformats.org/presentationml/2006/main">
+  <p:cSld>
+    <p:spTree>
+      <p:nvGrpSpPr>
+        <p:cNvPr id="1" name=""/>
+        <p:cNvGrpSpPr/>
+        <p:nvPr/>
+      </p:nvGrpSpPr>
+      <p:grpSpPr>
+        <a:xfrm>
+          <a:off x="0" y="0"/>
+          <a:ext cx="0" cy="0"/>
+          <a:chOff x="0" y="0"/>
+          <a:chExt cx="0" cy="0"/>
+        </a:xfrm>
+      </p:grpSpPr>
+      <p:sp>
+        <p:nvSpPr>
+          <p:cNvPr id="2" name="Title 1"/>
+          <p:cNvSpPr>
+            <a:spLocks noGrp="1"/>
+          </p:cNvSpPr>
+          <p:nvPr>
+            <p:ph type="title"/>
+          </p:nvPr>
+        </p:nvSpPr>
+        <p:spPr>
+          <a:xfrm>
+            <a:off x="913775" y="618517"/>
+            <a:ext cx="10364451" cy="1016319"/>
+          </a:xfrm>
+        </p:spPr>
+        <p:txBody>
+          <a:bodyPr>
+            <a:normAutofit/>
+          </a:bodyPr>
+          <a:lstStyle/>
+          <a:p>
+            <a:r>
+              <a:rPr lang="en-US" dirty="0" smtClean="0">
+                <a:latin typeface="Arial" panose="020B0604020202020204" pitchFamily="34" charset="0"/>
+                <a:cs typeface="Arial" panose="020B0604020202020204" pitchFamily="34" charset="0"/>
+              </a:rPr>
+              <a:t>Make your idea success</a:t>
+            </a:r>
+            <a:endParaRPr lang="en-US" dirty="0">
+              <a:latin typeface="Arial" panose="020B0604020202020204" pitchFamily="34" charset="0"/>
+              <a:cs typeface="Arial" panose="020B0604020202020204" pitchFamily="34" charset="0"/>
+            </a:endParaRPr>
+          </a:p>
+        </p:txBody>
+      </p:sp>
+      <p:pic>
+        <p:nvPicPr>
+          <p:cNvPr id="4" name="Picture 3"/>
+          <p:cNvPicPr>
+            <a:picLocks noChangeAspect="1"/>
+          </p:cNvPicPr>
+          <p:nvPr/>
+        </p:nvPicPr>
+        <p:blipFill rotWithShape="1">
+          <a:blip r:embed="rId2"/>
+          <a:srcRect l="19048" t="8095" r="19048" b="12667"/>
+          <a:stretch/>
+        </p:blipFill>
+        <p:spPr>
+          <a:xfrm>
+            <a:off x="2708599" y="1634836"/>
+            <a:ext cx="6774801" cy="4999047"/>
+          </a:xfrm>
+          <a:prstGeom prst="rect">
+            <a:avLst/>
+          </a:prstGeom>
+        </p:spPr>
+      </p:pic>
+    </p:spTree>
+    <p:extLst>
+      <p:ext uri="{BB962C8B-B14F-4D97-AF65-F5344CB8AC3E}">
+        <p14:creationId xmlns:p14="http://schemas.microsoft.com/office/powerpoint/2010/main" val="2754759596"/>
+      </p:ext>
+    </p:extLst>
+  </p:cSld>
+  <p:clrMapOvr>
+    <a:masterClrMapping/>
+  </p:clrMapOvr>
+</p:sld>
+</file>
+
 <file path=ppt/slides/slide2.xml><?xml version="1.0" encoding="utf-8"?>
 <p:sld xmlns:a="http://schemas.openxmlformats.org/drawingml/2006/main" xmlns:r="http://schemas.openxmlformats.org/officeDocument/2006/relationships" xmlns:p="http://schemas.openxmlformats.org/presentationml/2006/main">
   <p:cSld>
@@ -6563,14 +7925,7 @@
                 <a:latin typeface="Arial" panose="020B0604020202020204" pitchFamily="34" charset="0"/>
                 <a:cs typeface="Arial" panose="020B0604020202020204" pitchFamily="34" charset="0"/>
               </a:rPr>
-              <a:t> Project </a:t>
-            </a:r>
-            <a:r>
-              <a:rPr lang="en-US" dirty="0" smtClean="0">
-                <a:latin typeface="Arial" panose="020B0604020202020204" pitchFamily="34" charset="0"/>
-                <a:cs typeface="Arial" panose="020B0604020202020204" pitchFamily="34" charset="0"/>
-              </a:rPr>
-              <a:t>Description</a:t>
+              <a:t> Project Description</a:t>
             </a:r>
           </a:p>
           <a:p>
@@ -7341,10 +8696,6 @@
               </a:rPr>
               <a:t>The user statistical data can be used to predict users health prior to attack.</a:t>
             </a:r>
-            <a:endParaRPr lang="en-US" sz="2000" dirty="0">
-              <a:latin typeface="Arial" panose="020B0604020202020204" pitchFamily="34" charset="0"/>
-              <a:cs typeface="Arial" panose="020B0604020202020204" pitchFamily="34" charset="0"/>
-            </a:endParaRPr>
           </a:p>
         </p:txBody>
       </p:sp>
@@ -7777,11 +9128,18 @@
           <a:lstStyle/>
           <a:p>
             <a:r>
+              <a:rPr lang="en-US" dirty="0">
+                <a:latin typeface="Arial" panose="020B0604020202020204" pitchFamily="34" charset="0"/>
+                <a:cs typeface="Arial" panose="020B0604020202020204" pitchFamily="34" charset="0"/>
+              </a:rPr>
+              <a:t>Project </a:t>
+            </a:r>
+            <a:r>
               <a:rPr lang="en-US" dirty="0" smtClean="0">
                 <a:latin typeface="Arial" panose="020B0604020202020204" pitchFamily="34" charset="0"/>
                 <a:cs typeface="Arial" panose="020B0604020202020204" pitchFamily="34" charset="0"/>
               </a:rPr>
-              <a:t>Make your idea success</a:t>
+              <a:t>Management Plan</a:t>
             </a:r>
             <a:endParaRPr lang="en-US" dirty="0">
               <a:latin typeface="Arial" panose="020B0604020202020204" pitchFamily="34" charset="0"/>
@@ -7790,23 +9148,310 @@
           </a:p>
         </p:txBody>
       </p:sp>
+      <p:sp>
+        <p:nvSpPr>
+          <p:cNvPr id="6" name="TextBox 5"/>
+          <p:cNvSpPr txBox="1"/>
+          <p:nvPr/>
+        </p:nvSpPr>
+        <p:spPr>
+          <a:xfrm>
+            <a:off x="1191491" y="1911927"/>
+            <a:ext cx="9795164" cy="4580741"/>
+          </a:xfrm>
+          <a:prstGeom prst="rect">
+            <a:avLst/>
+          </a:prstGeom>
+          <a:noFill/>
+        </p:spPr>
+        <p:txBody>
+          <a:bodyPr wrap="square" rtlCol="0">
+            <a:spAutoFit/>
+          </a:bodyPr>
+          <a:lstStyle/>
+          <a:p>
+            <a:r>
+              <a:rPr lang="en-US" sz="2000" dirty="0">
+                <a:latin typeface="Arial" panose="020B0604020202020204" pitchFamily="34" charset="0"/>
+                <a:cs typeface="Arial" panose="020B0604020202020204" pitchFamily="34" charset="0"/>
+              </a:rPr>
+              <a:t>The planning stage and particularly the project management plan are commonly part of the correct execution, monitoring, and closure of a project</a:t>
+            </a:r>
+            <a:r>
+              <a:rPr lang="en-US" sz="2000" dirty="0" smtClean="0">
+                <a:latin typeface="Arial" panose="020B0604020202020204" pitchFamily="34" charset="0"/>
+                <a:cs typeface="Arial" panose="020B0604020202020204" pitchFamily="34" charset="0"/>
+              </a:rPr>
+              <a:t>.</a:t>
+            </a:r>
+          </a:p>
+          <a:p>
+            <a:endParaRPr lang="en-US" sz="2000" dirty="0">
+              <a:latin typeface="Arial" panose="020B0604020202020204" pitchFamily="34" charset="0"/>
+              <a:cs typeface="Arial" panose="020B0604020202020204" pitchFamily="34" charset="0"/>
+            </a:endParaRPr>
+          </a:p>
+          <a:p>
+            <a:pPr marL="342900" indent="-342900">
+              <a:lnSpc>
+                <a:spcPct val="150000"/>
+              </a:lnSpc>
+              <a:spcBef>
+                <a:spcPts val="200"/>
+              </a:spcBef>
+              <a:spcAft>
+                <a:spcPts val="200"/>
+              </a:spcAft>
+              <a:buFont typeface="Wingdings" panose="05000000000000000000" pitchFamily="2" charset="2"/>
+              <a:buChar char="q"/>
+            </a:pPr>
+            <a:r>
+              <a:rPr lang="en-US" sz="2000" dirty="0" smtClean="0">
+                <a:latin typeface="Arial" panose="020B0604020202020204" pitchFamily="34" charset="0"/>
+                <a:cs typeface="Arial" panose="020B0604020202020204" pitchFamily="34" charset="0"/>
+              </a:rPr>
+              <a:t>Project Life </a:t>
+            </a:r>
+            <a:r>
+              <a:rPr lang="en-US" sz="2000" dirty="0">
+                <a:latin typeface="Arial" panose="020B0604020202020204" pitchFamily="34" charset="0"/>
+                <a:cs typeface="Arial" panose="020B0604020202020204" pitchFamily="34" charset="0"/>
+              </a:rPr>
+              <a:t>C</a:t>
+            </a:r>
+            <a:r>
+              <a:rPr lang="en-US" sz="2000" dirty="0" smtClean="0">
+                <a:latin typeface="Arial" panose="020B0604020202020204" pitchFamily="34" charset="0"/>
+                <a:cs typeface="Arial" panose="020B0604020202020204" pitchFamily="34" charset="0"/>
+              </a:rPr>
+              <a:t>ycle </a:t>
+            </a:r>
+          </a:p>
+          <a:p>
+            <a:pPr marL="342900" indent="-342900">
+              <a:lnSpc>
+                <a:spcPct val="150000"/>
+              </a:lnSpc>
+              <a:spcBef>
+                <a:spcPts val="200"/>
+              </a:spcBef>
+              <a:spcAft>
+                <a:spcPts val="200"/>
+              </a:spcAft>
+              <a:buFont typeface="Wingdings" panose="05000000000000000000" pitchFamily="2" charset="2"/>
+              <a:buChar char="q"/>
+            </a:pPr>
+            <a:r>
+              <a:rPr lang="en-US" sz="2000" dirty="0" smtClean="0">
+                <a:latin typeface="Arial" panose="020B0604020202020204" pitchFamily="34" charset="0"/>
+                <a:cs typeface="Arial" panose="020B0604020202020204" pitchFamily="34" charset="0"/>
+              </a:rPr>
+              <a:t>Terms and Techniques</a:t>
+            </a:r>
+          </a:p>
+          <a:p>
+            <a:pPr marL="342900" indent="-342900">
+              <a:lnSpc>
+                <a:spcPct val="150000"/>
+              </a:lnSpc>
+              <a:spcBef>
+                <a:spcPts val="200"/>
+              </a:spcBef>
+              <a:spcAft>
+                <a:spcPts val="200"/>
+              </a:spcAft>
+              <a:buFont typeface="Wingdings" panose="05000000000000000000" pitchFamily="2" charset="2"/>
+              <a:buChar char="q"/>
+            </a:pPr>
+            <a:r>
+              <a:rPr lang="en-US" sz="2000" dirty="0" smtClean="0">
+                <a:latin typeface="Arial" panose="020B0604020202020204" pitchFamily="34" charset="0"/>
+                <a:cs typeface="Arial" panose="020B0604020202020204" pitchFamily="34" charset="0"/>
+              </a:rPr>
+              <a:t>Schedule Management</a:t>
+            </a:r>
+          </a:p>
+          <a:p>
+            <a:pPr marL="342900" indent="-342900">
+              <a:lnSpc>
+                <a:spcPct val="150000"/>
+              </a:lnSpc>
+              <a:spcBef>
+                <a:spcPts val="200"/>
+              </a:spcBef>
+              <a:spcAft>
+                <a:spcPts val="200"/>
+              </a:spcAft>
+              <a:buFont typeface="Wingdings" panose="05000000000000000000" pitchFamily="2" charset="2"/>
+              <a:buChar char="q"/>
+            </a:pPr>
+            <a:r>
+              <a:rPr lang="en-US" sz="2000" dirty="0" smtClean="0">
+                <a:latin typeface="Arial" panose="020B0604020202020204" pitchFamily="34" charset="0"/>
+                <a:cs typeface="Arial" panose="020B0604020202020204" pitchFamily="34" charset="0"/>
+              </a:rPr>
+              <a:t>Cost Estimation</a:t>
+            </a:r>
+          </a:p>
+          <a:p>
+            <a:pPr marL="342900" indent="-342900">
+              <a:lnSpc>
+                <a:spcPct val="150000"/>
+              </a:lnSpc>
+              <a:spcBef>
+                <a:spcPts val="200"/>
+              </a:spcBef>
+              <a:spcAft>
+                <a:spcPts val="200"/>
+              </a:spcAft>
+              <a:buFont typeface="Wingdings" panose="05000000000000000000" pitchFamily="2" charset="2"/>
+              <a:buChar char="q"/>
+            </a:pPr>
+            <a:r>
+              <a:rPr lang="en-US" sz="2000" dirty="0" smtClean="0">
+                <a:latin typeface="Arial" panose="020B0604020202020204" pitchFamily="34" charset="0"/>
+                <a:cs typeface="Arial" panose="020B0604020202020204" pitchFamily="34" charset="0"/>
+              </a:rPr>
+              <a:t>Communication Management</a:t>
+            </a:r>
+          </a:p>
+          <a:p>
+            <a:pPr marL="342900" indent="-342900">
+              <a:lnSpc>
+                <a:spcPct val="150000"/>
+              </a:lnSpc>
+              <a:spcBef>
+                <a:spcPts val="200"/>
+              </a:spcBef>
+              <a:spcAft>
+                <a:spcPts val="200"/>
+              </a:spcAft>
+              <a:buFont typeface="Wingdings" panose="05000000000000000000" pitchFamily="2" charset="2"/>
+              <a:buChar char="q"/>
+            </a:pPr>
+            <a:r>
+              <a:rPr lang="en-US" sz="2000" dirty="0" smtClean="0">
+                <a:latin typeface="Arial" panose="020B0604020202020204" pitchFamily="34" charset="0"/>
+                <a:cs typeface="Arial" panose="020B0604020202020204" pitchFamily="34" charset="0"/>
+              </a:rPr>
+              <a:t>Risk Management</a:t>
+            </a:r>
+            <a:endParaRPr lang="en-US" sz="2000" dirty="0" smtClean="0">
+              <a:latin typeface="Arial" panose="020B0604020202020204" pitchFamily="34" charset="0"/>
+              <a:cs typeface="Arial" panose="020B0604020202020204" pitchFamily="34" charset="0"/>
+            </a:endParaRPr>
+          </a:p>
+          <a:p>
+            <a:pPr marL="342900" indent="-342900">
+              <a:lnSpc>
+                <a:spcPct val="150000"/>
+              </a:lnSpc>
+              <a:spcBef>
+                <a:spcPts val="200"/>
+              </a:spcBef>
+              <a:spcAft>
+                <a:spcPts val="200"/>
+              </a:spcAft>
+              <a:buFont typeface="Wingdings" panose="05000000000000000000" pitchFamily="2" charset="2"/>
+              <a:buChar char="q"/>
+            </a:pPr>
+            <a:endParaRPr lang="en-US" sz="2000" dirty="0">
+              <a:latin typeface="Arial" panose="020B0604020202020204" pitchFamily="34" charset="0"/>
+              <a:cs typeface="Arial" panose="020B0604020202020204" pitchFamily="34" charset="0"/>
+            </a:endParaRPr>
+          </a:p>
+        </p:txBody>
+      </p:sp>
+    </p:spTree>
+    <p:extLst>
+      <p:ext uri="{BB962C8B-B14F-4D97-AF65-F5344CB8AC3E}">
+        <p14:creationId xmlns:p14="http://schemas.microsoft.com/office/powerpoint/2010/main" val="657735715"/>
+      </p:ext>
+    </p:extLst>
+  </p:cSld>
+  <p:clrMapOvr>
+    <a:masterClrMapping/>
+  </p:clrMapOvr>
+</p:sld>
+</file>
+
+<file path=ppt/slides/slide9.xml><?xml version="1.0" encoding="utf-8"?>
+<p:sld xmlns:a="http://schemas.openxmlformats.org/drawingml/2006/main" xmlns:r="http://schemas.openxmlformats.org/officeDocument/2006/relationships" xmlns:p="http://schemas.openxmlformats.org/presentationml/2006/main">
+  <p:cSld>
+    <p:spTree>
+      <p:nvGrpSpPr>
+        <p:cNvPr id="1" name=""/>
+        <p:cNvGrpSpPr/>
+        <p:nvPr/>
+      </p:nvGrpSpPr>
+      <p:grpSpPr>
+        <a:xfrm>
+          <a:off x="0" y="0"/>
+          <a:ext cx="0" cy="0"/>
+          <a:chOff x="0" y="0"/>
+          <a:chExt cx="0" cy="0"/>
+        </a:xfrm>
+      </p:grpSpPr>
+      <p:sp>
+        <p:nvSpPr>
+          <p:cNvPr id="2" name="Title 1"/>
+          <p:cNvSpPr>
+            <a:spLocks noGrp="1"/>
+          </p:cNvSpPr>
+          <p:nvPr>
+            <p:ph type="title"/>
+          </p:nvPr>
+        </p:nvSpPr>
+        <p:spPr>
+          <a:xfrm>
+            <a:off x="913775" y="618517"/>
+            <a:ext cx="10364451" cy="1016319"/>
+          </a:xfrm>
+        </p:spPr>
+        <p:txBody>
+          <a:bodyPr>
+            <a:normAutofit/>
+          </a:bodyPr>
+          <a:lstStyle/>
+          <a:p>
+            <a:r>
+              <a:rPr lang="en-US" dirty="0">
+                <a:latin typeface="Arial" panose="020B0604020202020204" pitchFamily="34" charset="0"/>
+                <a:cs typeface="Arial" panose="020B0604020202020204" pitchFamily="34" charset="0"/>
+              </a:rPr>
+              <a:t>Agile Software Development</a:t>
+            </a:r>
+            <a:endParaRPr lang="en-US" dirty="0">
+              <a:latin typeface="Arial" panose="020B0604020202020204" pitchFamily="34" charset="0"/>
+              <a:cs typeface="Arial" panose="020B0604020202020204" pitchFamily="34" charset="0"/>
+            </a:endParaRPr>
+          </a:p>
+        </p:txBody>
+      </p:sp>
       <p:pic>
         <p:nvPicPr>
-          <p:cNvPr id="4" name="Picture 3"/>
+          <p:cNvPr id="3" name="Picture 2"/>
           <p:cNvPicPr>
             <a:picLocks noChangeAspect="1"/>
           </p:cNvPicPr>
           <p:nvPr/>
         </p:nvPicPr>
-        <p:blipFill rotWithShape="1">
-          <a:blip r:embed="rId2"/>
-          <a:srcRect l="19048" t="8095" r="19048" b="12667"/>
-          <a:stretch/>
+        <p:blipFill>
+          <a:blip r:embed="rId2" cstate="print">
+            <a:extLst>
+              <a:ext uri="{28A0092B-C50C-407E-A947-70E740481C1C}">
+                <a14:useLocalDpi xmlns:a14="http://schemas.microsoft.com/office/drawing/2010/main" val="0"/>
+              </a:ext>
+            </a:extLst>
+          </a:blip>
+          <a:stretch>
+            <a:fillRect/>
+          </a:stretch>
         </p:blipFill>
         <p:spPr>
           <a:xfrm>
-            <a:off x="2708599" y="1634836"/>
-            <a:ext cx="6774801" cy="4999047"/>
+            <a:off x="2965269" y="1911927"/>
+            <a:ext cx="5905751" cy="4436463"/>
           </a:xfrm>
           <a:prstGeom prst="rect">
             <a:avLst/>
@@ -7816,7 +9461,7 @@
     </p:spTree>
     <p:extLst>
       <p:ext uri="{BB962C8B-B14F-4D97-AF65-F5344CB8AC3E}">
-        <p14:creationId xmlns:p14="http://schemas.microsoft.com/office/powerpoint/2010/main" val="2754759596"/>
+        <p14:creationId xmlns:p14="http://schemas.microsoft.com/office/powerpoint/2010/main" val="1276658691"/>
       </p:ext>
     </p:extLst>
   </p:cSld>

</xml_diff>

<commit_message>
Updating team mates photos to slides
</commit_message>
<xml_diff>
--- a/docs/presentation/Walk_Tracker.pptx
+++ b/docs/presentation/Walk_Tracker.pptx
@@ -8761,6 +8761,458 @@
           </a:p>
         </p:txBody>
       </p:sp>
+      <p:pic>
+        <p:nvPicPr>
+          <p:cNvPr id="3" name="Picture 2"/>
+          <p:cNvPicPr>
+            <a:picLocks noChangeAspect="1"/>
+          </p:cNvPicPr>
+          <p:nvPr/>
+        </p:nvPicPr>
+        <p:blipFill>
+          <a:blip r:embed="rId2" cstate="print">
+            <a:extLst>
+              <a:ext uri="{28A0092B-C50C-407E-A947-70E740481C1C}">
+                <a14:useLocalDpi xmlns:a14="http://schemas.microsoft.com/office/drawing/2010/main" val="0"/>
+              </a:ext>
+            </a:extLst>
+          </a:blip>
+          <a:stretch>
+            <a:fillRect/>
+          </a:stretch>
+        </p:blipFill>
+        <p:spPr>
+          <a:xfrm>
+            <a:off x="7549832" y="2080800"/>
+            <a:ext cx="1509316" cy="1554480"/>
+          </a:xfrm>
+          <a:prstGeom prst="rect">
+            <a:avLst/>
+          </a:prstGeom>
+        </p:spPr>
+      </p:pic>
+      <p:pic>
+        <p:nvPicPr>
+          <p:cNvPr id="11" name="Picture 10"/>
+          <p:cNvPicPr>
+            <a:picLocks noChangeAspect="1"/>
+          </p:cNvPicPr>
+          <p:nvPr/>
+        </p:nvPicPr>
+        <p:blipFill>
+          <a:blip r:embed="rId3" cstate="print">
+            <a:extLst>
+              <a:ext uri="{28A0092B-C50C-407E-A947-70E740481C1C}">
+                <a14:useLocalDpi xmlns:a14="http://schemas.microsoft.com/office/drawing/2010/main" val="0"/>
+              </a:ext>
+            </a:extLst>
+          </a:blip>
+          <a:stretch>
+            <a:fillRect/>
+          </a:stretch>
+        </p:blipFill>
+        <p:spPr>
+          <a:xfrm>
+            <a:off x="1204879" y="4558936"/>
+            <a:ext cx="1602105" cy="1584615"/>
+          </a:xfrm>
+          <a:prstGeom prst="rect">
+            <a:avLst/>
+          </a:prstGeom>
+        </p:spPr>
+      </p:pic>
+      <p:pic>
+        <p:nvPicPr>
+          <p:cNvPr id="12" name="Picture 11"/>
+          <p:cNvPicPr>
+            <a:picLocks noChangeAspect="1"/>
+          </p:cNvPicPr>
+          <p:nvPr/>
+        </p:nvPicPr>
+        <p:blipFill>
+          <a:blip r:embed="rId4" cstate="print">
+            <a:extLst>
+              <a:ext uri="{28A0092B-C50C-407E-A947-70E740481C1C}">
+                <a14:useLocalDpi xmlns:a14="http://schemas.microsoft.com/office/drawing/2010/main" val="0"/>
+              </a:ext>
+            </a:extLst>
+          </a:blip>
+          <a:stretch>
+            <a:fillRect/>
+          </a:stretch>
+        </p:blipFill>
+        <p:spPr>
+          <a:xfrm>
+            <a:off x="2163645" y="2097577"/>
+            <a:ext cx="1588182" cy="1554480"/>
+          </a:xfrm>
+          <a:prstGeom prst="rect">
+            <a:avLst/>
+          </a:prstGeom>
+        </p:spPr>
+      </p:pic>
+      <p:pic>
+        <p:nvPicPr>
+          <p:cNvPr id="13" name="Picture 12"/>
+          <p:cNvPicPr>
+            <a:picLocks noChangeAspect="1"/>
+          </p:cNvPicPr>
+          <p:nvPr/>
+        </p:nvPicPr>
+        <p:blipFill>
+          <a:blip r:embed="rId5" cstate="print">
+            <a:extLst>
+              <a:ext uri="{28A0092B-C50C-407E-A947-70E740481C1C}">
+                <a14:useLocalDpi xmlns:a14="http://schemas.microsoft.com/office/drawing/2010/main" val="0"/>
+              </a:ext>
+            </a:extLst>
+          </a:blip>
+          <a:stretch>
+            <a:fillRect/>
+          </a:stretch>
+        </p:blipFill>
+        <p:spPr>
+          <a:xfrm>
+            <a:off x="8831712" y="4508871"/>
+            <a:ext cx="1525028" cy="1540068"/>
+          </a:xfrm>
+          <a:prstGeom prst="rect">
+            <a:avLst/>
+          </a:prstGeom>
+        </p:spPr>
+      </p:pic>
+      <p:pic>
+        <p:nvPicPr>
+          <p:cNvPr id="15" name="Picture 14"/>
+          <p:cNvPicPr>
+            <a:picLocks noChangeAspect="1"/>
+          </p:cNvPicPr>
+          <p:nvPr/>
+        </p:nvPicPr>
+        <p:blipFill>
+          <a:blip r:embed="rId6" cstate="print">
+            <a:extLst>
+              <a:ext uri="{28A0092B-C50C-407E-A947-70E740481C1C}">
+                <a14:useLocalDpi xmlns:a14="http://schemas.microsoft.com/office/drawing/2010/main" val="0"/>
+              </a:ext>
+            </a:extLst>
+          </a:blip>
+          <a:stretch>
+            <a:fillRect/>
+          </a:stretch>
+        </p:blipFill>
+        <p:spPr>
+          <a:xfrm>
+            <a:off x="4930639" y="2114355"/>
+            <a:ext cx="1440381" cy="1520925"/>
+          </a:xfrm>
+          <a:prstGeom prst="rect">
+            <a:avLst/>
+          </a:prstGeom>
+        </p:spPr>
+      </p:pic>
+      <p:pic>
+        <p:nvPicPr>
+          <p:cNvPr id="16" name="Picture 15"/>
+          <p:cNvPicPr>
+            <a:picLocks noChangeAspect="1"/>
+          </p:cNvPicPr>
+          <p:nvPr/>
+        </p:nvPicPr>
+        <p:blipFill>
+          <a:blip r:embed="rId7" cstate="print">
+            <a:extLst>
+              <a:ext uri="{28A0092B-C50C-407E-A947-70E740481C1C}">
+                <a14:useLocalDpi xmlns:a14="http://schemas.microsoft.com/office/drawing/2010/main" val="0"/>
+              </a:ext>
+            </a:extLst>
+          </a:blip>
+          <a:stretch>
+            <a:fillRect/>
+          </a:stretch>
+        </p:blipFill>
+        <p:spPr>
+          <a:xfrm>
+            <a:off x="4813503" y="4525381"/>
+            <a:ext cx="1674655" cy="1523558"/>
+          </a:xfrm>
+          <a:prstGeom prst="rect">
+            <a:avLst/>
+          </a:prstGeom>
+        </p:spPr>
+      </p:pic>
+      <p:sp>
+        <p:nvSpPr>
+          <p:cNvPr id="17" name="TextBox 16"/>
+          <p:cNvSpPr txBox="1"/>
+          <p:nvPr/>
+        </p:nvSpPr>
+        <p:spPr>
+          <a:xfrm>
+            <a:off x="1849177" y="3704045"/>
+            <a:ext cx="2538344" cy="646331"/>
+          </a:xfrm>
+          <a:prstGeom prst="rect">
+            <a:avLst/>
+          </a:prstGeom>
+          <a:noFill/>
+        </p:spPr>
+        <p:txBody>
+          <a:bodyPr wrap="square" rtlCol="0">
+            <a:spAutoFit/>
+          </a:bodyPr>
+          <a:lstStyle/>
+          <a:p>
+            <a:r>
+              <a:rPr lang="en-US" dirty="0"/>
+              <a:t> </a:t>
+            </a:r>
+            <a:r>
+              <a:rPr lang="en-US" dirty="0" smtClean="0"/>
+              <a:t>  Ravi </a:t>
+            </a:r>
+            <a:r>
+              <a:rPr lang="en-US" dirty="0" err="1"/>
+              <a:t>Teja</a:t>
+            </a:r>
+            <a:r>
+              <a:rPr lang="en-US" dirty="0"/>
+              <a:t> </a:t>
+            </a:r>
+            <a:r>
+              <a:rPr lang="en-US" dirty="0" err="1" smtClean="0"/>
+              <a:t>Pagidoju</a:t>
+            </a:r>
+            <a:endParaRPr lang="en-US" dirty="0" smtClean="0"/>
+          </a:p>
+          <a:p>
+            <a:r>
+              <a:rPr lang="en-US" dirty="0" smtClean="0"/>
+              <a:t>    </a:t>
+            </a:r>
+            <a:r>
+              <a:rPr lang="en-US" b="1" dirty="0" smtClean="0"/>
+              <a:t>Project Manager</a:t>
+            </a:r>
+            <a:endParaRPr lang="en-US" b="1" dirty="0"/>
+          </a:p>
+        </p:txBody>
+      </p:sp>
+      <p:sp>
+        <p:nvSpPr>
+          <p:cNvPr id="18" name="TextBox 17"/>
+          <p:cNvSpPr txBox="1"/>
+          <p:nvPr/>
+        </p:nvSpPr>
+        <p:spPr>
+          <a:xfrm>
+            <a:off x="4129270" y="3687268"/>
+            <a:ext cx="2885484" cy="646331"/>
+          </a:xfrm>
+          <a:prstGeom prst="rect">
+            <a:avLst/>
+          </a:prstGeom>
+          <a:noFill/>
+        </p:spPr>
+        <p:txBody>
+          <a:bodyPr wrap="square" rtlCol="0">
+            <a:spAutoFit/>
+          </a:bodyPr>
+          <a:lstStyle/>
+          <a:p>
+            <a:r>
+              <a:rPr lang="en-US" dirty="0" smtClean="0"/>
+              <a:t>    </a:t>
+            </a:r>
+            <a:r>
+              <a:rPr lang="en-US" dirty="0" err="1" smtClean="0"/>
+              <a:t>Bhanu</a:t>
+            </a:r>
+            <a:r>
+              <a:rPr lang="en-US" dirty="0" smtClean="0"/>
+              <a:t> </a:t>
+            </a:r>
+            <a:r>
+              <a:rPr lang="en-US" dirty="0"/>
+              <a:t>Prakash </a:t>
+            </a:r>
+            <a:r>
+              <a:rPr lang="en-US" dirty="0" err="1" smtClean="0"/>
+              <a:t>Thota</a:t>
+            </a:r>
+            <a:endParaRPr lang="en-US" dirty="0" smtClean="0"/>
+          </a:p>
+          <a:p>
+            <a:r>
+              <a:rPr lang="en-US" b="1" dirty="0" smtClean="0"/>
+              <a:t>Quality Assurance Specialist</a:t>
+            </a:r>
+            <a:endParaRPr lang="en-US" b="1" dirty="0"/>
+          </a:p>
+        </p:txBody>
+      </p:sp>
+      <p:sp>
+        <p:nvSpPr>
+          <p:cNvPr id="19" name="TextBox 18"/>
+          <p:cNvSpPr txBox="1"/>
+          <p:nvPr/>
+        </p:nvSpPr>
+        <p:spPr>
+          <a:xfrm>
+            <a:off x="7158445" y="3687268"/>
+            <a:ext cx="2579472" cy="646331"/>
+          </a:xfrm>
+          <a:prstGeom prst="rect">
+            <a:avLst/>
+          </a:prstGeom>
+          <a:noFill/>
+        </p:spPr>
+        <p:txBody>
+          <a:bodyPr wrap="square" rtlCol="0">
+            <a:spAutoFit/>
+          </a:bodyPr>
+          <a:lstStyle/>
+          <a:p>
+            <a:r>
+              <a:rPr lang="en-US" dirty="0" smtClean="0"/>
+              <a:t>   Soujanya Janapatla</a:t>
+            </a:r>
+          </a:p>
+          <a:p>
+            <a:r>
+              <a:rPr lang="en-US" b="1" dirty="0" smtClean="0"/>
+              <a:t>	Team Lead</a:t>
+            </a:r>
+            <a:endParaRPr lang="en-US" b="1" dirty="0"/>
+          </a:p>
+        </p:txBody>
+      </p:sp>
+      <p:sp>
+        <p:nvSpPr>
+          <p:cNvPr id="20" name="TextBox 19"/>
+          <p:cNvSpPr txBox="1"/>
+          <p:nvPr/>
+        </p:nvSpPr>
+        <p:spPr>
+          <a:xfrm>
+            <a:off x="522514" y="6143551"/>
+            <a:ext cx="2965269" cy="646331"/>
+          </a:xfrm>
+          <a:prstGeom prst="rect">
+            <a:avLst/>
+          </a:prstGeom>
+          <a:noFill/>
+        </p:spPr>
+        <p:txBody>
+          <a:bodyPr wrap="square" rtlCol="0">
+            <a:spAutoFit/>
+          </a:bodyPr>
+          <a:lstStyle/>
+          <a:p>
+            <a:r>
+              <a:rPr lang="en-US" dirty="0" smtClean="0"/>
+              <a:t>Gopichand </a:t>
+            </a:r>
+            <a:r>
+              <a:rPr lang="en-US" dirty="0" err="1" smtClean="0"/>
+              <a:t>Bhandarupalli</a:t>
+            </a:r>
+            <a:endParaRPr lang="en-US" dirty="0" smtClean="0"/>
+          </a:p>
+          <a:p>
+            <a:r>
+              <a:rPr lang="en-US" b="1" dirty="0" smtClean="0"/>
+              <a:t> Database Administrator</a:t>
+            </a:r>
+            <a:endParaRPr lang="en-US" b="1" dirty="0"/>
+          </a:p>
+        </p:txBody>
+      </p:sp>
+      <p:sp>
+        <p:nvSpPr>
+          <p:cNvPr id="21" name="TextBox 20"/>
+          <p:cNvSpPr txBox="1"/>
+          <p:nvPr/>
+        </p:nvSpPr>
+        <p:spPr>
+          <a:xfrm>
+            <a:off x="4531212" y="6096419"/>
+            <a:ext cx="2627233" cy="646331"/>
+          </a:xfrm>
+          <a:prstGeom prst="rect">
+            <a:avLst/>
+          </a:prstGeom>
+          <a:noFill/>
+        </p:spPr>
+        <p:txBody>
+          <a:bodyPr wrap="square" rtlCol="0">
+            <a:spAutoFit/>
+          </a:bodyPr>
+          <a:lstStyle/>
+          <a:p>
+            <a:r>
+              <a:rPr lang="en-US" dirty="0" smtClean="0"/>
+              <a:t>       Sindhu Rani</a:t>
+            </a:r>
+          </a:p>
+          <a:p>
+            <a:r>
+              <a:rPr lang="en-US" b="1" dirty="0" smtClean="0"/>
+              <a:t>Front-end Developer</a:t>
+            </a:r>
+            <a:endParaRPr lang="en-US" b="1" dirty="0"/>
+          </a:p>
+        </p:txBody>
+      </p:sp>
+      <p:sp>
+        <p:nvSpPr>
+          <p:cNvPr id="22" name="TextBox 21"/>
+          <p:cNvSpPr txBox="1"/>
+          <p:nvPr/>
+        </p:nvSpPr>
+        <p:spPr>
+          <a:xfrm>
+            <a:off x="8723995" y="6096419"/>
+            <a:ext cx="2547257" cy="646331"/>
+          </a:xfrm>
+          <a:prstGeom prst="rect">
+            <a:avLst/>
+          </a:prstGeom>
+          <a:noFill/>
+        </p:spPr>
+        <p:txBody>
+          <a:bodyPr wrap="square" rtlCol="0">
+            <a:spAutoFit/>
+          </a:bodyPr>
+          <a:lstStyle/>
+          <a:p>
+            <a:r>
+              <a:rPr lang="en-US" dirty="0" smtClean="0"/>
+              <a:t>   </a:t>
+            </a:r>
+            <a:r>
+              <a:rPr lang="en-US" dirty="0" err="1" smtClean="0"/>
+              <a:t>Navya</a:t>
+            </a:r>
+            <a:r>
+              <a:rPr lang="en-US" dirty="0" smtClean="0"/>
+              <a:t> </a:t>
+            </a:r>
+            <a:r>
+              <a:rPr lang="en-US" dirty="0" err="1" smtClean="0"/>
+              <a:t>Devineni</a:t>
+            </a:r>
+            <a:endParaRPr lang="en-US" dirty="0" smtClean="0"/>
+          </a:p>
+          <a:p>
+            <a:r>
+              <a:rPr lang="en-US" b="1" dirty="0" smtClean="0"/>
+              <a:t>Back-end Developer</a:t>
+            </a:r>
+            <a:endParaRPr lang="en-US" b="1" dirty="0"/>
+          </a:p>
+        </p:txBody>
+      </p:sp>
     </p:spTree>
     <p:extLst>
       <p:ext uri="{BB962C8B-B14F-4D97-AF65-F5344CB8AC3E}">
@@ -9336,10 +9788,6 @@
               </a:rPr>
               <a:t>Risk Management</a:t>
             </a:r>
-            <a:endParaRPr lang="en-US" sz="2000" dirty="0" smtClean="0">
-              <a:latin typeface="Arial" panose="020B0604020202020204" pitchFamily="34" charset="0"/>
-              <a:cs typeface="Arial" panose="020B0604020202020204" pitchFamily="34" charset="0"/>
-            </a:endParaRPr>
           </a:p>
           <a:p>
             <a:pPr marL="342900" indent="-342900">
@@ -9421,10 +9869,6 @@
               </a:rPr>
               <a:t>Agile Software Development</a:t>
             </a:r>
-            <a:endParaRPr lang="en-US" dirty="0">
-              <a:latin typeface="Arial" panose="020B0604020202020204" pitchFamily="34" charset="0"/>
-              <a:cs typeface="Arial" panose="020B0604020202020204" pitchFamily="34" charset="0"/>
-            </a:endParaRPr>
           </a:p>
         </p:txBody>
       </p:sp>

</xml_diff>

<commit_message>
Adding budget and schedule management
</commit_message>
<xml_diff>
--- a/docs/presentation/Walk_Tracker.pptx
+++ b/docs/presentation/Walk_Tracker.pptx
@@ -6885,7 +6885,7 @@
         <p:spPr>
           <a:xfrm>
             <a:off x="1191491" y="1911927"/>
-            <a:ext cx="9795164" cy="4980851"/>
+            <a:ext cx="9795164" cy="496996"/>
           </a:xfrm>
           <a:prstGeom prst="rect">
             <a:avLst/>
@@ -6897,234 +6897,6 @@
             <a:spAutoFit/>
           </a:bodyPr>
           <a:lstStyle/>
-          <a:p>
-            <a:r>
-              <a:rPr lang="en-US" sz="2000" dirty="0" smtClean="0">
-                <a:latin typeface="Arial" panose="020B0604020202020204" pitchFamily="34" charset="0"/>
-                <a:cs typeface="Arial" panose="020B0604020202020204" pitchFamily="34" charset="0"/>
-              </a:rPr>
-              <a:t>Here are a set of front-end and back-end tools used for developing the application:</a:t>
-            </a:r>
-          </a:p>
-          <a:p>
-            <a:endParaRPr lang="en-US" sz="2000" dirty="0">
-              <a:latin typeface="Arial" panose="020B0604020202020204" pitchFamily="34" charset="0"/>
-              <a:cs typeface="Arial" panose="020B0604020202020204" pitchFamily="34" charset="0"/>
-            </a:endParaRPr>
-          </a:p>
-          <a:p>
-            <a:pPr marL="342900" indent="-342900">
-              <a:lnSpc>
-                <a:spcPct val="150000"/>
-              </a:lnSpc>
-              <a:spcBef>
-                <a:spcPts val="200"/>
-              </a:spcBef>
-              <a:spcAft>
-                <a:spcPts val="200"/>
-              </a:spcAft>
-              <a:buFont typeface="Wingdings" panose="05000000000000000000" pitchFamily="2" charset="2"/>
-              <a:buChar char="q"/>
-            </a:pPr>
-            <a:r>
-              <a:rPr lang="en-US" sz="1600" dirty="0" smtClean="0">
-                <a:latin typeface="Arial" panose="020B0604020202020204" pitchFamily="34" charset="0"/>
-                <a:cs typeface="Arial" panose="020B0604020202020204" pitchFamily="34" charset="0"/>
-              </a:rPr>
-              <a:t>Front-end:</a:t>
-            </a:r>
-          </a:p>
-          <a:p>
-            <a:pPr marL="800100" lvl="1" indent="-342900">
-              <a:lnSpc>
-                <a:spcPct val="150000"/>
-              </a:lnSpc>
-              <a:spcBef>
-                <a:spcPts val="200"/>
-              </a:spcBef>
-              <a:spcAft>
-                <a:spcPts val="200"/>
-              </a:spcAft>
-              <a:buFont typeface="Wingdings" panose="05000000000000000000" pitchFamily="2" charset="2"/>
-              <a:buChar char="q"/>
-            </a:pPr>
-            <a:r>
-              <a:rPr lang="en-US" sz="1600" dirty="0" smtClean="0">
-                <a:latin typeface="Arial" panose="020B0604020202020204" pitchFamily="34" charset="0"/>
-                <a:cs typeface="Arial" panose="020B0604020202020204" pitchFamily="34" charset="0"/>
-              </a:rPr>
-              <a:t>Angular Framework(HTML/CSS/Typescript)</a:t>
-            </a:r>
-          </a:p>
-          <a:p>
-            <a:pPr marL="800100" lvl="1" indent="-342900">
-              <a:lnSpc>
-                <a:spcPct val="150000"/>
-              </a:lnSpc>
-              <a:spcBef>
-                <a:spcPts val="200"/>
-              </a:spcBef>
-              <a:spcAft>
-                <a:spcPts val="200"/>
-              </a:spcAft>
-              <a:buFont typeface="Wingdings" panose="05000000000000000000" pitchFamily="2" charset="2"/>
-              <a:buChar char="q"/>
-            </a:pPr>
-            <a:r>
-              <a:rPr lang="en-US" sz="1600" dirty="0" smtClean="0">
-                <a:latin typeface="Arial" panose="020B0604020202020204" pitchFamily="34" charset="0"/>
-                <a:cs typeface="Arial" panose="020B0604020202020204" pitchFamily="34" charset="0"/>
-              </a:rPr>
-              <a:t>D3.js for graphs</a:t>
-            </a:r>
-          </a:p>
-          <a:p>
-            <a:pPr marL="342900" indent="-342900">
-              <a:lnSpc>
-                <a:spcPct val="150000"/>
-              </a:lnSpc>
-              <a:spcBef>
-                <a:spcPts val="200"/>
-              </a:spcBef>
-              <a:spcAft>
-                <a:spcPts val="200"/>
-              </a:spcAft>
-              <a:buFont typeface="Wingdings" panose="05000000000000000000" pitchFamily="2" charset="2"/>
-              <a:buChar char="q"/>
-            </a:pPr>
-            <a:r>
-              <a:rPr lang="en-US" sz="1600" dirty="0" smtClean="0">
-                <a:latin typeface="Arial" panose="020B0604020202020204" pitchFamily="34" charset="0"/>
-                <a:cs typeface="Arial" panose="020B0604020202020204" pitchFamily="34" charset="0"/>
-              </a:rPr>
-              <a:t>Back-end:</a:t>
-            </a:r>
-          </a:p>
-          <a:p>
-            <a:pPr marL="800100" lvl="1" indent="-342900">
-              <a:lnSpc>
-                <a:spcPct val="150000"/>
-              </a:lnSpc>
-              <a:spcBef>
-                <a:spcPts val="200"/>
-              </a:spcBef>
-              <a:spcAft>
-                <a:spcPts val="200"/>
-              </a:spcAft>
-              <a:buFont typeface="Wingdings" panose="05000000000000000000" pitchFamily="2" charset="2"/>
-              <a:buChar char="q"/>
-            </a:pPr>
-            <a:r>
-              <a:rPr lang="en-US" sz="1600" dirty="0" smtClean="0">
-                <a:latin typeface="Arial" panose="020B0604020202020204" pitchFamily="34" charset="0"/>
-                <a:cs typeface="Arial" panose="020B0604020202020204" pitchFamily="34" charset="0"/>
-              </a:rPr>
-              <a:t>Node.js</a:t>
-            </a:r>
-          </a:p>
-          <a:p>
-            <a:pPr marL="342900" indent="-342900">
-              <a:lnSpc>
-                <a:spcPct val="150000"/>
-              </a:lnSpc>
-              <a:spcBef>
-                <a:spcPts val="200"/>
-              </a:spcBef>
-              <a:spcAft>
-                <a:spcPts val="200"/>
-              </a:spcAft>
-              <a:buFont typeface="Wingdings" panose="05000000000000000000" pitchFamily="2" charset="2"/>
-              <a:buChar char="q"/>
-            </a:pPr>
-            <a:r>
-              <a:rPr lang="en-US" sz="1600" dirty="0" smtClean="0">
-                <a:latin typeface="Arial" panose="020B0604020202020204" pitchFamily="34" charset="0"/>
-                <a:cs typeface="Arial" panose="020B0604020202020204" pitchFamily="34" charset="0"/>
-              </a:rPr>
-              <a:t>Google Analytics for capturing the user statistics</a:t>
-            </a:r>
-          </a:p>
-          <a:p>
-            <a:pPr marL="342900" indent="-342900">
-              <a:lnSpc>
-                <a:spcPct val="150000"/>
-              </a:lnSpc>
-              <a:spcBef>
-                <a:spcPts val="200"/>
-              </a:spcBef>
-              <a:spcAft>
-                <a:spcPts val="200"/>
-              </a:spcAft>
-              <a:buFont typeface="Wingdings" panose="05000000000000000000" pitchFamily="2" charset="2"/>
-              <a:buChar char="q"/>
-            </a:pPr>
-            <a:r>
-              <a:rPr lang="en-US" sz="1600" dirty="0" err="1" smtClean="0">
-                <a:latin typeface="Arial" panose="020B0604020202020204" pitchFamily="34" charset="0"/>
-                <a:cs typeface="Arial" panose="020B0604020202020204" pitchFamily="34" charset="0"/>
-              </a:rPr>
-              <a:t>Github</a:t>
-            </a:r>
-            <a:r>
-              <a:rPr lang="en-US" sz="1600" dirty="0" smtClean="0">
-                <a:latin typeface="Arial" panose="020B0604020202020204" pitchFamily="34" charset="0"/>
-                <a:cs typeface="Arial" panose="020B0604020202020204" pitchFamily="34" charset="0"/>
-              </a:rPr>
-              <a:t> for version controlling the code</a:t>
-            </a:r>
-          </a:p>
-          <a:p>
-            <a:pPr marL="342900" indent="-342900">
-              <a:lnSpc>
-                <a:spcPct val="150000"/>
-              </a:lnSpc>
-              <a:spcBef>
-                <a:spcPts val="200"/>
-              </a:spcBef>
-              <a:spcAft>
-                <a:spcPts val="200"/>
-              </a:spcAft>
-              <a:buFont typeface="Wingdings" panose="05000000000000000000" pitchFamily="2" charset="2"/>
-              <a:buChar char="q"/>
-            </a:pPr>
-            <a:r>
-              <a:rPr lang="en-US" sz="1600" dirty="0" err="1" smtClean="0">
-                <a:latin typeface="Arial" panose="020B0604020202020204" pitchFamily="34" charset="0"/>
-                <a:cs typeface="Arial" panose="020B0604020202020204" pitchFamily="34" charset="0"/>
-              </a:rPr>
-              <a:t>Heroku</a:t>
-            </a:r>
-            <a:r>
-              <a:rPr lang="en-US" sz="1600" dirty="0" smtClean="0">
-                <a:latin typeface="Arial" panose="020B0604020202020204" pitchFamily="34" charset="0"/>
-                <a:cs typeface="Arial" panose="020B0604020202020204" pitchFamily="34" charset="0"/>
-              </a:rPr>
-              <a:t> for hosting the site</a:t>
-            </a:r>
-          </a:p>
-          <a:p>
-            <a:pPr marL="342900" indent="-342900">
-              <a:lnSpc>
-                <a:spcPct val="150000"/>
-              </a:lnSpc>
-              <a:spcBef>
-                <a:spcPts val="200"/>
-              </a:spcBef>
-              <a:spcAft>
-                <a:spcPts val="200"/>
-              </a:spcAft>
-              <a:buFont typeface="Wingdings" panose="05000000000000000000" pitchFamily="2" charset="2"/>
-              <a:buChar char="q"/>
-            </a:pPr>
-            <a:r>
-              <a:rPr lang="en-US" sz="1600" dirty="0" smtClean="0">
-                <a:latin typeface="Arial" panose="020B0604020202020204" pitchFamily="34" charset="0"/>
-                <a:cs typeface="Arial" panose="020B0604020202020204" pitchFamily="34" charset="0"/>
-              </a:rPr>
-              <a:t>Maven for building the application</a:t>
-            </a:r>
-            <a:endParaRPr lang="en-US" sz="1600" dirty="0"/>
-          </a:p>
           <a:p>
             <a:pPr marL="342900" indent="-342900">
               <a:lnSpc>
@@ -7146,6 +6918,36 @@
           </a:p>
         </p:txBody>
       </p:sp>
+      <p:pic>
+        <p:nvPicPr>
+          <p:cNvPr id="4" name="Picture 3"/>
+          <p:cNvPicPr>
+            <a:picLocks noChangeAspect="1"/>
+          </p:cNvPicPr>
+          <p:nvPr/>
+        </p:nvPicPr>
+        <p:blipFill>
+          <a:blip r:embed="rId2">
+            <a:extLst>
+              <a:ext uri="{28A0092B-C50C-407E-A947-70E740481C1C}">
+                <a14:useLocalDpi xmlns:a14="http://schemas.microsoft.com/office/drawing/2010/main" val="0"/>
+              </a:ext>
+            </a:extLst>
+          </a:blip>
+          <a:stretch>
+            <a:fillRect/>
+          </a:stretch>
+        </p:blipFill>
+        <p:spPr>
+          <a:xfrm>
+            <a:off x="2259346" y="1759636"/>
+            <a:ext cx="7673307" cy="4662625"/>
+          </a:xfrm>
+          <a:prstGeom prst="rect">
+            <a:avLst/>
+          </a:prstGeom>
+        </p:spPr>
+      </p:pic>
     </p:spTree>
     <p:extLst>
       <p:ext uri="{BB962C8B-B14F-4D97-AF65-F5344CB8AC3E}">
@@ -7228,7 +7030,7 @@
         <p:spPr>
           <a:xfrm>
             <a:off x="1191491" y="1911927"/>
-            <a:ext cx="9795164" cy="4980851"/>
+            <a:ext cx="9795164" cy="496996"/>
           </a:xfrm>
           <a:prstGeom prst="rect">
             <a:avLst/>
@@ -7241,22 +7043,7 @@
           </a:bodyPr>
           <a:lstStyle/>
           <a:p>
-            <a:r>
-              <a:rPr lang="en-US" sz="2000" dirty="0" smtClean="0">
-                <a:latin typeface="Arial" panose="020B0604020202020204" pitchFamily="34" charset="0"/>
-                <a:cs typeface="Arial" panose="020B0604020202020204" pitchFamily="34" charset="0"/>
-              </a:rPr>
-              <a:t>Here are a set of front-end and back-end tools used for developing the application:</a:t>
-            </a:r>
-          </a:p>
-          <a:p>
-            <a:endParaRPr lang="en-US" sz="2000" dirty="0">
-              <a:latin typeface="Arial" panose="020B0604020202020204" pitchFamily="34" charset="0"/>
-              <a:cs typeface="Arial" panose="020B0604020202020204" pitchFamily="34" charset="0"/>
-            </a:endParaRPr>
-          </a:p>
-          <a:p>
-            <a:pPr marL="342900" indent="-342900">
+            <a:pPr>
               <a:lnSpc>
                 <a:spcPct val="150000"/>
               </a:lnSpc>
@@ -7266,221 +7053,6 @@
               <a:spcAft>
                 <a:spcPts val="200"/>
               </a:spcAft>
-              <a:buFont typeface="Wingdings" panose="05000000000000000000" pitchFamily="2" charset="2"/>
-              <a:buChar char="q"/>
-            </a:pPr>
-            <a:r>
-              <a:rPr lang="en-US" sz="1600" dirty="0" smtClean="0">
-                <a:latin typeface="Arial" panose="020B0604020202020204" pitchFamily="34" charset="0"/>
-                <a:cs typeface="Arial" panose="020B0604020202020204" pitchFamily="34" charset="0"/>
-              </a:rPr>
-              <a:t>Front-end:</a:t>
-            </a:r>
-          </a:p>
-          <a:p>
-            <a:pPr marL="800100" lvl="1" indent="-342900">
-              <a:lnSpc>
-                <a:spcPct val="150000"/>
-              </a:lnSpc>
-              <a:spcBef>
-                <a:spcPts val="200"/>
-              </a:spcBef>
-              <a:spcAft>
-                <a:spcPts val="200"/>
-              </a:spcAft>
-              <a:buFont typeface="Wingdings" panose="05000000000000000000" pitchFamily="2" charset="2"/>
-              <a:buChar char="q"/>
-            </a:pPr>
-            <a:r>
-              <a:rPr lang="en-US" sz="1600" dirty="0" smtClean="0">
-                <a:latin typeface="Arial" panose="020B0604020202020204" pitchFamily="34" charset="0"/>
-                <a:cs typeface="Arial" panose="020B0604020202020204" pitchFamily="34" charset="0"/>
-              </a:rPr>
-              <a:t>Angular Framework(HTML/CSS/Typescript)</a:t>
-            </a:r>
-          </a:p>
-          <a:p>
-            <a:pPr marL="800100" lvl="1" indent="-342900">
-              <a:lnSpc>
-                <a:spcPct val="150000"/>
-              </a:lnSpc>
-              <a:spcBef>
-                <a:spcPts val="200"/>
-              </a:spcBef>
-              <a:spcAft>
-                <a:spcPts val="200"/>
-              </a:spcAft>
-              <a:buFont typeface="Wingdings" panose="05000000000000000000" pitchFamily="2" charset="2"/>
-              <a:buChar char="q"/>
-            </a:pPr>
-            <a:r>
-              <a:rPr lang="en-US" sz="1600" dirty="0" smtClean="0">
-                <a:latin typeface="Arial" panose="020B0604020202020204" pitchFamily="34" charset="0"/>
-                <a:cs typeface="Arial" panose="020B0604020202020204" pitchFamily="34" charset="0"/>
-              </a:rPr>
-              <a:t>D3.js for graphs</a:t>
-            </a:r>
-          </a:p>
-          <a:p>
-            <a:pPr marL="342900" indent="-342900">
-              <a:lnSpc>
-                <a:spcPct val="150000"/>
-              </a:lnSpc>
-              <a:spcBef>
-                <a:spcPts val="200"/>
-              </a:spcBef>
-              <a:spcAft>
-                <a:spcPts val="200"/>
-              </a:spcAft>
-              <a:buFont typeface="Wingdings" panose="05000000000000000000" pitchFamily="2" charset="2"/>
-              <a:buChar char="q"/>
-            </a:pPr>
-            <a:r>
-              <a:rPr lang="en-US" sz="1600" dirty="0" smtClean="0">
-                <a:latin typeface="Arial" panose="020B0604020202020204" pitchFamily="34" charset="0"/>
-                <a:cs typeface="Arial" panose="020B0604020202020204" pitchFamily="34" charset="0"/>
-              </a:rPr>
-              <a:t>Back-end:</a:t>
-            </a:r>
-          </a:p>
-          <a:p>
-            <a:pPr marL="800100" lvl="1" indent="-342900">
-              <a:lnSpc>
-                <a:spcPct val="150000"/>
-              </a:lnSpc>
-              <a:spcBef>
-                <a:spcPts val="200"/>
-              </a:spcBef>
-              <a:spcAft>
-                <a:spcPts val="200"/>
-              </a:spcAft>
-              <a:buFont typeface="Wingdings" panose="05000000000000000000" pitchFamily="2" charset="2"/>
-              <a:buChar char="q"/>
-            </a:pPr>
-            <a:r>
-              <a:rPr lang="en-US" sz="1600" dirty="0" smtClean="0">
-                <a:latin typeface="Arial" panose="020B0604020202020204" pitchFamily="34" charset="0"/>
-                <a:cs typeface="Arial" panose="020B0604020202020204" pitchFamily="34" charset="0"/>
-              </a:rPr>
-              <a:t>Node.js</a:t>
-            </a:r>
-          </a:p>
-          <a:p>
-            <a:pPr marL="342900" indent="-342900">
-              <a:lnSpc>
-                <a:spcPct val="150000"/>
-              </a:lnSpc>
-              <a:spcBef>
-                <a:spcPts val="200"/>
-              </a:spcBef>
-              <a:spcAft>
-                <a:spcPts val="200"/>
-              </a:spcAft>
-              <a:buFont typeface="Wingdings" panose="05000000000000000000" pitchFamily="2" charset="2"/>
-              <a:buChar char="q"/>
-            </a:pPr>
-            <a:r>
-              <a:rPr lang="en-US" sz="1600" dirty="0" smtClean="0">
-                <a:latin typeface="Arial" panose="020B0604020202020204" pitchFamily="34" charset="0"/>
-                <a:cs typeface="Arial" panose="020B0604020202020204" pitchFamily="34" charset="0"/>
-              </a:rPr>
-              <a:t>Google Analytics for capturing the user statistics</a:t>
-            </a:r>
-          </a:p>
-          <a:p>
-            <a:pPr marL="342900" indent="-342900">
-              <a:lnSpc>
-                <a:spcPct val="150000"/>
-              </a:lnSpc>
-              <a:spcBef>
-                <a:spcPts val="200"/>
-              </a:spcBef>
-              <a:spcAft>
-                <a:spcPts val="200"/>
-              </a:spcAft>
-              <a:buFont typeface="Wingdings" panose="05000000000000000000" pitchFamily="2" charset="2"/>
-              <a:buChar char="q"/>
-            </a:pPr>
-            <a:r>
-              <a:rPr lang="en-US" sz="1600" dirty="0" err="1" smtClean="0">
-                <a:latin typeface="Arial" panose="020B0604020202020204" pitchFamily="34" charset="0"/>
-                <a:cs typeface="Arial" panose="020B0604020202020204" pitchFamily="34" charset="0"/>
-              </a:rPr>
-              <a:t>Github</a:t>
-            </a:r>
-            <a:r>
-              <a:rPr lang="en-US" sz="1600" dirty="0" smtClean="0">
-                <a:latin typeface="Arial" panose="020B0604020202020204" pitchFamily="34" charset="0"/>
-                <a:cs typeface="Arial" panose="020B0604020202020204" pitchFamily="34" charset="0"/>
-              </a:rPr>
-              <a:t> for version controlling the code</a:t>
-            </a:r>
-          </a:p>
-          <a:p>
-            <a:pPr marL="342900" indent="-342900">
-              <a:lnSpc>
-                <a:spcPct val="150000"/>
-              </a:lnSpc>
-              <a:spcBef>
-                <a:spcPts val="200"/>
-              </a:spcBef>
-              <a:spcAft>
-                <a:spcPts val="200"/>
-              </a:spcAft>
-              <a:buFont typeface="Wingdings" panose="05000000000000000000" pitchFamily="2" charset="2"/>
-              <a:buChar char="q"/>
-            </a:pPr>
-            <a:r>
-              <a:rPr lang="en-US" sz="1600" dirty="0" err="1" smtClean="0">
-                <a:latin typeface="Arial" panose="020B0604020202020204" pitchFamily="34" charset="0"/>
-                <a:cs typeface="Arial" panose="020B0604020202020204" pitchFamily="34" charset="0"/>
-              </a:rPr>
-              <a:t>Heroku</a:t>
-            </a:r>
-            <a:r>
-              <a:rPr lang="en-US" sz="1600" dirty="0" smtClean="0">
-                <a:latin typeface="Arial" panose="020B0604020202020204" pitchFamily="34" charset="0"/>
-                <a:cs typeface="Arial" panose="020B0604020202020204" pitchFamily="34" charset="0"/>
-              </a:rPr>
-              <a:t> for hosting the site</a:t>
-            </a:r>
-          </a:p>
-          <a:p>
-            <a:pPr marL="342900" indent="-342900">
-              <a:lnSpc>
-                <a:spcPct val="150000"/>
-              </a:lnSpc>
-              <a:spcBef>
-                <a:spcPts val="200"/>
-              </a:spcBef>
-              <a:spcAft>
-                <a:spcPts val="200"/>
-              </a:spcAft>
-              <a:buFont typeface="Wingdings" panose="05000000000000000000" pitchFamily="2" charset="2"/>
-              <a:buChar char="q"/>
-            </a:pPr>
-            <a:r>
-              <a:rPr lang="en-US" sz="1600" dirty="0" smtClean="0">
-                <a:latin typeface="Arial" panose="020B0604020202020204" pitchFamily="34" charset="0"/>
-                <a:cs typeface="Arial" panose="020B0604020202020204" pitchFamily="34" charset="0"/>
-              </a:rPr>
-              <a:t>Maven for building the application</a:t>
-            </a:r>
-            <a:endParaRPr lang="en-US" sz="1600" dirty="0"/>
-          </a:p>
-          <a:p>
-            <a:pPr marL="342900" indent="-342900">
-              <a:lnSpc>
-                <a:spcPct val="150000"/>
-              </a:lnSpc>
-              <a:spcBef>
-                <a:spcPts val="200"/>
-              </a:spcBef>
-              <a:spcAft>
-                <a:spcPts val="200"/>
-              </a:spcAft>
-              <a:buFont typeface="Wingdings" panose="05000000000000000000" pitchFamily="2" charset="2"/>
-              <a:buChar char="q"/>
             </a:pPr>
             <a:endParaRPr lang="en-US" sz="2000" dirty="0">
               <a:latin typeface="Arial" panose="020B0604020202020204" pitchFamily="34" charset="0"/>
@@ -7489,6 +7061,36 @@
           </a:p>
         </p:txBody>
       </p:sp>
+      <p:pic>
+        <p:nvPicPr>
+          <p:cNvPr id="3" name="Picture 2"/>
+          <p:cNvPicPr>
+            <a:picLocks noChangeAspect="1"/>
+          </p:cNvPicPr>
+          <p:nvPr/>
+        </p:nvPicPr>
+        <p:blipFill>
+          <a:blip r:embed="rId2">
+            <a:extLst>
+              <a:ext uri="{28A0092B-C50C-407E-A947-70E740481C1C}">
+                <a14:useLocalDpi xmlns:a14="http://schemas.microsoft.com/office/drawing/2010/main" val="0"/>
+              </a:ext>
+            </a:extLst>
+          </a:blip>
+          <a:stretch>
+            <a:fillRect/>
+          </a:stretch>
+        </p:blipFill>
+        <p:spPr>
+          <a:xfrm>
+            <a:off x="1531795" y="1634836"/>
+            <a:ext cx="8503422" cy="4973700"/>
+          </a:xfrm>
+          <a:prstGeom prst="rect">
+            <a:avLst/>
+          </a:prstGeom>
+        </p:spPr>
+      </p:pic>
     </p:spTree>
     <p:extLst>
       <p:ext uri="{BB962C8B-B14F-4D97-AF65-F5344CB8AC3E}">

</xml_diff>

<commit_message>
Adding technologies logo to the slides
</commit_message>
<xml_diff>
--- a/docs/presentation/Walk_Tracker.pptx
+++ b/docs/presentation/Walk_Tracker.pptx
@@ -6542,7 +6542,7 @@
         <p:spPr>
           <a:xfrm>
             <a:off x="1191491" y="1911927"/>
-            <a:ext cx="9795164" cy="4980851"/>
+            <a:ext cx="9795164" cy="1195199"/>
           </a:xfrm>
           <a:prstGeom prst="rect">
             <a:avLst/>
@@ -6570,7 +6570,7 @@
             </a:endParaRPr>
           </a:p>
           <a:p>
-            <a:pPr marL="342900" indent="-342900">
+            <a:pPr>
               <a:lnSpc>
                 <a:spcPct val="150000"/>
               </a:lnSpc>
@@ -6580,221 +6580,6 @@
               <a:spcAft>
                 <a:spcPts val="200"/>
               </a:spcAft>
-              <a:buFont typeface="Wingdings" panose="05000000000000000000" pitchFamily="2" charset="2"/>
-              <a:buChar char="q"/>
-            </a:pPr>
-            <a:r>
-              <a:rPr lang="en-US" sz="1600" dirty="0" smtClean="0">
-                <a:latin typeface="Arial" panose="020B0604020202020204" pitchFamily="34" charset="0"/>
-                <a:cs typeface="Arial" panose="020B0604020202020204" pitchFamily="34" charset="0"/>
-              </a:rPr>
-              <a:t>Front-end:</a:t>
-            </a:r>
-          </a:p>
-          <a:p>
-            <a:pPr marL="800100" lvl="1" indent="-342900">
-              <a:lnSpc>
-                <a:spcPct val="150000"/>
-              </a:lnSpc>
-              <a:spcBef>
-                <a:spcPts val="200"/>
-              </a:spcBef>
-              <a:spcAft>
-                <a:spcPts val="200"/>
-              </a:spcAft>
-              <a:buFont typeface="Wingdings" panose="05000000000000000000" pitchFamily="2" charset="2"/>
-              <a:buChar char="q"/>
-            </a:pPr>
-            <a:r>
-              <a:rPr lang="en-US" sz="1600" dirty="0" smtClean="0">
-                <a:latin typeface="Arial" panose="020B0604020202020204" pitchFamily="34" charset="0"/>
-                <a:cs typeface="Arial" panose="020B0604020202020204" pitchFamily="34" charset="0"/>
-              </a:rPr>
-              <a:t>Angular Framework(HTML/CSS/Typescript)</a:t>
-            </a:r>
-          </a:p>
-          <a:p>
-            <a:pPr marL="800100" lvl="1" indent="-342900">
-              <a:lnSpc>
-                <a:spcPct val="150000"/>
-              </a:lnSpc>
-              <a:spcBef>
-                <a:spcPts val="200"/>
-              </a:spcBef>
-              <a:spcAft>
-                <a:spcPts val="200"/>
-              </a:spcAft>
-              <a:buFont typeface="Wingdings" panose="05000000000000000000" pitchFamily="2" charset="2"/>
-              <a:buChar char="q"/>
-            </a:pPr>
-            <a:r>
-              <a:rPr lang="en-US" sz="1600" dirty="0" smtClean="0">
-                <a:latin typeface="Arial" panose="020B0604020202020204" pitchFamily="34" charset="0"/>
-                <a:cs typeface="Arial" panose="020B0604020202020204" pitchFamily="34" charset="0"/>
-              </a:rPr>
-              <a:t>D3.js for graphs</a:t>
-            </a:r>
-          </a:p>
-          <a:p>
-            <a:pPr marL="342900" indent="-342900">
-              <a:lnSpc>
-                <a:spcPct val="150000"/>
-              </a:lnSpc>
-              <a:spcBef>
-                <a:spcPts val="200"/>
-              </a:spcBef>
-              <a:spcAft>
-                <a:spcPts val="200"/>
-              </a:spcAft>
-              <a:buFont typeface="Wingdings" panose="05000000000000000000" pitchFamily="2" charset="2"/>
-              <a:buChar char="q"/>
-            </a:pPr>
-            <a:r>
-              <a:rPr lang="en-US" sz="1600" dirty="0" smtClean="0">
-                <a:latin typeface="Arial" panose="020B0604020202020204" pitchFamily="34" charset="0"/>
-                <a:cs typeface="Arial" panose="020B0604020202020204" pitchFamily="34" charset="0"/>
-              </a:rPr>
-              <a:t>Back-end:</a:t>
-            </a:r>
-          </a:p>
-          <a:p>
-            <a:pPr marL="800100" lvl="1" indent="-342900">
-              <a:lnSpc>
-                <a:spcPct val="150000"/>
-              </a:lnSpc>
-              <a:spcBef>
-                <a:spcPts val="200"/>
-              </a:spcBef>
-              <a:spcAft>
-                <a:spcPts val="200"/>
-              </a:spcAft>
-              <a:buFont typeface="Wingdings" panose="05000000000000000000" pitchFamily="2" charset="2"/>
-              <a:buChar char="q"/>
-            </a:pPr>
-            <a:r>
-              <a:rPr lang="en-US" sz="1600" dirty="0" smtClean="0">
-                <a:latin typeface="Arial" panose="020B0604020202020204" pitchFamily="34" charset="0"/>
-                <a:cs typeface="Arial" panose="020B0604020202020204" pitchFamily="34" charset="0"/>
-              </a:rPr>
-              <a:t>Node.js</a:t>
-            </a:r>
-          </a:p>
-          <a:p>
-            <a:pPr marL="342900" indent="-342900">
-              <a:lnSpc>
-                <a:spcPct val="150000"/>
-              </a:lnSpc>
-              <a:spcBef>
-                <a:spcPts val="200"/>
-              </a:spcBef>
-              <a:spcAft>
-                <a:spcPts val="200"/>
-              </a:spcAft>
-              <a:buFont typeface="Wingdings" panose="05000000000000000000" pitchFamily="2" charset="2"/>
-              <a:buChar char="q"/>
-            </a:pPr>
-            <a:r>
-              <a:rPr lang="en-US" sz="1600" dirty="0" smtClean="0">
-                <a:latin typeface="Arial" panose="020B0604020202020204" pitchFamily="34" charset="0"/>
-                <a:cs typeface="Arial" panose="020B0604020202020204" pitchFamily="34" charset="0"/>
-              </a:rPr>
-              <a:t>Google Analytics for capturing the user statistics</a:t>
-            </a:r>
-          </a:p>
-          <a:p>
-            <a:pPr marL="342900" indent="-342900">
-              <a:lnSpc>
-                <a:spcPct val="150000"/>
-              </a:lnSpc>
-              <a:spcBef>
-                <a:spcPts val="200"/>
-              </a:spcBef>
-              <a:spcAft>
-                <a:spcPts val="200"/>
-              </a:spcAft>
-              <a:buFont typeface="Wingdings" panose="05000000000000000000" pitchFamily="2" charset="2"/>
-              <a:buChar char="q"/>
-            </a:pPr>
-            <a:r>
-              <a:rPr lang="en-US" sz="1600" dirty="0" err="1" smtClean="0">
-                <a:latin typeface="Arial" panose="020B0604020202020204" pitchFamily="34" charset="0"/>
-                <a:cs typeface="Arial" panose="020B0604020202020204" pitchFamily="34" charset="0"/>
-              </a:rPr>
-              <a:t>Github</a:t>
-            </a:r>
-            <a:r>
-              <a:rPr lang="en-US" sz="1600" dirty="0" smtClean="0">
-                <a:latin typeface="Arial" panose="020B0604020202020204" pitchFamily="34" charset="0"/>
-                <a:cs typeface="Arial" panose="020B0604020202020204" pitchFamily="34" charset="0"/>
-              </a:rPr>
-              <a:t> for version controlling the code</a:t>
-            </a:r>
-          </a:p>
-          <a:p>
-            <a:pPr marL="342900" indent="-342900">
-              <a:lnSpc>
-                <a:spcPct val="150000"/>
-              </a:lnSpc>
-              <a:spcBef>
-                <a:spcPts val="200"/>
-              </a:spcBef>
-              <a:spcAft>
-                <a:spcPts val="200"/>
-              </a:spcAft>
-              <a:buFont typeface="Wingdings" panose="05000000000000000000" pitchFamily="2" charset="2"/>
-              <a:buChar char="q"/>
-            </a:pPr>
-            <a:r>
-              <a:rPr lang="en-US" sz="1600" dirty="0" err="1" smtClean="0">
-                <a:latin typeface="Arial" panose="020B0604020202020204" pitchFamily="34" charset="0"/>
-                <a:cs typeface="Arial" panose="020B0604020202020204" pitchFamily="34" charset="0"/>
-              </a:rPr>
-              <a:t>Heroku</a:t>
-            </a:r>
-            <a:r>
-              <a:rPr lang="en-US" sz="1600" dirty="0" smtClean="0">
-                <a:latin typeface="Arial" panose="020B0604020202020204" pitchFamily="34" charset="0"/>
-                <a:cs typeface="Arial" panose="020B0604020202020204" pitchFamily="34" charset="0"/>
-              </a:rPr>
-              <a:t> for hosting the site</a:t>
-            </a:r>
-          </a:p>
-          <a:p>
-            <a:pPr marL="342900" indent="-342900">
-              <a:lnSpc>
-                <a:spcPct val="150000"/>
-              </a:lnSpc>
-              <a:spcBef>
-                <a:spcPts val="200"/>
-              </a:spcBef>
-              <a:spcAft>
-                <a:spcPts val="200"/>
-              </a:spcAft>
-              <a:buFont typeface="Wingdings" panose="05000000000000000000" pitchFamily="2" charset="2"/>
-              <a:buChar char="q"/>
-            </a:pPr>
-            <a:r>
-              <a:rPr lang="en-US" sz="1600" dirty="0" smtClean="0">
-                <a:latin typeface="Arial" panose="020B0604020202020204" pitchFamily="34" charset="0"/>
-                <a:cs typeface="Arial" panose="020B0604020202020204" pitchFamily="34" charset="0"/>
-              </a:rPr>
-              <a:t>Maven for building the application</a:t>
-            </a:r>
-            <a:endParaRPr lang="en-US" sz="1600" dirty="0"/>
-          </a:p>
-          <a:p>
-            <a:pPr marL="342900" indent="-342900">
-              <a:lnSpc>
-                <a:spcPct val="150000"/>
-              </a:lnSpc>
-              <a:spcBef>
-                <a:spcPts val="200"/>
-              </a:spcBef>
-              <a:spcAft>
-                <a:spcPts val="200"/>
-              </a:spcAft>
-              <a:buFont typeface="Wingdings" panose="05000000000000000000" pitchFamily="2" charset="2"/>
-              <a:buChar char="q"/>
             </a:pPr>
             <a:endParaRPr lang="en-US" sz="2000" dirty="0">
               <a:latin typeface="Arial" panose="020B0604020202020204" pitchFamily="34" charset="0"/>
@@ -6803,6 +6588,276 @@
           </a:p>
         </p:txBody>
       </p:sp>
+      <p:pic>
+        <p:nvPicPr>
+          <p:cNvPr id="3" name="Picture 2"/>
+          <p:cNvPicPr>
+            <a:picLocks noChangeAspect="1"/>
+          </p:cNvPicPr>
+          <p:nvPr/>
+        </p:nvPicPr>
+        <p:blipFill>
+          <a:blip r:embed="rId2">
+            <a:extLst>
+              <a:ext uri="{28A0092B-C50C-407E-A947-70E740481C1C}">
+                <a14:useLocalDpi xmlns:a14="http://schemas.microsoft.com/office/drawing/2010/main" val="0"/>
+              </a:ext>
+            </a:extLst>
+          </a:blip>
+          <a:stretch>
+            <a:fillRect/>
+          </a:stretch>
+        </p:blipFill>
+        <p:spPr>
+          <a:xfrm>
+            <a:off x="2194559" y="2880898"/>
+            <a:ext cx="1321254" cy="1400044"/>
+          </a:xfrm>
+          <a:prstGeom prst="rect">
+            <a:avLst/>
+          </a:prstGeom>
+        </p:spPr>
+      </p:pic>
+      <p:pic>
+        <p:nvPicPr>
+          <p:cNvPr id="4" name="Picture 3"/>
+          <p:cNvPicPr>
+            <a:picLocks noChangeAspect="1"/>
+          </p:cNvPicPr>
+          <p:nvPr/>
+        </p:nvPicPr>
+        <p:blipFill>
+          <a:blip r:embed="rId3">
+            <a:extLst>
+              <a:ext uri="{28A0092B-C50C-407E-A947-70E740481C1C}">
+                <a14:useLocalDpi xmlns:a14="http://schemas.microsoft.com/office/drawing/2010/main" val="0"/>
+              </a:ext>
+            </a:extLst>
+          </a:blip>
+          <a:stretch>
+            <a:fillRect/>
+          </a:stretch>
+        </p:blipFill>
+        <p:spPr>
+          <a:xfrm>
+            <a:off x="6184016" y="4131428"/>
+            <a:ext cx="956082" cy="956082"/>
+          </a:xfrm>
+          <a:prstGeom prst="rect">
+            <a:avLst/>
+          </a:prstGeom>
+        </p:spPr>
+      </p:pic>
+      <p:pic>
+        <p:nvPicPr>
+          <p:cNvPr id="5" name="Picture 4"/>
+          <p:cNvPicPr>
+            <a:picLocks noChangeAspect="1"/>
+          </p:cNvPicPr>
+          <p:nvPr/>
+        </p:nvPicPr>
+        <p:blipFill>
+          <a:blip r:embed="rId4">
+            <a:extLst>
+              <a:ext uri="{28A0092B-C50C-407E-A947-70E740481C1C}">
+                <a14:useLocalDpi xmlns:a14="http://schemas.microsoft.com/office/drawing/2010/main" val="0"/>
+              </a:ext>
+            </a:extLst>
+          </a:blip>
+          <a:stretch>
+            <a:fillRect/>
+          </a:stretch>
+        </p:blipFill>
+        <p:spPr>
+          <a:xfrm>
+            <a:off x="7140098" y="2505874"/>
+            <a:ext cx="2372259" cy="1328465"/>
+          </a:xfrm>
+          <a:prstGeom prst="rect">
+            <a:avLst/>
+          </a:prstGeom>
+        </p:spPr>
+      </p:pic>
+      <p:pic>
+        <p:nvPicPr>
+          <p:cNvPr id="7" name="Picture 6"/>
+          <p:cNvPicPr>
+            <a:picLocks noChangeAspect="1"/>
+          </p:cNvPicPr>
+          <p:nvPr/>
+        </p:nvPicPr>
+        <p:blipFill>
+          <a:blip r:embed="rId5">
+            <a:extLst>
+              <a:ext uri="{28A0092B-C50C-407E-A947-70E740481C1C}">
+                <a14:useLocalDpi xmlns:a14="http://schemas.microsoft.com/office/drawing/2010/main" val="0"/>
+              </a:ext>
+            </a:extLst>
+          </a:blip>
+          <a:stretch>
+            <a:fillRect/>
+          </a:stretch>
+        </p:blipFill>
+        <p:spPr>
+          <a:xfrm>
+            <a:off x="3835876" y="4168583"/>
+            <a:ext cx="1864959" cy="1031285"/>
+          </a:xfrm>
+          <a:prstGeom prst="rect">
+            <a:avLst/>
+          </a:prstGeom>
+        </p:spPr>
+      </p:pic>
+      <p:pic>
+        <p:nvPicPr>
+          <p:cNvPr id="8" name="Picture 7"/>
+          <p:cNvPicPr>
+            <a:picLocks noChangeAspect="1"/>
+          </p:cNvPicPr>
+          <p:nvPr/>
+        </p:nvPicPr>
+        <p:blipFill>
+          <a:blip r:embed="rId6">
+            <a:extLst>
+              <a:ext uri="{28A0092B-C50C-407E-A947-70E740481C1C}">
+                <a14:useLocalDpi xmlns:a14="http://schemas.microsoft.com/office/drawing/2010/main" val="0"/>
+              </a:ext>
+            </a:extLst>
+          </a:blip>
+          <a:stretch>
+            <a:fillRect/>
+          </a:stretch>
+        </p:blipFill>
+        <p:spPr>
+          <a:xfrm>
+            <a:off x="6492964" y="5401118"/>
+            <a:ext cx="1125175" cy="1125175"/>
+          </a:xfrm>
+          <a:prstGeom prst="rect">
+            <a:avLst/>
+          </a:prstGeom>
+        </p:spPr>
+      </p:pic>
+      <p:pic>
+        <p:nvPicPr>
+          <p:cNvPr id="9" name="Picture 8"/>
+          <p:cNvPicPr>
+            <a:picLocks noChangeAspect="1"/>
+          </p:cNvPicPr>
+          <p:nvPr/>
+        </p:nvPicPr>
+        <p:blipFill>
+          <a:blip r:embed="rId7">
+            <a:extLst>
+              <a:ext uri="{28A0092B-C50C-407E-A947-70E740481C1C}">
+                <a14:useLocalDpi xmlns:a14="http://schemas.microsoft.com/office/drawing/2010/main" val="0"/>
+              </a:ext>
+            </a:extLst>
+          </a:blip>
+          <a:stretch>
+            <a:fillRect/>
+          </a:stretch>
+        </p:blipFill>
+        <p:spPr>
+          <a:xfrm>
+            <a:off x="8731176" y="5401118"/>
+            <a:ext cx="1252026" cy="1252026"/>
+          </a:xfrm>
+          <a:prstGeom prst="rect">
+            <a:avLst/>
+          </a:prstGeom>
+        </p:spPr>
+      </p:pic>
+      <p:pic>
+        <p:nvPicPr>
+          <p:cNvPr id="10" name="Picture 9"/>
+          <p:cNvPicPr>
+            <a:picLocks noChangeAspect="1"/>
+          </p:cNvPicPr>
+          <p:nvPr/>
+        </p:nvPicPr>
+        <p:blipFill>
+          <a:blip r:embed="rId8">
+            <a:extLst>
+              <a:ext uri="{28A0092B-C50C-407E-A947-70E740481C1C}">
+                <a14:useLocalDpi xmlns:a14="http://schemas.microsoft.com/office/drawing/2010/main" val="0"/>
+              </a:ext>
+            </a:extLst>
+          </a:blip>
+          <a:stretch>
+            <a:fillRect/>
+          </a:stretch>
+        </p:blipFill>
+        <p:spPr>
+          <a:xfrm>
+            <a:off x="4263267" y="2667279"/>
+            <a:ext cx="1825806" cy="1009634"/>
+          </a:xfrm>
+          <a:prstGeom prst="rect">
+            <a:avLst/>
+          </a:prstGeom>
+        </p:spPr>
+      </p:pic>
+      <p:pic>
+        <p:nvPicPr>
+          <p:cNvPr id="11" name="Picture 10"/>
+          <p:cNvPicPr>
+            <a:picLocks noChangeAspect="1"/>
+          </p:cNvPicPr>
+          <p:nvPr/>
+        </p:nvPicPr>
+        <p:blipFill>
+          <a:blip r:embed="rId9">
+            <a:extLst>
+              <a:ext uri="{28A0092B-C50C-407E-A947-70E740481C1C}">
+                <a14:useLocalDpi xmlns:a14="http://schemas.microsoft.com/office/drawing/2010/main" val="0"/>
+              </a:ext>
+            </a:extLst>
+          </a:blip>
+          <a:stretch>
+            <a:fillRect/>
+          </a:stretch>
+        </p:blipFill>
+        <p:spPr>
+          <a:xfrm>
+            <a:off x="1358537" y="5626834"/>
+            <a:ext cx="3487918" cy="934408"/>
+          </a:xfrm>
+          <a:prstGeom prst="rect">
+            <a:avLst/>
+          </a:prstGeom>
+        </p:spPr>
+      </p:pic>
+      <p:pic>
+        <p:nvPicPr>
+          <p:cNvPr id="12" name="Picture 11"/>
+          <p:cNvPicPr>
+            <a:picLocks noChangeAspect="1"/>
+          </p:cNvPicPr>
+          <p:nvPr/>
+        </p:nvPicPr>
+        <p:blipFill>
+          <a:blip r:embed="rId10">
+            <a:extLst>
+              <a:ext uri="{28A0092B-C50C-407E-A947-70E740481C1C}">
+                <a14:useLocalDpi xmlns:a14="http://schemas.microsoft.com/office/drawing/2010/main" val="0"/>
+              </a:ext>
+            </a:extLst>
+          </a:blip>
+          <a:stretch>
+            <a:fillRect/>
+          </a:stretch>
+        </p:blipFill>
+        <p:spPr>
+          <a:xfrm>
+            <a:off x="8579361" y="4280942"/>
+            <a:ext cx="2407294" cy="806568"/>
+          </a:xfrm>
+          <a:prstGeom prst="rect">
+            <a:avLst/>
+          </a:prstGeom>
+        </p:spPr>
+      </p:pic>
     </p:spTree>
     <p:extLst>
       <p:ext uri="{BB962C8B-B14F-4D97-AF65-F5344CB8AC3E}">

</xml_diff>

<commit_message>
Modified presentation with semantic changes
</commit_message>
<xml_diff>
--- a/docs/presentation/Walk_Tracker.pptx
+++ b/docs/presentation/Walk_Tracker.pptx
@@ -19,6 +19,7 @@
     <p:sldId id="269" r:id="rId13"/>
     <p:sldId id="270" r:id="rId14"/>
     <p:sldId id="264" r:id="rId15"/>
+    <p:sldId id="271" r:id="rId16"/>
   </p:sldIdLst>
   <p:sldSz cx="12192000" cy="6858000"/>
   <p:notesSz cx="6858000" cy="9144000"/>
@@ -8918,7 +8919,7 @@
           <a:p>
             <a:fld id="{AE7B9B7E-AC06-4BAC-A9B2-F0CC841AF390}" type="datetimeFigureOut">
               <a:rPr lang="en-US" smtClean="0"/>
-              <a:t>9/1/2020</a:t>
+              <a:t>9/2/2020</a:t>
             </a:fld>
             <a:endParaRPr lang="en-US"/>
           </a:p>
@@ -9130,7 +9131,7 @@
           <a:p>
             <a:fld id="{AE7B9B7E-AC06-4BAC-A9B2-F0CC841AF390}" type="datetimeFigureOut">
               <a:rPr lang="en-US" smtClean="0"/>
-              <a:t>9/1/2020</a:t>
+              <a:t>9/2/2020</a:t>
             </a:fld>
             <a:endParaRPr lang="en-US"/>
           </a:p>
@@ -9310,7 +9311,7 @@
           <a:p>
             <a:fld id="{AE7B9B7E-AC06-4BAC-A9B2-F0CC841AF390}" type="datetimeFigureOut">
               <a:rPr lang="en-US" smtClean="0"/>
-              <a:t>9/1/2020</a:t>
+              <a:t>9/2/2020</a:t>
             </a:fld>
             <a:endParaRPr lang="en-US"/>
           </a:p>
@@ -9515,7 +9516,7 @@
           <a:p>
             <a:fld id="{AE7B9B7E-AC06-4BAC-A9B2-F0CC841AF390}" type="datetimeFigureOut">
               <a:rPr lang="en-US" smtClean="0"/>
-              <a:t>9/1/2020</a:t>
+              <a:t>9/2/2020</a:t>
             </a:fld>
             <a:endParaRPr lang="en-US"/>
           </a:p>
@@ -18413,7 +18414,7 @@
           <a:p>
             <a:fld id="{AE7B9B7E-AC06-4BAC-A9B2-F0CC841AF390}" type="datetimeFigureOut">
               <a:rPr lang="en-US" smtClean="0"/>
-              <a:t>9/1/2020</a:t>
+              <a:t>9/2/2020</a:t>
             </a:fld>
             <a:endParaRPr lang="en-US"/>
           </a:p>
@@ -18692,7 +18693,7 @@
           <a:p>
             <a:fld id="{AE7B9B7E-AC06-4BAC-A9B2-F0CC841AF390}" type="datetimeFigureOut">
               <a:rPr lang="en-US" smtClean="0"/>
-              <a:t>9/1/2020</a:t>
+              <a:t>9/2/2020</a:t>
             </a:fld>
             <a:endParaRPr lang="en-US"/>
           </a:p>
@@ -19090,7 +19091,7 @@
           <a:p>
             <a:fld id="{AE7B9B7E-AC06-4BAC-A9B2-F0CC841AF390}" type="datetimeFigureOut">
               <a:rPr lang="en-US" smtClean="0"/>
-              <a:t>9/1/2020</a:t>
+              <a:t>9/2/2020</a:t>
             </a:fld>
             <a:endParaRPr lang="en-US"/>
           </a:p>
@@ -19208,7 +19209,7 @@
           <a:p>
             <a:fld id="{AE7B9B7E-AC06-4BAC-A9B2-F0CC841AF390}" type="datetimeFigureOut">
               <a:rPr lang="en-US" smtClean="0"/>
-              <a:t>9/1/2020</a:t>
+              <a:t>9/2/2020</a:t>
             </a:fld>
             <a:endParaRPr lang="en-US"/>
           </a:p>
@@ -19303,7 +19304,7 @@
           <a:p>
             <a:fld id="{AE7B9B7E-AC06-4BAC-A9B2-F0CC841AF390}" type="datetimeFigureOut">
               <a:rPr lang="en-US" smtClean="0"/>
-              <a:t>9/1/2020</a:t>
+              <a:t>9/2/2020</a:t>
             </a:fld>
             <a:endParaRPr lang="en-US"/>
           </a:p>
@@ -19598,7 +19599,7 @@
           <a:p>
             <a:fld id="{AE7B9B7E-AC06-4BAC-A9B2-F0CC841AF390}" type="datetimeFigureOut">
               <a:rPr lang="en-US" smtClean="0"/>
-              <a:t>9/1/2020</a:t>
+              <a:t>9/2/2020</a:t>
             </a:fld>
             <a:endParaRPr lang="en-US"/>
           </a:p>
@@ -19878,7 +19879,7 @@
           <a:p>
             <a:fld id="{AE7B9B7E-AC06-4BAC-A9B2-F0CC841AF390}" type="datetimeFigureOut">
               <a:rPr lang="en-US" smtClean="0"/>
-              <a:t>9/1/2020</a:t>
+              <a:t>9/2/2020</a:t>
             </a:fld>
             <a:endParaRPr lang="en-US"/>
           </a:p>
@@ -20128,7 +20129,7 @@
           <a:p>
             <a:fld id="{AE7B9B7E-AC06-4BAC-A9B2-F0CC841AF390}" type="datetimeFigureOut">
               <a:rPr lang="en-US" smtClean="0"/>
-              <a:t>9/1/2020</a:t>
+              <a:t>9/2/2020</a:t>
             </a:fld>
             <a:endParaRPr lang="en-US"/>
           </a:p>
@@ -20781,7 +20782,7 @@
         </p:nvSpPr>
         <p:spPr>
           <a:xfrm>
-            <a:off x="913775" y="618517"/>
+            <a:off x="906847" y="747063"/>
             <a:ext cx="10364451" cy="1016319"/>
           </a:xfrm>
         </p:spPr>
@@ -20820,7 +20821,7 @@
         </p:nvSpPr>
         <p:spPr>
           <a:xfrm>
-            <a:off x="1191491" y="1911927"/>
+            <a:off x="906847" y="2062384"/>
             <a:ext cx="9795164" cy="1195199"/>
           </a:xfrm>
           <a:prstGeom prst="rect">
@@ -20889,7 +20890,7 @@
         </p:blipFill>
         <p:spPr>
           <a:xfrm>
-            <a:off x="2194559" y="2880898"/>
+            <a:off x="1612405" y="3313285"/>
             <a:ext cx="1321254" cy="1400044"/>
           </a:xfrm>
           <a:prstGeom prst="rect">
@@ -20949,7 +20950,7 @@
         </p:blipFill>
         <p:spPr>
           <a:xfrm>
-            <a:off x="7140098" y="2505874"/>
+            <a:off x="7016243" y="2795673"/>
             <a:ext cx="2372259" cy="1328465"/>
           </a:xfrm>
           <a:prstGeom prst="rect">
@@ -20979,7 +20980,7 @@
         </p:blipFill>
         <p:spPr>
           <a:xfrm>
-            <a:off x="3835876" y="4168583"/>
+            <a:off x="3495802" y="4522741"/>
             <a:ext cx="1864959" cy="1031285"/>
           </a:xfrm>
           <a:prstGeom prst="rect">
@@ -21069,7 +21070,7 @@
         </p:blipFill>
         <p:spPr>
           <a:xfrm>
-            <a:off x="4263267" y="2667279"/>
+            <a:off x="3933552" y="3121794"/>
             <a:ext cx="1825806" cy="1009634"/>
           </a:xfrm>
           <a:prstGeom prst="rect">
@@ -21129,7 +21130,7 @@
         </p:blipFill>
         <p:spPr>
           <a:xfrm>
-            <a:off x="8579361" y="4280942"/>
+            <a:off x="8487921" y="4454143"/>
             <a:ext cx="2407294" cy="806568"/>
           </a:xfrm>
           <a:prstGeom prst="rect">
@@ -21179,7 +21180,7 @@
         </p:nvSpPr>
         <p:spPr>
           <a:xfrm>
-            <a:off x="913775" y="618517"/>
+            <a:off x="906847" y="821530"/>
             <a:ext cx="10364451" cy="1016319"/>
           </a:xfrm>
         </p:spPr>
@@ -21274,7 +21275,7 @@
         </p:blipFill>
         <p:spPr>
           <a:xfrm>
-            <a:off x="2259346" y="1759636"/>
+            <a:off x="2141780" y="2086208"/>
             <a:ext cx="7673307" cy="4662625"/>
           </a:xfrm>
           <a:prstGeom prst="rect">
@@ -21324,7 +21325,7 @@
         </p:nvSpPr>
         <p:spPr>
           <a:xfrm>
-            <a:off x="913775" y="618517"/>
+            <a:off x="913775" y="762209"/>
             <a:ext cx="10364451" cy="1016319"/>
           </a:xfrm>
         </p:spPr>
@@ -21417,8 +21418,8 @@
         </p:blipFill>
         <p:spPr>
           <a:xfrm>
-            <a:off x="1531795" y="1634836"/>
-            <a:ext cx="8503422" cy="4973700"/>
+            <a:off x="2050869" y="1938444"/>
+            <a:ext cx="7984348" cy="4670091"/>
           </a:xfrm>
           <a:prstGeom prst="rect">
             <a:avLst/>
@@ -21467,8 +21468,8 @@
         </p:nvSpPr>
         <p:spPr>
           <a:xfrm>
-            <a:off x="913775" y="618517"/>
-            <a:ext cx="10364451" cy="1016319"/>
+            <a:off x="913775" y="765759"/>
+            <a:ext cx="11012614" cy="1016319"/>
           </a:xfrm>
         </p:spPr>
         <p:txBody>
@@ -21500,7 +21501,21 @@
                 <a:latin typeface="Arial" panose="020B0604020202020204" pitchFamily="34" charset="0"/>
                 <a:cs typeface="Arial" panose="020B0604020202020204" pitchFamily="34" charset="0"/>
               </a:rPr>
-              <a:t>Plan(Cont..)</a:t>
+              <a:t>Plan(</a:t>
+            </a:r>
+            <a:r>
+              <a:rPr lang="en-US" dirty="0" err="1" smtClean="0">
+                <a:latin typeface="Arial" panose="020B0604020202020204" pitchFamily="34" charset="0"/>
+                <a:cs typeface="Arial" panose="020B0604020202020204" pitchFamily="34" charset="0"/>
+              </a:rPr>
+              <a:t>Cnt</a:t>
+            </a:r>
+            <a:r>
+              <a:rPr lang="en-US" dirty="0" smtClean="0">
+                <a:latin typeface="Arial" panose="020B0604020202020204" pitchFamily="34" charset="0"/>
+                <a:cs typeface="Arial" panose="020B0604020202020204" pitchFamily="34" charset="0"/>
+              </a:rPr>
+              <a:t>..)</a:t>
             </a:r>
             <a:endParaRPr lang="en-US" dirty="0">
               <a:latin typeface="Arial" panose="020B0604020202020204" pitchFamily="34" charset="0"/>
@@ -21517,7 +21532,7 @@
         </p:nvSpPr>
         <p:spPr>
           <a:xfrm>
-            <a:off x="1724297" y="1972491"/>
+            <a:off x="1737360" y="2355886"/>
             <a:ext cx="7419703" cy="456535"/>
           </a:xfrm>
           <a:prstGeom prst="rect">
@@ -21572,7 +21587,7 @@
         </p:nvSpPr>
         <p:spPr>
           <a:xfrm>
-            <a:off x="6746421" y="2103067"/>
+            <a:off x="6759484" y="2429026"/>
             <a:ext cx="2782389" cy="646331"/>
           </a:xfrm>
           <a:prstGeom prst="rect">
@@ -21625,7 +21640,7 @@
         </p:blipFill>
         <p:spPr>
           <a:xfrm>
-            <a:off x="6968489" y="3019128"/>
+            <a:off x="6968489" y="3352935"/>
             <a:ext cx="3978184" cy="2968337"/>
           </a:xfrm>
           <a:prstGeom prst="rect">
@@ -21655,7 +21670,7 @@
         </p:blipFill>
         <p:spPr>
           <a:xfrm>
-            <a:off x="669502" y="3019128"/>
+            <a:off x="669502" y="3345699"/>
             <a:ext cx="5574543" cy="2975573"/>
           </a:xfrm>
           <a:prstGeom prst="rect">
@@ -21705,7 +21720,7 @@
         </p:nvSpPr>
         <p:spPr>
           <a:xfrm>
-            <a:off x="913775" y="618517"/>
+            <a:off x="913774" y="853648"/>
             <a:ext cx="10364451" cy="1016319"/>
           </a:xfrm>
         </p:spPr>
@@ -21744,8 +21759,8 @@
         </p:blipFill>
         <p:spPr>
           <a:xfrm>
-            <a:off x="2708599" y="1634836"/>
-            <a:ext cx="6774801" cy="4999047"/>
+            <a:off x="3104723" y="2245552"/>
+            <a:ext cx="5982554" cy="4414457"/>
           </a:xfrm>
           <a:prstGeom prst="rect">
             <a:avLst/>
@@ -21756,6 +21771,65 @@
     <p:extLst>
       <p:ext uri="{BB962C8B-B14F-4D97-AF65-F5344CB8AC3E}">
         <p14:creationId xmlns:p14="http://schemas.microsoft.com/office/powerpoint/2010/main" val="2754759596"/>
+      </p:ext>
+    </p:extLst>
+  </p:cSld>
+  <p:clrMapOvr>
+    <a:masterClrMapping/>
+  </p:clrMapOvr>
+</p:sld>
+</file>
+
+<file path=ppt/slides/slide15.xml><?xml version="1.0" encoding="utf-8"?>
+<p:sld xmlns:a="http://schemas.openxmlformats.org/drawingml/2006/main" xmlns:r="http://schemas.openxmlformats.org/officeDocument/2006/relationships" xmlns:p="http://schemas.openxmlformats.org/presentationml/2006/main">
+  <p:cSld>
+    <p:spTree>
+      <p:nvGrpSpPr>
+        <p:cNvPr id="1" name=""/>
+        <p:cNvGrpSpPr/>
+        <p:nvPr/>
+      </p:nvGrpSpPr>
+      <p:grpSpPr>
+        <a:xfrm>
+          <a:off x="0" y="0"/>
+          <a:ext cx="0" cy="0"/>
+          <a:chOff x="0" y="0"/>
+          <a:chExt cx="0" cy="0"/>
+        </a:xfrm>
+      </p:grpSpPr>
+      <p:pic>
+        <p:nvPicPr>
+          <p:cNvPr id="4" name="Content Placeholder 3"/>
+          <p:cNvPicPr>
+            <a:picLocks noGrp="1" noChangeAspect="1"/>
+          </p:cNvPicPr>
+          <p:nvPr>
+            <p:ph idx="1"/>
+          </p:nvPr>
+        </p:nvPicPr>
+        <p:blipFill>
+          <a:blip r:embed="rId2">
+            <a:extLst>
+              <a:ext uri="{28A0092B-C50C-407E-A947-70E740481C1C}">
+                <a14:useLocalDpi xmlns:a14="http://schemas.microsoft.com/office/drawing/2010/main" val="0"/>
+              </a:ext>
+            </a:extLst>
+          </a:blip>
+          <a:stretch>
+            <a:fillRect/>
+          </a:stretch>
+        </p:blipFill>
+        <p:spPr>
+          <a:xfrm>
+            <a:off x="3304903" y="928178"/>
+            <a:ext cx="4766271" cy="5573462"/>
+          </a:xfrm>
+        </p:spPr>
+      </p:pic>
+    </p:spTree>
+    <p:extLst>
+      <p:ext uri="{BB962C8B-B14F-4D97-AF65-F5344CB8AC3E}">
+        <p14:creationId xmlns:p14="http://schemas.microsoft.com/office/powerpoint/2010/main" val="1197887589"/>
       </p:ext>
     </p:extLst>
   </p:cSld>
@@ -21794,7 +21868,7 @@
         </p:nvSpPr>
         <p:spPr>
           <a:xfrm>
-            <a:off x="913775" y="618517"/>
+            <a:off x="913776" y="775272"/>
             <a:ext cx="10364451" cy="1016319"/>
           </a:xfrm>
         </p:spPr>
@@ -22005,7 +22079,7 @@
         </p:nvSpPr>
         <p:spPr>
           <a:xfrm>
-            <a:off x="913775" y="618517"/>
+            <a:off x="920701" y="840189"/>
             <a:ext cx="10364451" cy="1016319"/>
           </a:xfrm>
         </p:spPr>
@@ -22063,7 +22137,7 @@
         </p:nvSpPr>
         <p:spPr>
           <a:xfrm>
-            <a:off x="1052945" y="1856508"/>
+            <a:off x="1052944" y="2422404"/>
             <a:ext cx="10099964" cy="1015663"/>
           </a:xfrm>
           <a:prstGeom prst="rect">
@@ -22166,7 +22240,7 @@
         </p:nvSpPr>
         <p:spPr>
           <a:xfrm>
-            <a:off x="913775" y="618517"/>
+            <a:off x="906847" y="895608"/>
             <a:ext cx="10364451" cy="1016319"/>
           </a:xfrm>
         </p:spPr>
@@ -22201,8 +22275,8 @@
         </p:nvSpPr>
         <p:spPr>
           <a:xfrm>
-            <a:off x="1191491" y="1911927"/>
-            <a:ext cx="9795164" cy="4119076"/>
+            <a:off x="1191490" y="2160121"/>
+            <a:ext cx="9795164" cy="3811300"/>
           </a:xfrm>
           <a:prstGeom prst="rect">
             <a:avLst/>
@@ -22216,27 +22290,25 @@
           <a:lstStyle/>
           <a:p>
             <a:r>
-              <a:rPr lang="en-US" sz="2000" dirty="0">
-                <a:latin typeface="Arial" panose="020B0604020202020204" pitchFamily="34" charset="0"/>
-                <a:cs typeface="Arial" panose="020B0604020202020204" pitchFamily="34" charset="0"/>
-              </a:rPr>
-              <a:t>The Quality of life is defined by quality of food we intake and the lifestyle we maintain. </a:t>
-            </a:r>
-          </a:p>
-          <a:p>
-            <a:r>
-              <a:rPr lang="en-US" sz="2000" dirty="0" err="1">
+              <a:rPr lang="en-US" sz="2000" dirty="0" err="1" smtClean="0">
                 <a:latin typeface="Arial" panose="020B0604020202020204" pitchFamily="34" charset="0"/>
                 <a:cs typeface="Arial" panose="020B0604020202020204" pitchFamily="34" charset="0"/>
               </a:rPr>
               <a:t>WalkTracker</a:t>
             </a:r>
             <a:r>
+              <a:rPr lang="en-US" sz="2000" dirty="0" smtClean="0">
+                <a:latin typeface="Arial" panose="020B0604020202020204" pitchFamily="34" charset="0"/>
+                <a:cs typeface="Arial" panose="020B0604020202020204" pitchFamily="34" charset="0"/>
+              </a:rPr>
+              <a:t> </a:t>
+            </a:r>
+            <a:r>
               <a:rPr lang="en-US" sz="2000" dirty="0">
                 <a:latin typeface="Arial" panose="020B0604020202020204" pitchFamily="34" charset="0"/>
                 <a:cs typeface="Arial" panose="020B0604020202020204" pitchFamily="34" charset="0"/>
               </a:rPr>
-              <a:t> is a digital technology to help people eat better, get fitter and lose weight. The primary solution is delivered via a smartphone app (iOS, Android, PC) with a team of qualified diet/ fitness expert’s available in-app</a:t>
+              <a:t>is a digital technology to help people eat better, get fitter and lose weight. The primary solution is delivered via a smartphone app (iOS, Android, PC) with a team of qualified diet/ fitness expert’s available in-app</a:t>
             </a:r>
             <a:r>
               <a:rPr lang="en-US" sz="2000" dirty="0" smtClean="0">
@@ -22294,7 +22366,7 @@
                 <a:latin typeface="Arial" panose="020B0604020202020204" pitchFamily="34" charset="0"/>
                 <a:cs typeface="Arial" panose="020B0604020202020204" pitchFamily="34" charset="0"/>
               </a:rPr>
-              <a:t>Step Count</a:t>
+              <a:t>user activity</a:t>
             </a:r>
             <a:endParaRPr lang="en-US" sz="2000" dirty="0">
               <a:latin typeface="Arial" panose="020B0604020202020204" pitchFamily="34" charset="0"/>
@@ -22487,7 +22559,7 @@
         </p:nvSpPr>
         <p:spPr>
           <a:xfrm>
-            <a:off x="913775" y="618517"/>
+            <a:off x="906847" y="895608"/>
             <a:ext cx="10364451" cy="1016319"/>
           </a:xfrm>
         </p:spPr>
@@ -22526,8 +22598,8 @@
         </p:nvSpPr>
         <p:spPr>
           <a:xfrm>
-            <a:off x="1191491" y="1911927"/>
-            <a:ext cx="9795164" cy="2990562"/>
+            <a:off x="1021674" y="2473629"/>
+            <a:ext cx="9795164" cy="3503523"/>
           </a:xfrm>
           <a:prstGeom prst="rect">
             <a:avLst/>
@@ -22589,12 +22661,56 @@
               <a:buChar char="q"/>
             </a:pPr>
             <a:r>
+              <a:rPr lang="en-US" sz="2000" dirty="0" smtClean="0">
+                <a:latin typeface="Arial" panose="020B0604020202020204" pitchFamily="34" charset="0"/>
+                <a:cs typeface="Arial" panose="020B0604020202020204" pitchFamily="34" charset="0"/>
+              </a:rPr>
+              <a:t>Provide various </a:t>
+            </a:r>
+            <a:r>
               <a:rPr lang="en-US" sz="2000" dirty="0">
                 <a:latin typeface="Arial" panose="020B0604020202020204" pitchFamily="34" charset="0"/>
                 <a:cs typeface="Arial" panose="020B0604020202020204" pitchFamily="34" charset="0"/>
               </a:rPr>
-              <a:t>The app helps users to track their steps, food intake and other health measurements which helps to track their health.</a:t>
+              <a:t>exercise programs and guidance for workouts. </a:t>
             </a:r>
+            <a:endParaRPr lang="en-US" sz="2000" dirty="0" smtClean="0">
+              <a:latin typeface="Arial" panose="020B0604020202020204" pitchFamily="34" charset="0"/>
+              <a:cs typeface="Arial" panose="020B0604020202020204" pitchFamily="34" charset="0"/>
+            </a:endParaRPr>
+          </a:p>
+          <a:p>
+            <a:pPr marL="342900" indent="-342900">
+              <a:lnSpc>
+                <a:spcPct val="150000"/>
+              </a:lnSpc>
+              <a:spcBef>
+                <a:spcPts val="200"/>
+              </a:spcBef>
+              <a:spcAft>
+                <a:spcPts val="200"/>
+              </a:spcAft>
+              <a:buFont typeface="Wingdings" panose="05000000000000000000" pitchFamily="2" charset="2"/>
+              <a:buChar char="q"/>
+            </a:pPr>
+            <a:r>
+              <a:rPr lang="en-US" sz="2000" dirty="0" smtClean="0">
+                <a:latin typeface="Arial" panose="020B0604020202020204" pitchFamily="34" charset="0"/>
+                <a:cs typeface="Arial" panose="020B0604020202020204" pitchFamily="34" charset="0"/>
+              </a:rPr>
+              <a:t>Ability </a:t>
+            </a:r>
+            <a:r>
+              <a:rPr lang="en-US" sz="2000" dirty="0">
+                <a:latin typeface="Arial" panose="020B0604020202020204" pitchFamily="34" charset="0"/>
+                <a:cs typeface="Arial" panose="020B0604020202020204" pitchFamily="34" charset="0"/>
+              </a:rPr>
+              <a:t>to set personal goals</a:t>
+            </a:r>
+            <a:endParaRPr lang="en-US" sz="2000" dirty="0">
+              <a:latin typeface="Arial" panose="020B0604020202020204" pitchFamily="34" charset="0"/>
+              <a:cs typeface="Arial" panose="020B0604020202020204" pitchFamily="34" charset="0"/>
+            </a:endParaRPr>
           </a:p>
           <a:p>
             <a:pPr marL="342900" indent="-342900">
@@ -22615,8 +22731,12 @@
                 <a:latin typeface="Arial" panose="020B0604020202020204" pitchFamily="34" charset="0"/>
                 <a:cs typeface="Arial" panose="020B0604020202020204" pitchFamily="34" charset="0"/>
               </a:rPr>
-              <a:t>Users who gained points which can be used to buy products in our App market.</a:t>
+              <a:t>Communication features, such as a forum for sharing users’ experiences, recipes, etc. </a:t>
             </a:r>
+            <a:endParaRPr lang="en-US" sz="2000" dirty="0" smtClean="0">
+              <a:latin typeface="Arial" panose="020B0604020202020204" pitchFamily="34" charset="0"/>
+              <a:cs typeface="Arial" panose="020B0604020202020204" pitchFamily="34" charset="0"/>
+            </a:endParaRPr>
           </a:p>
           <a:p>
             <a:pPr marL="342900" indent="-342900">
@@ -22633,12 +22753,23 @@
               <a:buChar char="q"/>
             </a:pPr>
             <a:r>
-              <a:rPr lang="en-US" sz="2000" dirty="0">
+              <a:rPr lang="en-US" sz="2000" dirty="0" smtClean="0">
                 <a:latin typeface="Arial" panose="020B0604020202020204" pitchFamily="34" charset="0"/>
                 <a:cs typeface="Arial" panose="020B0604020202020204" pitchFamily="34" charset="0"/>
               </a:rPr>
-              <a:t>The user statistical data can be used to predict users health prior to attack.</a:t>
+              <a:t>The </a:t>
             </a:r>
+            <a:r>
+              <a:rPr lang="en-US" sz="2000" dirty="0" smtClean="0">
+                <a:latin typeface="Arial" panose="020B0604020202020204" pitchFamily="34" charset="0"/>
+                <a:cs typeface="Arial" panose="020B0604020202020204" pitchFamily="34" charset="0"/>
+              </a:rPr>
+              <a:t>user statistical data can be used to predict users health prior to attack.</a:t>
+            </a:r>
+            <a:endParaRPr lang="en-US" sz="2000" dirty="0">
+              <a:latin typeface="Arial" panose="020B0604020202020204" pitchFamily="34" charset="0"/>
+              <a:cs typeface="Arial" panose="020B0604020202020204" pitchFamily="34" charset="0"/>
+            </a:endParaRPr>
           </a:p>
         </p:txBody>
       </p:sp>
@@ -22684,7 +22815,7 @@
         </p:nvSpPr>
         <p:spPr>
           <a:xfrm>
-            <a:off x="913775" y="618517"/>
+            <a:off x="918265" y="922764"/>
             <a:ext cx="10364451" cy="1016319"/>
           </a:xfrm>
         </p:spPr>
@@ -23198,7 +23329,7 @@
         </p:nvSpPr>
         <p:spPr>
           <a:xfrm>
-            <a:off x="913775" y="618517"/>
+            <a:off x="913774" y="814460"/>
             <a:ext cx="10364451" cy="1016319"/>
           </a:xfrm>
         </p:spPr>
@@ -23226,7 +23357,7 @@
         </p:nvSpPr>
         <p:spPr>
           <a:xfrm>
-            <a:off x="1191491" y="1911927"/>
+            <a:off x="1198418" y="2225435"/>
             <a:ext cx="9795164" cy="4272965"/>
           </a:xfrm>
           <a:prstGeom prst="rect">
@@ -23408,11 +23539,11 @@
               <a:buChar char="q"/>
             </a:pPr>
             <a:r>
-              <a:rPr lang="en-US" sz="2000" dirty="0">
+              <a:rPr lang="en-US" sz="2000" dirty="0" smtClean="0">
                 <a:latin typeface="Arial" panose="020B0604020202020204" pitchFamily="34" charset="0"/>
                 <a:cs typeface="Arial" panose="020B0604020202020204" pitchFamily="34" charset="0"/>
               </a:rPr>
-              <a:t>Others TBD</a:t>
+              <a:t>Heart Rate</a:t>
             </a:r>
             <a:endParaRPr lang="en-US" sz="2000" dirty="0">
               <a:latin typeface="Arial" panose="020B0604020202020204" pitchFamily="34" charset="0"/>
@@ -23463,7 +23594,7 @@
         </p:nvSpPr>
         <p:spPr>
           <a:xfrm>
-            <a:off x="913775" y="618517"/>
+            <a:off x="906847" y="895608"/>
             <a:ext cx="10364451" cy="1016319"/>
           </a:xfrm>
         </p:spPr>
@@ -23502,7 +23633,7 @@
         </p:nvSpPr>
         <p:spPr>
           <a:xfrm>
-            <a:off x="1191491" y="1911927"/>
+            <a:off x="1191490" y="2160121"/>
             <a:ext cx="9795164" cy="4580741"/>
           </a:xfrm>
           <a:prstGeom prst="rect">
@@ -23746,7 +23877,7 @@
         </p:nvSpPr>
         <p:spPr>
           <a:xfrm>
-            <a:off x="913775" y="618517"/>
+            <a:off x="926838" y="895608"/>
             <a:ext cx="10364451" cy="1016319"/>
           </a:xfrm>
         </p:spPr>
@@ -23788,7 +23919,7 @@
         </p:blipFill>
         <p:spPr>
           <a:xfrm>
-            <a:off x="2965269" y="1911927"/>
+            <a:off x="2939143" y="2186247"/>
             <a:ext cx="5905751" cy="4436463"/>
           </a:xfrm>
           <a:prstGeom prst="rect">

</xml_diff>

<commit_message>
Few minor changes on to the presentation and document
</commit_message>
<xml_diff>
--- a/docs/presentation/Walk_Tracker.pptx
+++ b/docs/presentation/Walk_Tracker.pptx
@@ -20678,8 +20678,8 @@
         </p:nvSpPr>
         <p:spPr>
           <a:xfrm>
-            <a:off x="8739051" y="5266705"/>
-            <a:ext cx="2118760" cy="872691"/>
+            <a:off x="8739050" y="4801632"/>
+            <a:ext cx="3853544" cy="1860425"/>
           </a:xfrm>
         </p:spPr>
         <p:txBody>
@@ -20689,7 +20689,7 @@
           <a:lstStyle/>
           <a:p>
             <a:r>
-              <a:rPr lang="en-US" sz="3600" dirty="0" smtClean="0">
+              <a:rPr lang="en-US" sz="2800" dirty="0" smtClean="0">
                 <a:solidFill>
                   <a:schemeClr val="tx1">
                     <a:lumMod val="85000"/>
@@ -20697,9 +20697,78 @@
                   </a:schemeClr>
                 </a:solidFill>
               </a:rPr>
-              <a:t>Group C </a:t>
+              <a:t>Client</a:t>
             </a:r>
-            <a:endParaRPr lang="en-US" sz="3600" dirty="0">
+            <a:r>
+              <a:rPr lang="en-US" sz="2800" dirty="0">
+                <a:solidFill>
+                  <a:schemeClr val="tx1">
+                    <a:lumMod val="85000"/>
+                    <a:lumOff val="15000"/>
+                  </a:schemeClr>
+                </a:solidFill>
+              </a:rPr>
+              <a:t>: </a:t>
+            </a:r>
+            <a:endParaRPr lang="en-US" sz="2800" dirty="0" smtClean="0">
+              <a:solidFill>
+                <a:schemeClr val="tx1">
+                  <a:lumMod val="85000"/>
+                  <a:lumOff val="15000"/>
+                </a:schemeClr>
+              </a:solidFill>
+            </a:endParaRPr>
+          </a:p>
+          <a:p>
+            <a:r>
+              <a:rPr lang="en-US" sz="2800" dirty="0" smtClean="0">
+                <a:solidFill>
+                  <a:srgbClr val="0070C0"/>
+                </a:solidFill>
+              </a:rPr>
+              <a:t>Dr</a:t>
+            </a:r>
+            <a:r>
+              <a:rPr lang="en-US" sz="2800" dirty="0">
+                <a:solidFill>
+                  <a:srgbClr val="0070C0"/>
+                </a:solidFill>
+              </a:rPr>
+              <a:t>. Rhonda </a:t>
+            </a:r>
+            <a:r>
+              <a:rPr lang="en-US" sz="2800" dirty="0" smtClean="0">
+                <a:solidFill>
+                  <a:srgbClr val="0070C0"/>
+                </a:solidFill>
+              </a:rPr>
+              <a:t>Beemer</a:t>
+            </a:r>
+          </a:p>
+          <a:p>
+            <a:r>
+              <a:rPr lang="en-US" sz="2800" dirty="0" smtClean="0">
+                <a:solidFill>
+                  <a:schemeClr val="tx1">
+                    <a:lumMod val="85000"/>
+                    <a:lumOff val="15000"/>
+                  </a:schemeClr>
+                </a:solidFill>
+              </a:rPr>
+              <a:t>Group </a:t>
+            </a:r>
+            <a:r>
+              <a:rPr lang="en-US" sz="2800" dirty="0" smtClean="0">
+                <a:solidFill>
+                  <a:schemeClr val="tx1">
+                    <a:lumMod val="85000"/>
+                    <a:lumOff val="15000"/>
+                  </a:schemeClr>
+                </a:solidFill>
+              </a:rPr>
+              <a:t>C </a:t>
+            </a:r>
+            <a:endParaRPr lang="en-US" sz="2800" dirty="0">
               <a:solidFill>
                 <a:schemeClr val="tx1">
                   <a:lumMod val="85000"/>
@@ -21721,7 +21790,7 @@
         <p:spPr>
           <a:xfrm>
             <a:off x="913774" y="853648"/>
-            <a:ext cx="10364451" cy="1016319"/>
+            <a:ext cx="10364451" cy="1027403"/>
           </a:xfrm>
         </p:spPr>
         <p:txBody>
@@ -21735,7 +21804,14 @@
                 <a:latin typeface="Arial" panose="020B0604020202020204" pitchFamily="34" charset="0"/>
                 <a:cs typeface="Arial" panose="020B0604020202020204" pitchFamily="34" charset="0"/>
               </a:rPr>
-              <a:t>Make your idea success</a:t>
+              <a:t>Make your idea </a:t>
+            </a:r>
+            <a:r>
+              <a:rPr lang="en-US" dirty="0" smtClean="0">
+                <a:latin typeface="Arial" panose="020B0604020202020204" pitchFamily="34" charset="0"/>
+                <a:cs typeface="Arial" panose="020B0604020202020204" pitchFamily="34" charset="0"/>
+              </a:rPr>
+              <a:t>success</a:t>
             </a:r>
             <a:endParaRPr lang="en-US" dirty="0">
               <a:latin typeface="Arial" panose="020B0604020202020204" pitchFamily="34" charset="0"/>
@@ -21759,14 +21835,46 @@
         </p:blipFill>
         <p:spPr>
           <a:xfrm>
-            <a:off x="3104723" y="2245552"/>
-            <a:ext cx="5982554" cy="4414457"/>
+            <a:off x="3400755" y="2708557"/>
+            <a:ext cx="5390488" cy="3977578"/>
           </a:xfrm>
           <a:prstGeom prst="rect">
             <a:avLst/>
           </a:prstGeom>
         </p:spPr>
       </p:pic>
+      <p:sp>
+        <p:nvSpPr>
+          <p:cNvPr id="3" name="TextBox 2"/>
+          <p:cNvSpPr txBox="1"/>
+          <p:nvPr/>
+        </p:nvSpPr>
+        <p:spPr>
+          <a:xfrm>
+            <a:off x="913774" y="2037806"/>
+            <a:ext cx="5682969" cy="369332"/>
+          </a:xfrm>
+          <a:prstGeom prst="rect">
+            <a:avLst/>
+          </a:prstGeom>
+          <a:noFill/>
+        </p:spPr>
+        <p:txBody>
+          <a:bodyPr wrap="square" rtlCol="0">
+            <a:spAutoFit/>
+          </a:bodyPr>
+          <a:lstStyle/>
+          <a:p>
+            <a:r>
+              <a:rPr lang="en-US" dirty="0">
+                <a:hlinkClick r:id="rId3"/>
+              </a:rPr>
+              <a:t>https://github.com/RaviTeja444/health-wellness</a:t>
+            </a:r>
+            <a:endParaRPr lang="en-US" dirty="0"/>
+          </a:p>
+        </p:txBody>
+      </p:sp>
     </p:spTree>
     <p:extLst>
       <p:ext uri="{BB962C8B-B14F-4D97-AF65-F5344CB8AC3E}">
@@ -22707,10 +22815,6 @@
               </a:rPr>
               <a:t>to set personal goals</a:t>
             </a:r>
-            <a:endParaRPr lang="en-US" sz="2000" dirty="0">
-              <a:latin typeface="Arial" panose="020B0604020202020204" pitchFamily="34" charset="0"/>
-              <a:cs typeface="Arial" panose="020B0604020202020204" pitchFamily="34" charset="0"/>
-            </a:endParaRPr>
           </a:p>
           <a:p>
             <a:pPr marL="342900" indent="-342900">
@@ -22757,14 +22861,7 @@
                 <a:latin typeface="Arial" panose="020B0604020202020204" pitchFamily="34" charset="0"/>
                 <a:cs typeface="Arial" panose="020B0604020202020204" pitchFamily="34" charset="0"/>
               </a:rPr>
-              <a:t>The </a:t>
-            </a:r>
-            <a:r>
-              <a:rPr lang="en-US" sz="2000" dirty="0" smtClean="0">
-                <a:latin typeface="Arial" panose="020B0604020202020204" pitchFamily="34" charset="0"/>
-                <a:cs typeface="Arial" panose="020B0604020202020204" pitchFamily="34" charset="0"/>
-              </a:rPr>
-              <a:t>user statistical data can be used to predict users health prior to attack.</a:t>
+              <a:t>The user statistical data can be used to predict users health prior to attack.</a:t>
             </a:r>
             <a:endParaRPr lang="en-US" sz="2000" dirty="0">
               <a:latin typeface="Arial" panose="020B0604020202020204" pitchFamily="34" charset="0"/>
@@ -23543,7 +23640,21 @@
                 <a:latin typeface="Arial" panose="020B0604020202020204" pitchFamily="34" charset="0"/>
                 <a:cs typeface="Arial" panose="020B0604020202020204" pitchFamily="34" charset="0"/>
               </a:rPr>
-              <a:t>Heart Rate</a:t>
+              <a:t>Heart </a:t>
+            </a:r>
+            <a:r>
+              <a:rPr lang="en-US" sz="2000" dirty="0" smtClean="0">
+                <a:latin typeface="Arial" panose="020B0604020202020204" pitchFamily="34" charset="0"/>
+                <a:cs typeface="Arial" panose="020B0604020202020204" pitchFamily="34" charset="0"/>
+              </a:rPr>
+              <a:t>Rate </a:t>
+            </a:r>
+            <a:r>
+              <a:rPr lang="en-US" sz="2000" dirty="0" err="1" smtClean="0">
+                <a:latin typeface="Arial" panose="020B0604020202020204" pitchFamily="34" charset="0"/>
+                <a:cs typeface="Arial" panose="020B0604020202020204" pitchFamily="34" charset="0"/>
+              </a:rPr>
+              <a:t>etc</a:t>
             </a:r>
             <a:endParaRPr lang="en-US" sz="2000" dirty="0">
               <a:latin typeface="Arial" panose="020B0604020202020204" pitchFamily="34" charset="0"/>
@@ -23878,7 +23989,7 @@
         <p:spPr>
           <a:xfrm>
             <a:off x="926838" y="895608"/>
-            <a:ext cx="10364451" cy="1016319"/>
+            <a:ext cx="10555413" cy="1016319"/>
           </a:xfrm>
         </p:spPr>
         <p:txBody>
@@ -23888,12 +23999,20 @@
           <a:lstStyle/>
           <a:p>
             <a:r>
-              <a:rPr lang="en-US" dirty="0">
+              <a:rPr lang="en-US" dirty="0" smtClean="0">
                 <a:latin typeface="Arial" panose="020B0604020202020204" pitchFamily="34" charset="0"/>
                 <a:cs typeface="Arial" panose="020B0604020202020204" pitchFamily="34" charset="0"/>
               </a:rPr>
-              <a:t>Agile Software Development</a:t>
+              <a:t>Agile - </a:t>
             </a:r>
+            <a:r>
+              <a:rPr lang="en-US" dirty="0"/>
+              <a:t>Software Development Methodology</a:t>
+            </a:r>
+            <a:endParaRPr lang="en-US" dirty="0">
+              <a:latin typeface="Arial" panose="020B0604020202020204" pitchFamily="34" charset="0"/>
+              <a:cs typeface="Arial" panose="020B0604020202020204" pitchFamily="34" charset="0"/>
+            </a:endParaRPr>
           </a:p>
         </p:txBody>
       </p:sp>

</xml_diff>